<commit_message>
Add/update session 16 documents.
</commit_message>
<xml_diff>
--- a/CPSC-24700/Presentations/javascript-and-html.pptx
+++ b/CPSC-24700/Presentations/javascript-and-html.pptx
@@ -6,7 +6,7 @@
     <p:sldMasterId id="2147483672" r:id="rId2"/>
   </p:sldMasterIdLst>
   <p:notesMasterIdLst>
-    <p:notesMasterId r:id="rId56"/>
+    <p:notesMasterId r:id="rId57"/>
   </p:notesMasterIdLst>
   <p:sldIdLst>
     <p:sldId id="291" r:id="rId3"/>
@@ -44,24 +44,25 @@
     <p:sldId id="315" r:id="rId35"/>
     <p:sldId id="316" r:id="rId36"/>
     <p:sldId id="317" r:id="rId37"/>
-    <p:sldId id="281" r:id="rId38"/>
-    <p:sldId id="307" r:id="rId39"/>
-    <p:sldId id="296" r:id="rId40"/>
-    <p:sldId id="274" r:id="rId41"/>
-    <p:sldId id="308" r:id="rId42"/>
-    <p:sldId id="297" r:id="rId43"/>
-    <p:sldId id="275" r:id="rId44"/>
-    <p:sldId id="298" r:id="rId45"/>
-    <p:sldId id="299" r:id="rId46"/>
-    <p:sldId id="282" r:id="rId47"/>
-    <p:sldId id="301" r:id="rId48"/>
-    <p:sldId id="283" r:id="rId49"/>
-    <p:sldId id="284" r:id="rId50"/>
-    <p:sldId id="300" r:id="rId51"/>
-    <p:sldId id="286" r:id="rId52"/>
-    <p:sldId id="287" r:id="rId53"/>
-    <p:sldId id="309" r:id="rId54"/>
-    <p:sldId id="290" r:id="rId55"/>
+    <p:sldId id="321" r:id="rId38"/>
+    <p:sldId id="281" r:id="rId39"/>
+    <p:sldId id="307" r:id="rId40"/>
+    <p:sldId id="296" r:id="rId41"/>
+    <p:sldId id="274" r:id="rId42"/>
+    <p:sldId id="308" r:id="rId43"/>
+    <p:sldId id="297" r:id="rId44"/>
+    <p:sldId id="275" r:id="rId45"/>
+    <p:sldId id="298" r:id="rId46"/>
+    <p:sldId id="299" r:id="rId47"/>
+    <p:sldId id="282" r:id="rId48"/>
+    <p:sldId id="301" r:id="rId49"/>
+    <p:sldId id="283" r:id="rId50"/>
+    <p:sldId id="284" r:id="rId51"/>
+    <p:sldId id="300" r:id="rId52"/>
+    <p:sldId id="286" r:id="rId53"/>
+    <p:sldId id="287" r:id="rId54"/>
+    <p:sldId id="309" r:id="rId55"/>
+    <p:sldId id="290" r:id="rId56"/>
   </p:sldIdLst>
   <p:sldSz cx="9144000" cy="6858000" type="screen4x3"/>
   <p:notesSz cx="6858000" cy="9144000"/>
@@ -265,7 +266,7 @@
           <a:p>
             <a:fld id="{82AC26F5-A2E7-4901-A403-BBD25C17198C}" type="datetimeFigureOut">
               <a:rPr lang="en-US" smtClean="0"/>
-              <a:t>10/2/2017</a:t>
+              <a:t>10/4/2017</a:t>
             </a:fld>
             <a:endParaRPr lang="en-US"/>
           </a:p>
@@ -635,6 +636,76 @@
       </p:grpSpPr>
       <p:sp>
         <p:nvSpPr>
+          <p:cNvPr id="24578" name="Rectangle 2"/>
+          <p:cNvSpPr>
+            <a:spLocks noGrp="1" noRot="1" noChangeAspect="1" noChangeArrowheads="1" noTextEdit="1"/>
+          </p:cNvSpPr>
+          <p:nvPr>
+            <p:ph type="sldImg"/>
+          </p:nvPr>
+        </p:nvSpPr>
+        <p:spPr/>
+      </p:sp>
+      <p:sp>
+        <p:nvSpPr>
+          <p:cNvPr id="24579" name="Rectangle 3"/>
+          <p:cNvSpPr>
+            <a:spLocks noGrp="1" noChangeArrowheads="1"/>
+          </p:cNvSpPr>
+          <p:nvPr>
+            <p:ph type="body" idx="1"/>
+          </p:nvPr>
+        </p:nvSpPr>
+        <p:spPr bwMode="auto">
+          <a:xfrm>
+            <a:off x="686270" y="4344229"/>
+            <a:ext cx="5485463" cy="4114387"/>
+          </a:xfrm>
+          <a:prstGeom prst="rect">
+            <a:avLst/>
+          </a:prstGeom>
+          <a:noFill/>
+          <a:ln>
+            <a:miter lim="800000"/>
+            <a:headEnd/>
+            <a:tailEnd/>
+          </a:ln>
+        </p:spPr>
+        <p:txBody>
+          <a:bodyPr/>
+          <a:lstStyle/>
+          <a:p>
+            <a:endParaRPr lang="en-US"/>
+          </a:p>
+        </p:txBody>
+      </p:sp>
+    </p:spTree>
+  </p:cSld>
+  <p:clrMapOvr>
+    <a:masterClrMapping/>
+  </p:clrMapOvr>
+</p:notes>
+</file>
+
+<file path=ppt/notesSlides/notesSlide11.xml><?xml version="1.0" encoding="utf-8"?>
+<p:notes xmlns:a="http://schemas.openxmlformats.org/drawingml/2006/main" xmlns:r="http://schemas.openxmlformats.org/officeDocument/2006/relationships" xmlns:p="http://schemas.openxmlformats.org/presentationml/2006/main">
+  <p:cSld>
+    <p:spTree>
+      <p:nvGrpSpPr>
+        <p:cNvPr id="1" name=""/>
+        <p:cNvGrpSpPr/>
+        <p:nvPr/>
+      </p:nvGrpSpPr>
+      <p:grpSpPr>
+        <a:xfrm>
+          <a:off x="0" y="0"/>
+          <a:ext cx="0" cy="0"/>
+          <a:chOff x="0" y="0"/>
+          <a:chExt cx="0" cy="0"/>
+        </a:xfrm>
+      </p:grpSpPr>
+      <p:sp>
+        <p:nvSpPr>
           <p:cNvPr id="25602" name="Rectangle 2"/>
           <p:cNvSpPr>
             <a:spLocks noGrp="1" noRot="1" noChangeAspect="1" noChangeArrowheads="1" noTextEdit="1"/>
@@ -679,150 +750,6 @@
         </p:txBody>
       </p:sp>
     </p:spTree>
-  </p:cSld>
-  <p:clrMapOvr>
-    <a:masterClrMapping/>
-  </p:clrMapOvr>
-</p:notes>
-</file>
-
-<file path=ppt/notesSlides/notesSlide11.xml><?xml version="1.0" encoding="utf-8"?>
-<p:notes xmlns:a="http://schemas.openxmlformats.org/drawingml/2006/main" xmlns:r="http://schemas.openxmlformats.org/officeDocument/2006/relationships" xmlns:p="http://schemas.openxmlformats.org/presentationml/2006/main">
-  <p:cSld>
-    <p:spTree>
-      <p:nvGrpSpPr>
-        <p:cNvPr id="1" name=""/>
-        <p:cNvGrpSpPr/>
-        <p:nvPr/>
-      </p:nvGrpSpPr>
-      <p:grpSpPr>
-        <a:xfrm>
-          <a:off x="0" y="0"/>
-          <a:ext cx="0" cy="0"/>
-          <a:chOff x="0" y="0"/>
-          <a:chExt cx="0" cy="0"/>
-        </a:xfrm>
-      </p:grpSpPr>
-      <p:sp>
-        <p:nvSpPr>
-          <p:cNvPr id="2" name="Slide Image Placeholder 1"/>
-          <p:cNvSpPr>
-            <a:spLocks noGrp="1" noRot="1" noChangeAspect="1"/>
-          </p:cNvSpPr>
-          <p:nvPr>
-            <p:ph type="sldImg"/>
-          </p:nvPr>
-        </p:nvSpPr>
-        <p:spPr/>
-      </p:sp>
-      <p:sp>
-        <p:nvSpPr>
-          <p:cNvPr id="3" name="Notes Placeholder 2"/>
-          <p:cNvSpPr>
-            <a:spLocks noGrp="1"/>
-          </p:cNvSpPr>
-          <p:nvPr>
-            <p:ph type="body" idx="1"/>
-          </p:nvPr>
-        </p:nvSpPr>
-        <p:spPr/>
-        <p:txBody>
-          <a:bodyPr/>
-          <a:lstStyle/>
-          <a:p>
-            <a:endParaRPr lang="en-US" dirty="0"/>
-          </a:p>
-        </p:txBody>
-      </p:sp>
-      <p:sp>
-        <p:nvSpPr>
-          <p:cNvPr id="4" name="Slide Number Placeholder 3"/>
-          <p:cNvSpPr>
-            <a:spLocks noGrp="1"/>
-          </p:cNvSpPr>
-          <p:nvPr>
-            <p:ph type="sldNum" sz="quarter" idx="10"/>
-          </p:nvPr>
-        </p:nvSpPr>
-        <p:spPr/>
-        <p:txBody>
-          <a:bodyPr/>
-          <a:lstStyle/>
-          <a:p>
-            <a:pPr marL="0" marR="0" lvl="0" indent="0" algn="r" defTabSz="914400" rtl="0" eaLnBrk="1" fontAlgn="auto" latinLnBrk="0" hangingPunct="1">
-              <a:lnSpc>
-                <a:spcPct val="100000"/>
-              </a:lnSpc>
-              <a:spcBef>
-                <a:spcPts val="0"/>
-              </a:spcBef>
-              <a:spcAft>
-                <a:spcPts val="0"/>
-              </a:spcAft>
-              <a:buClrTx/>
-              <a:buSzTx/>
-              <a:buFontTx/>
-              <a:buNone/>
-              <a:tabLst/>
-              <a:defRPr/>
-            </a:pPr>
-            <a:fld id="{5394DE12-7B9B-46AA-AC19-C30A49928B9B}" type="slidenum">
-              <a:rPr kumimoji="0" lang="en-US" sz="1200" b="0" i="0" u="none" strike="noStrike" kern="1200" cap="none" spc="0" normalizeH="0" baseline="0" noProof="0" smtClean="0">
-                <a:ln>
-                  <a:noFill/>
-                </a:ln>
-                <a:solidFill>
-                  <a:prstClr val="black"/>
-                </a:solidFill>
-                <a:effectLst/>
-                <a:uLnTx/>
-                <a:uFillTx/>
-                <a:latin typeface="Calibri" panose="020F0502020204030204"/>
-                <a:ea typeface="+mn-ea"/>
-                <a:cs typeface="+mn-cs"/>
-              </a:rPr>
-              <a:pPr marL="0" marR="0" lvl="0" indent="0" algn="r" defTabSz="914400" rtl="0" eaLnBrk="1" fontAlgn="auto" latinLnBrk="0" hangingPunct="1">
-                <a:lnSpc>
-                  <a:spcPct val="100000"/>
-                </a:lnSpc>
-                <a:spcBef>
-                  <a:spcPts val="0"/>
-                </a:spcBef>
-                <a:spcAft>
-                  <a:spcPts val="0"/>
-                </a:spcAft>
-                <a:buClrTx/>
-                <a:buSzTx/>
-                <a:buFontTx/>
-                <a:buNone/>
-                <a:tabLst/>
-                <a:defRPr/>
-              </a:pPr>
-              <a:t>26</a:t>
-            </a:fld>
-            <a:endParaRPr kumimoji="0" lang="en-US" sz="1200" b="0" i="0" u="none" strike="noStrike" kern="1200" cap="none" spc="0" normalizeH="0" baseline="0" noProof="0" dirty="0">
-              <a:ln>
-                <a:noFill/>
-              </a:ln>
-              <a:solidFill>
-                <a:prstClr val="black"/>
-              </a:solidFill>
-              <a:effectLst/>
-              <a:uLnTx/>
-              <a:uFillTx/>
-              <a:latin typeface="Calibri" panose="020F0502020204030204"/>
-              <a:ea typeface="+mn-ea"/>
-              <a:cs typeface="+mn-cs"/>
-            </a:endParaRPr>
-          </a:p>
-        </p:txBody>
-      </p:sp>
-    </p:spTree>
-    <p:extLst>
-      <p:ext uri="{BB962C8B-B14F-4D97-AF65-F5344CB8AC3E}">
-        <p14:creationId xmlns:p14="http://schemas.microsoft.com/office/powerpoint/2010/main" val="887556209"/>
-      </p:ext>
-    </p:extLst>
   </p:cSld>
   <p:clrMapOvr>
     <a:masterClrMapping/>
@@ -895,16 +822,16 @@
           <a:p>
             <a:fld id="{40F5A9F4-14AB-4E34-9372-28158D5523BB}" type="slidenum">
               <a:rPr lang="en-US" smtClean="0"/>
-              <a:t>28</a:t>
+              <a:t>22</a:t>
             </a:fld>
-            <a:endParaRPr lang="en-US" dirty="0"/>
+            <a:endParaRPr lang="en-US"/>
           </a:p>
         </p:txBody>
       </p:sp>
     </p:spTree>
     <p:extLst>
       <p:ext uri="{BB962C8B-B14F-4D97-AF65-F5344CB8AC3E}">
-        <p14:creationId xmlns:p14="http://schemas.microsoft.com/office/powerpoint/2010/main" val="1904762970"/>
+        <p14:creationId xmlns:p14="http://schemas.microsoft.com/office/powerpoint/2010/main" val="1535053328"/>
       </p:ext>
     </p:extLst>
   </p:cSld>
@@ -958,14 +885,6 @@
           <a:bodyPr/>
           <a:lstStyle/>
           <a:p>
-            <a:r>
-              <a:rPr lang="en-US" dirty="0"/>
-              <a:t>example:</a:t>
-            </a:r>
-            <a:r>
-              <a:rPr lang="en-US" baseline="0" dirty="0"/>
-              <a:t> validator2.html</a:t>
-            </a:r>
             <a:endParaRPr lang="en-US" dirty="0"/>
           </a:p>
         </p:txBody>
@@ -987,7 +906,651 @@
           <a:p>
             <a:fld id="{40F5A9F4-14AB-4E34-9372-28158D5523BB}" type="slidenum">
               <a:rPr lang="en-US" smtClean="0"/>
-              <a:t>51</a:t>
+              <a:t>25</a:t>
+            </a:fld>
+            <a:endParaRPr lang="en-US"/>
+          </a:p>
+        </p:txBody>
+      </p:sp>
+    </p:spTree>
+    <p:extLst>
+      <p:ext uri="{BB962C8B-B14F-4D97-AF65-F5344CB8AC3E}">
+        <p14:creationId xmlns:p14="http://schemas.microsoft.com/office/powerpoint/2010/main" val="80422154"/>
+      </p:ext>
+    </p:extLst>
+  </p:cSld>
+  <p:clrMapOvr>
+    <a:masterClrMapping/>
+  </p:clrMapOvr>
+</p:notes>
+</file>
+
+<file path=ppt/notesSlides/notesSlide14.xml><?xml version="1.0" encoding="utf-8"?>
+<p:notes xmlns:a="http://schemas.openxmlformats.org/drawingml/2006/main" xmlns:r="http://schemas.openxmlformats.org/officeDocument/2006/relationships" xmlns:p="http://schemas.openxmlformats.org/presentationml/2006/main">
+  <p:cSld>
+    <p:spTree>
+      <p:nvGrpSpPr>
+        <p:cNvPr id="1" name=""/>
+        <p:cNvGrpSpPr/>
+        <p:nvPr/>
+      </p:nvGrpSpPr>
+      <p:grpSpPr>
+        <a:xfrm>
+          <a:off x="0" y="0"/>
+          <a:ext cx="0" cy="0"/>
+          <a:chOff x="0" y="0"/>
+          <a:chExt cx="0" cy="0"/>
+        </a:xfrm>
+      </p:grpSpPr>
+      <p:sp>
+        <p:nvSpPr>
+          <p:cNvPr id="2" name="Slide Image Placeholder 1"/>
+          <p:cNvSpPr>
+            <a:spLocks noGrp="1" noRot="1" noChangeAspect="1"/>
+          </p:cNvSpPr>
+          <p:nvPr>
+            <p:ph type="sldImg"/>
+          </p:nvPr>
+        </p:nvSpPr>
+        <p:spPr/>
+      </p:sp>
+      <p:sp>
+        <p:nvSpPr>
+          <p:cNvPr id="3" name="Notes Placeholder 2"/>
+          <p:cNvSpPr>
+            <a:spLocks noGrp="1"/>
+          </p:cNvSpPr>
+          <p:nvPr>
+            <p:ph type="body" idx="1"/>
+          </p:nvPr>
+        </p:nvSpPr>
+        <p:spPr/>
+        <p:txBody>
+          <a:bodyPr/>
+          <a:lstStyle/>
+          <a:p>
+            <a:endParaRPr lang="en-US" dirty="0"/>
+          </a:p>
+        </p:txBody>
+      </p:sp>
+      <p:sp>
+        <p:nvSpPr>
+          <p:cNvPr id="4" name="Slide Number Placeholder 3"/>
+          <p:cNvSpPr>
+            <a:spLocks noGrp="1"/>
+          </p:cNvSpPr>
+          <p:nvPr>
+            <p:ph type="sldNum" sz="quarter" idx="10"/>
+          </p:nvPr>
+        </p:nvSpPr>
+        <p:spPr/>
+        <p:txBody>
+          <a:bodyPr/>
+          <a:lstStyle/>
+          <a:p>
+            <a:pPr marL="0" marR="0" lvl="0" indent="0" algn="r" defTabSz="914400" rtl="0" eaLnBrk="1" fontAlgn="auto" latinLnBrk="0" hangingPunct="1">
+              <a:lnSpc>
+                <a:spcPct val="100000"/>
+              </a:lnSpc>
+              <a:spcBef>
+                <a:spcPts val="0"/>
+              </a:spcBef>
+              <a:spcAft>
+                <a:spcPts val="0"/>
+              </a:spcAft>
+              <a:buClrTx/>
+              <a:buSzTx/>
+              <a:buFontTx/>
+              <a:buNone/>
+              <a:tabLst/>
+              <a:defRPr/>
+            </a:pPr>
+            <a:fld id="{5394DE12-7B9B-46AA-AC19-C30A49928B9B}" type="slidenum">
+              <a:rPr kumimoji="0" lang="en-US" sz="1200" b="0" i="0" u="none" strike="noStrike" kern="1200" cap="none" spc="0" normalizeH="0" baseline="0" noProof="0" smtClean="0">
+                <a:ln>
+                  <a:noFill/>
+                </a:ln>
+                <a:solidFill>
+                  <a:prstClr val="black"/>
+                </a:solidFill>
+                <a:effectLst/>
+                <a:uLnTx/>
+                <a:uFillTx/>
+                <a:latin typeface="Calibri" panose="020F0502020204030204"/>
+                <a:ea typeface="+mn-ea"/>
+                <a:cs typeface="+mn-cs"/>
+              </a:rPr>
+              <a:pPr marL="0" marR="0" lvl="0" indent="0" algn="r" defTabSz="914400" rtl="0" eaLnBrk="1" fontAlgn="auto" latinLnBrk="0" hangingPunct="1">
+                <a:lnSpc>
+                  <a:spcPct val="100000"/>
+                </a:lnSpc>
+                <a:spcBef>
+                  <a:spcPts val="0"/>
+                </a:spcBef>
+                <a:spcAft>
+                  <a:spcPts val="0"/>
+                </a:spcAft>
+                <a:buClrTx/>
+                <a:buSzTx/>
+                <a:buFontTx/>
+                <a:buNone/>
+                <a:tabLst/>
+                <a:defRPr/>
+              </a:pPr>
+              <a:t>26</a:t>
+            </a:fld>
+            <a:endParaRPr kumimoji="0" lang="en-US" sz="1200" b="0" i="0" u="none" strike="noStrike" kern="1200" cap="none" spc="0" normalizeH="0" baseline="0" noProof="0" dirty="0">
+              <a:ln>
+                <a:noFill/>
+              </a:ln>
+              <a:solidFill>
+                <a:prstClr val="black"/>
+              </a:solidFill>
+              <a:effectLst/>
+              <a:uLnTx/>
+              <a:uFillTx/>
+              <a:latin typeface="Calibri" panose="020F0502020204030204"/>
+              <a:ea typeface="+mn-ea"/>
+              <a:cs typeface="+mn-cs"/>
+            </a:endParaRPr>
+          </a:p>
+        </p:txBody>
+      </p:sp>
+    </p:spTree>
+    <p:extLst>
+      <p:ext uri="{BB962C8B-B14F-4D97-AF65-F5344CB8AC3E}">
+        <p14:creationId xmlns:p14="http://schemas.microsoft.com/office/powerpoint/2010/main" val="887556209"/>
+      </p:ext>
+    </p:extLst>
+  </p:cSld>
+  <p:clrMapOvr>
+    <a:masterClrMapping/>
+  </p:clrMapOvr>
+</p:notes>
+</file>
+
+<file path=ppt/notesSlides/notesSlide15.xml><?xml version="1.0" encoding="utf-8"?>
+<p:notes xmlns:a="http://schemas.openxmlformats.org/drawingml/2006/main" xmlns:r="http://schemas.openxmlformats.org/officeDocument/2006/relationships" xmlns:p="http://schemas.openxmlformats.org/presentationml/2006/main">
+  <p:cSld>
+    <p:spTree>
+      <p:nvGrpSpPr>
+        <p:cNvPr id="1" name=""/>
+        <p:cNvGrpSpPr/>
+        <p:nvPr/>
+      </p:nvGrpSpPr>
+      <p:grpSpPr>
+        <a:xfrm>
+          <a:off x="0" y="0"/>
+          <a:ext cx="0" cy="0"/>
+          <a:chOff x="0" y="0"/>
+          <a:chExt cx="0" cy="0"/>
+        </a:xfrm>
+      </p:grpSpPr>
+      <p:sp>
+        <p:nvSpPr>
+          <p:cNvPr id="2" name="Slide Image Placeholder 1"/>
+          <p:cNvSpPr>
+            <a:spLocks noGrp="1" noRot="1" noChangeAspect="1"/>
+          </p:cNvSpPr>
+          <p:nvPr>
+            <p:ph type="sldImg"/>
+          </p:nvPr>
+        </p:nvSpPr>
+        <p:spPr/>
+      </p:sp>
+      <p:sp>
+        <p:nvSpPr>
+          <p:cNvPr id="3" name="Notes Placeholder 2"/>
+          <p:cNvSpPr>
+            <a:spLocks noGrp="1"/>
+          </p:cNvSpPr>
+          <p:nvPr>
+            <p:ph type="body" idx="1"/>
+          </p:nvPr>
+        </p:nvSpPr>
+        <p:spPr/>
+        <p:txBody>
+          <a:bodyPr/>
+          <a:lstStyle/>
+          <a:p>
+            <a:r>
+              <a:rPr lang="en-US" dirty="0"/>
+              <a:t>It’s important to note that input will also need to be validated on the server. Otherwise the sever will be susceptible to spoofing… having an non-browser send data to it that has not been validated. A server should never assume that data coming in is adequately validated. </a:t>
+            </a:r>
+          </a:p>
+          <a:p>
+            <a:endParaRPr lang="en-US" dirty="0"/>
+          </a:p>
+          <a:p>
+            <a:r>
+              <a:rPr lang="en-US" dirty="0"/>
+              <a:t>Also, good practice would suggest attempting to reformat the content to better assist the user. </a:t>
+            </a:r>
+          </a:p>
+        </p:txBody>
+      </p:sp>
+      <p:sp>
+        <p:nvSpPr>
+          <p:cNvPr id="4" name="Slide Number Placeholder 3"/>
+          <p:cNvSpPr>
+            <a:spLocks noGrp="1"/>
+          </p:cNvSpPr>
+          <p:nvPr>
+            <p:ph type="sldNum" sz="quarter" idx="10"/>
+          </p:nvPr>
+        </p:nvSpPr>
+        <p:spPr/>
+        <p:txBody>
+          <a:bodyPr/>
+          <a:lstStyle/>
+          <a:p>
+            <a:fld id="{40F5A9F4-14AB-4E34-9372-28158D5523BB}" type="slidenum">
+              <a:rPr lang="en-US" smtClean="0"/>
+              <a:t>28</a:t>
+            </a:fld>
+            <a:endParaRPr lang="en-US" dirty="0"/>
+          </a:p>
+        </p:txBody>
+      </p:sp>
+    </p:spTree>
+    <p:extLst>
+      <p:ext uri="{BB962C8B-B14F-4D97-AF65-F5344CB8AC3E}">
+        <p14:creationId xmlns:p14="http://schemas.microsoft.com/office/powerpoint/2010/main" val="1904762970"/>
+      </p:ext>
+    </p:extLst>
+  </p:cSld>
+  <p:clrMapOvr>
+    <a:masterClrMapping/>
+  </p:clrMapOvr>
+</p:notes>
+</file>
+
+<file path=ppt/notesSlides/notesSlide16.xml><?xml version="1.0" encoding="utf-8"?>
+<p:notes xmlns:a="http://schemas.openxmlformats.org/drawingml/2006/main" xmlns:r="http://schemas.openxmlformats.org/officeDocument/2006/relationships" xmlns:p="http://schemas.openxmlformats.org/presentationml/2006/main">
+  <p:cSld>
+    <p:spTree>
+      <p:nvGrpSpPr>
+        <p:cNvPr id="1" name=""/>
+        <p:cNvGrpSpPr/>
+        <p:nvPr/>
+      </p:nvGrpSpPr>
+      <p:grpSpPr>
+        <a:xfrm>
+          <a:off x="0" y="0"/>
+          <a:ext cx="0" cy="0"/>
+          <a:chOff x="0" y="0"/>
+          <a:chExt cx="0" cy="0"/>
+        </a:xfrm>
+      </p:grpSpPr>
+      <p:sp>
+        <p:nvSpPr>
+          <p:cNvPr id="2" name="Slide Image Placeholder 1"/>
+          <p:cNvSpPr>
+            <a:spLocks noGrp="1" noRot="1" noChangeAspect="1"/>
+          </p:cNvSpPr>
+          <p:nvPr>
+            <p:ph type="sldImg"/>
+          </p:nvPr>
+        </p:nvSpPr>
+        <p:spPr/>
+      </p:sp>
+      <p:sp>
+        <p:nvSpPr>
+          <p:cNvPr id="3" name="Notes Placeholder 2"/>
+          <p:cNvSpPr>
+            <a:spLocks noGrp="1"/>
+          </p:cNvSpPr>
+          <p:nvPr>
+            <p:ph type="body" idx="1"/>
+          </p:nvPr>
+        </p:nvSpPr>
+        <p:spPr/>
+        <p:txBody>
+          <a:bodyPr/>
+          <a:lstStyle/>
+          <a:p>
+            <a:endParaRPr lang="en-US" dirty="0"/>
+          </a:p>
+        </p:txBody>
+      </p:sp>
+      <p:sp>
+        <p:nvSpPr>
+          <p:cNvPr id="4" name="Slide Number Placeholder 3"/>
+          <p:cNvSpPr>
+            <a:spLocks noGrp="1"/>
+          </p:cNvSpPr>
+          <p:nvPr>
+            <p:ph type="sldNum" sz="quarter" idx="10"/>
+          </p:nvPr>
+        </p:nvSpPr>
+        <p:spPr/>
+        <p:txBody>
+          <a:bodyPr/>
+          <a:lstStyle/>
+          <a:p>
+            <a:fld id="{40F5A9F4-14AB-4E34-9372-28158D5523BB}" type="slidenum">
+              <a:rPr lang="en-US" smtClean="0"/>
+              <a:t>29</a:t>
+            </a:fld>
+            <a:endParaRPr lang="en-US"/>
+          </a:p>
+        </p:txBody>
+      </p:sp>
+    </p:spTree>
+    <p:extLst>
+      <p:ext uri="{BB962C8B-B14F-4D97-AF65-F5344CB8AC3E}">
+        <p14:creationId xmlns:p14="http://schemas.microsoft.com/office/powerpoint/2010/main" val="132243976"/>
+      </p:ext>
+    </p:extLst>
+  </p:cSld>
+  <p:clrMapOvr>
+    <a:masterClrMapping/>
+  </p:clrMapOvr>
+</p:notes>
+</file>
+
+<file path=ppt/notesSlides/notesSlide17.xml><?xml version="1.0" encoding="utf-8"?>
+<p:notes xmlns:a="http://schemas.openxmlformats.org/drawingml/2006/main" xmlns:r="http://schemas.openxmlformats.org/officeDocument/2006/relationships" xmlns:p="http://schemas.openxmlformats.org/presentationml/2006/main">
+  <p:cSld>
+    <p:spTree>
+      <p:nvGrpSpPr>
+        <p:cNvPr id="1" name=""/>
+        <p:cNvGrpSpPr/>
+        <p:nvPr/>
+      </p:nvGrpSpPr>
+      <p:grpSpPr>
+        <a:xfrm>
+          <a:off x="0" y="0"/>
+          <a:ext cx="0" cy="0"/>
+          <a:chOff x="0" y="0"/>
+          <a:chExt cx="0" cy="0"/>
+        </a:xfrm>
+      </p:grpSpPr>
+      <p:sp>
+        <p:nvSpPr>
+          <p:cNvPr id="2" name="Slide Image Placeholder 1"/>
+          <p:cNvSpPr>
+            <a:spLocks noGrp="1" noRot="1" noChangeAspect="1"/>
+          </p:cNvSpPr>
+          <p:nvPr>
+            <p:ph type="sldImg"/>
+          </p:nvPr>
+        </p:nvSpPr>
+        <p:spPr/>
+      </p:sp>
+      <p:sp>
+        <p:nvSpPr>
+          <p:cNvPr id="3" name="Notes Placeholder 2"/>
+          <p:cNvSpPr>
+            <a:spLocks noGrp="1"/>
+          </p:cNvSpPr>
+          <p:nvPr>
+            <p:ph type="body" idx="1"/>
+          </p:nvPr>
+        </p:nvSpPr>
+        <p:spPr/>
+        <p:txBody>
+          <a:bodyPr/>
+          <a:lstStyle/>
+          <a:p>
+            <a:endParaRPr lang="en-US" dirty="0"/>
+          </a:p>
+        </p:txBody>
+      </p:sp>
+      <p:sp>
+        <p:nvSpPr>
+          <p:cNvPr id="4" name="Slide Number Placeholder 3"/>
+          <p:cNvSpPr>
+            <a:spLocks noGrp="1"/>
+          </p:cNvSpPr>
+          <p:nvPr>
+            <p:ph type="sldNum" sz="quarter" idx="10"/>
+          </p:nvPr>
+        </p:nvSpPr>
+        <p:spPr/>
+        <p:txBody>
+          <a:bodyPr/>
+          <a:lstStyle/>
+          <a:p>
+            <a:fld id="{40F5A9F4-14AB-4E34-9372-28158D5523BB}" type="slidenum">
+              <a:rPr lang="en-US" smtClean="0"/>
+              <a:t>35</a:t>
+            </a:fld>
+            <a:endParaRPr lang="en-US"/>
+          </a:p>
+        </p:txBody>
+      </p:sp>
+    </p:spTree>
+    <p:extLst>
+      <p:ext uri="{BB962C8B-B14F-4D97-AF65-F5344CB8AC3E}">
+        <p14:creationId xmlns:p14="http://schemas.microsoft.com/office/powerpoint/2010/main" val="1293131616"/>
+      </p:ext>
+    </p:extLst>
+  </p:cSld>
+  <p:clrMapOvr>
+    <a:masterClrMapping/>
+  </p:clrMapOvr>
+</p:notes>
+</file>
+
+<file path=ppt/notesSlides/notesSlide18.xml><?xml version="1.0" encoding="utf-8"?>
+<p:notes xmlns:a="http://schemas.openxmlformats.org/drawingml/2006/main" xmlns:r="http://schemas.openxmlformats.org/officeDocument/2006/relationships" xmlns:p="http://schemas.openxmlformats.org/presentationml/2006/main">
+  <p:cSld>
+    <p:spTree>
+      <p:nvGrpSpPr>
+        <p:cNvPr id="1" name=""/>
+        <p:cNvGrpSpPr/>
+        <p:nvPr/>
+      </p:nvGrpSpPr>
+      <p:grpSpPr>
+        <a:xfrm>
+          <a:off x="0" y="0"/>
+          <a:ext cx="0" cy="0"/>
+          <a:chOff x="0" y="0"/>
+          <a:chExt cx="0" cy="0"/>
+        </a:xfrm>
+      </p:grpSpPr>
+      <p:sp>
+        <p:nvSpPr>
+          <p:cNvPr id="2" name="Slide Image Placeholder 1"/>
+          <p:cNvSpPr>
+            <a:spLocks noGrp="1" noRot="1" noChangeAspect="1"/>
+          </p:cNvSpPr>
+          <p:nvPr>
+            <p:ph type="sldImg"/>
+          </p:nvPr>
+        </p:nvSpPr>
+        <p:spPr/>
+      </p:sp>
+      <p:sp>
+        <p:nvSpPr>
+          <p:cNvPr id="3" name="Notes Placeholder 2"/>
+          <p:cNvSpPr>
+            <a:spLocks noGrp="1"/>
+          </p:cNvSpPr>
+          <p:nvPr>
+            <p:ph type="body" idx="1"/>
+          </p:nvPr>
+        </p:nvSpPr>
+        <p:spPr/>
+        <p:txBody>
+          <a:bodyPr/>
+          <a:lstStyle/>
+          <a:p>
+            <a:endParaRPr lang="en-US" dirty="0"/>
+          </a:p>
+        </p:txBody>
+      </p:sp>
+      <p:sp>
+        <p:nvSpPr>
+          <p:cNvPr id="4" name="Slide Number Placeholder 3"/>
+          <p:cNvSpPr>
+            <a:spLocks noGrp="1"/>
+          </p:cNvSpPr>
+          <p:nvPr>
+            <p:ph type="sldNum" sz="quarter" idx="10"/>
+          </p:nvPr>
+        </p:nvSpPr>
+        <p:spPr/>
+        <p:txBody>
+          <a:bodyPr/>
+          <a:lstStyle/>
+          <a:p>
+            <a:pPr marL="0" marR="0" lvl="0" indent="0" algn="r" defTabSz="914400" rtl="0" eaLnBrk="1" fontAlgn="auto" latinLnBrk="0" hangingPunct="1">
+              <a:lnSpc>
+                <a:spcPct val="100000"/>
+              </a:lnSpc>
+              <a:spcBef>
+                <a:spcPts val="0"/>
+              </a:spcBef>
+              <a:spcAft>
+                <a:spcPts val="0"/>
+              </a:spcAft>
+              <a:buClrTx/>
+              <a:buSzTx/>
+              <a:buFontTx/>
+              <a:buNone/>
+              <a:tabLst/>
+              <a:defRPr/>
+            </a:pPr>
+            <a:fld id="{5394DE12-7B9B-46AA-AC19-C30A49928B9B}" type="slidenum">
+              <a:rPr kumimoji="0" lang="en-US" sz="1200" b="0" i="0" u="none" strike="noStrike" kern="1200" cap="none" spc="0" normalizeH="0" baseline="0" noProof="0" smtClean="0">
+                <a:ln>
+                  <a:noFill/>
+                </a:ln>
+                <a:solidFill>
+                  <a:prstClr val="black"/>
+                </a:solidFill>
+                <a:effectLst/>
+                <a:uLnTx/>
+                <a:uFillTx/>
+                <a:latin typeface="Calibri" panose="020F0502020204030204"/>
+                <a:ea typeface="+mn-ea"/>
+                <a:cs typeface="+mn-cs"/>
+              </a:rPr>
+              <a:pPr marL="0" marR="0" lvl="0" indent="0" algn="r" defTabSz="914400" rtl="0" eaLnBrk="1" fontAlgn="auto" latinLnBrk="0" hangingPunct="1">
+                <a:lnSpc>
+                  <a:spcPct val="100000"/>
+                </a:lnSpc>
+                <a:spcBef>
+                  <a:spcPts val="0"/>
+                </a:spcBef>
+                <a:spcAft>
+                  <a:spcPts val="0"/>
+                </a:spcAft>
+                <a:buClrTx/>
+                <a:buSzTx/>
+                <a:buFontTx/>
+                <a:buNone/>
+                <a:tabLst/>
+                <a:defRPr/>
+              </a:pPr>
+              <a:t>36</a:t>
+            </a:fld>
+            <a:endParaRPr kumimoji="0" lang="en-US" sz="1200" b="0" i="0" u="none" strike="noStrike" kern="1200" cap="none" spc="0" normalizeH="0" baseline="0" noProof="0" dirty="0">
+              <a:ln>
+                <a:noFill/>
+              </a:ln>
+              <a:solidFill>
+                <a:prstClr val="black"/>
+              </a:solidFill>
+              <a:effectLst/>
+              <a:uLnTx/>
+              <a:uFillTx/>
+              <a:latin typeface="Calibri" panose="020F0502020204030204"/>
+              <a:ea typeface="+mn-ea"/>
+              <a:cs typeface="+mn-cs"/>
+            </a:endParaRPr>
+          </a:p>
+        </p:txBody>
+      </p:sp>
+    </p:spTree>
+    <p:extLst>
+      <p:ext uri="{BB962C8B-B14F-4D97-AF65-F5344CB8AC3E}">
+        <p14:creationId xmlns:p14="http://schemas.microsoft.com/office/powerpoint/2010/main" val="2944331274"/>
+      </p:ext>
+    </p:extLst>
+  </p:cSld>
+  <p:clrMapOvr>
+    <a:masterClrMapping/>
+  </p:clrMapOvr>
+</p:notes>
+</file>
+
+<file path=ppt/notesSlides/notesSlide19.xml><?xml version="1.0" encoding="utf-8"?>
+<p:notes xmlns:a="http://schemas.openxmlformats.org/drawingml/2006/main" xmlns:r="http://schemas.openxmlformats.org/officeDocument/2006/relationships" xmlns:p="http://schemas.openxmlformats.org/presentationml/2006/main">
+  <p:cSld>
+    <p:spTree>
+      <p:nvGrpSpPr>
+        <p:cNvPr id="1" name=""/>
+        <p:cNvGrpSpPr/>
+        <p:nvPr/>
+      </p:nvGrpSpPr>
+      <p:grpSpPr>
+        <a:xfrm>
+          <a:off x="0" y="0"/>
+          <a:ext cx="0" cy="0"/>
+          <a:chOff x="0" y="0"/>
+          <a:chExt cx="0" cy="0"/>
+        </a:xfrm>
+      </p:grpSpPr>
+      <p:sp>
+        <p:nvSpPr>
+          <p:cNvPr id="2" name="Slide Image Placeholder 1"/>
+          <p:cNvSpPr>
+            <a:spLocks noGrp="1" noRot="1" noChangeAspect="1"/>
+          </p:cNvSpPr>
+          <p:nvPr>
+            <p:ph type="sldImg"/>
+          </p:nvPr>
+        </p:nvSpPr>
+        <p:spPr/>
+      </p:sp>
+      <p:sp>
+        <p:nvSpPr>
+          <p:cNvPr id="3" name="Notes Placeholder 2"/>
+          <p:cNvSpPr>
+            <a:spLocks noGrp="1"/>
+          </p:cNvSpPr>
+          <p:nvPr>
+            <p:ph type="body" idx="1"/>
+          </p:nvPr>
+        </p:nvSpPr>
+        <p:spPr/>
+        <p:txBody>
+          <a:bodyPr/>
+          <a:lstStyle/>
+          <a:p>
+            <a:r>
+              <a:rPr lang="en-US" dirty="0"/>
+              <a:t>example:</a:t>
+            </a:r>
+            <a:r>
+              <a:rPr lang="en-US" baseline="0" dirty="0"/>
+              <a:t> validator2.html</a:t>
+            </a:r>
+            <a:endParaRPr lang="en-US" dirty="0"/>
+          </a:p>
+        </p:txBody>
+      </p:sp>
+      <p:sp>
+        <p:nvSpPr>
+          <p:cNvPr id="4" name="Slide Number Placeholder 3"/>
+          <p:cNvSpPr>
+            <a:spLocks noGrp="1"/>
+          </p:cNvSpPr>
+          <p:nvPr>
+            <p:ph type="sldNum" sz="quarter" idx="10"/>
+          </p:nvPr>
+        </p:nvSpPr>
+        <p:spPr/>
+        <p:txBody>
+          <a:bodyPr/>
+          <a:lstStyle/>
+          <a:p>
+            <a:fld id="{40F5A9F4-14AB-4E34-9372-28158D5523BB}" type="slidenum">
+              <a:rPr lang="en-US" smtClean="0"/>
+              <a:t>52</a:t>
             </a:fld>
             <a:endParaRPr lang="en-US"/>
           </a:p>
@@ -1165,9 +1728,9 @@
       </p:grpSpPr>
       <p:sp>
         <p:nvSpPr>
-          <p:cNvPr id="21506" name="Rectangle 2"/>
+          <p:cNvPr id="2" name="Slide Image Placeholder 1"/>
           <p:cNvSpPr>
-            <a:spLocks noGrp="1" noRot="1" noChangeAspect="1" noChangeArrowheads="1" noTextEdit="1"/>
+            <a:spLocks noGrp="1" noRot="1" noChangeAspect="1"/>
           </p:cNvSpPr>
           <p:nvPr>
             <p:ph type="sldImg"/>
@@ -1177,38 +1740,52 @@
       </p:sp>
       <p:sp>
         <p:nvSpPr>
-          <p:cNvPr id="21507" name="Rectangle 3"/>
+          <p:cNvPr id="3" name="Notes Placeholder 2"/>
           <p:cNvSpPr>
-            <a:spLocks noGrp="1" noChangeArrowheads="1"/>
+            <a:spLocks noGrp="1"/>
           </p:cNvSpPr>
           <p:nvPr>
             <p:ph type="body" idx="1"/>
           </p:nvPr>
         </p:nvSpPr>
-        <p:spPr bwMode="auto">
-          <a:xfrm>
-            <a:off x="686270" y="4344229"/>
-            <a:ext cx="5485463" cy="4114387"/>
-          </a:xfrm>
-          <a:prstGeom prst="rect">
-            <a:avLst/>
-          </a:prstGeom>
-          <a:noFill/>
-          <a:ln>
-            <a:miter lim="800000"/>
-            <a:headEnd/>
-            <a:tailEnd/>
-          </a:ln>
-        </p:spPr>
+        <p:spPr/>
         <p:txBody>
           <a:bodyPr/>
           <a:lstStyle/>
           <a:p>
+            <a:endParaRPr lang="en-US" dirty="0"/>
+          </a:p>
+        </p:txBody>
+      </p:sp>
+      <p:sp>
+        <p:nvSpPr>
+          <p:cNvPr id="4" name="Slide Number Placeholder 3"/>
+          <p:cNvSpPr>
+            <a:spLocks noGrp="1"/>
+          </p:cNvSpPr>
+          <p:nvPr>
+            <p:ph type="sldNum" sz="quarter" idx="10"/>
+          </p:nvPr>
+        </p:nvSpPr>
+        <p:spPr/>
+        <p:txBody>
+          <a:bodyPr/>
+          <a:lstStyle/>
+          <a:p>
+            <a:fld id="{40F5A9F4-14AB-4E34-9372-28158D5523BB}" type="slidenum">
+              <a:rPr lang="en-US" smtClean="0"/>
+              <a:t>7</a:t>
+            </a:fld>
             <a:endParaRPr lang="en-US"/>
           </a:p>
         </p:txBody>
       </p:sp>
     </p:spTree>
+    <p:extLst>
+      <p:ext uri="{BB962C8B-B14F-4D97-AF65-F5344CB8AC3E}">
+        <p14:creationId xmlns:p14="http://schemas.microsoft.com/office/powerpoint/2010/main" val="2132890448"/>
+      </p:ext>
+    </p:extLst>
   </p:cSld>
   <p:clrMapOvr>
     <a:masterClrMapping/>
@@ -1305,7 +1882,7 @@
       </p:grpSpPr>
       <p:sp>
         <p:nvSpPr>
-          <p:cNvPr id="23554" name="Rectangle 2"/>
+          <p:cNvPr id="21506" name="Rectangle 2"/>
           <p:cNvSpPr>
             <a:spLocks noGrp="1" noRot="1" noChangeAspect="1" noChangeArrowheads="1" noTextEdit="1"/>
           </p:cNvSpPr>
@@ -1317,7 +1894,7 @@
       </p:sp>
       <p:sp>
         <p:nvSpPr>
-          <p:cNvPr id="23555" name="Rectangle 3"/>
+          <p:cNvPr id="21507" name="Rectangle 3"/>
           <p:cNvSpPr>
             <a:spLocks noGrp="1" noChangeArrowheads="1"/>
           </p:cNvSpPr>
@@ -1344,7 +1921,7 @@
           <a:bodyPr/>
           <a:lstStyle/>
           <a:p>
-            <a:endParaRPr lang="en-US" dirty="0"/>
+            <a:endParaRPr lang="en-US"/>
           </a:p>
         </p:txBody>
       </p:sp>
@@ -1515,7 +2092,7 @@
       </p:grpSpPr>
       <p:sp>
         <p:nvSpPr>
-          <p:cNvPr id="24578" name="Rectangle 2"/>
+          <p:cNvPr id="23554" name="Rectangle 2"/>
           <p:cNvSpPr>
             <a:spLocks noGrp="1" noRot="1" noChangeAspect="1" noChangeArrowheads="1" noTextEdit="1"/>
           </p:cNvSpPr>
@@ -1527,7 +2104,7 @@
       </p:sp>
       <p:sp>
         <p:nvSpPr>
-          <p:cNvPr id="24579" name="Rectangle 3"/>
+          <p:cNvPr id="23555" name="Rectangle 3"/>
           <p:cNvSpPr>
             <a:spLocks noGrp="1" noChangeArrowheads="1"/>
           </p:cNvSpPr>
@@ -1554,7 +2131,7 @@
           <a:bodyPr/>
           <a:lstStyle/>
           <a:p>
-            <a:endParaRPr lang="en-US"/>
+            <a:endParaRPr lang="en-US" dirty="0"/>
           </a:p>
         </p:txBody>
       </p:sp>
@@ -1695,7 +2272,7 @@
           <a:p>
             <a:fld id="{FB7712AD-3B21-4FE9-B722-CF9B0200D9B9}" type="datetimeFigureOut">
               <a:rPr lang="en-US" smtClean="0"/>
-              <a:t>10/2/2017</a:t>
+              <a:t>10/4/2017</a:t>
             </a:fld>
             <a:endParaRPr lang="en-US"/>
           </a:p>
@@ -1875,7 +2452,7 @@
           <a:p>
             <a:fld id="{FB7712AD-3B21-4FE9-B722-CF9B0200D9B9}" type="datetimeFigureOut">
               <a:rPr lang="en-US" smtClean="0"/>
-              <a:t>10/2/2017</a:t>
+              <a:t>10/4/2017</a:t>
             </a:fld>
             <a:endParaRPr lang="en-US"/>
           </a:p>
@@ -2065,7 +2642,7 @@
           <a:p>
             <a:fld id="{FB7712AD-3B21-4FE9-B722-CF9B0200D9B9}" type="datetimeFigureOut">
               <a:rPr lang="en-US" smtClean="0"/>
-              <a:t>10/2/2017</a:t>
+              <a:t>10/4/2017</a:t>
             </a:fld>
             <a:endParaRPr lang="en-US"/>
           </a:p>
@@ -2281,7 +2858,7 @@
           <a:p>
             <a:fld id="{5FB62F81-FD80-4AA8-93CA-E835B40BE667}" type="datetimeFigureOut">
               <a:rPr lang="en-US" smtClean="0"/>
-              <a:t>10/2/2017</a:t>
+              <a:t>10/4/2017</a:t>
             </a:fld>
             <a:endParaRPr lang="en-US"/>
           </a:p>
@@ -2479,7 +3056,7 @@
           <a:p>
             <a:fld id="{5FB62F81-FD80-4AA8-93CA-E835B40BE667}" type="datetimeFigureOut">
               <a:rPr lang="en-US" smtClean="0"/>
-              <a:t>10/2/2017</a:t>
+              <a:t>10/4/2017</a:t>
             </a:fld>
             <a:endParaRPr lang="en-US"/>
           </a:p>
@@ -2754,7 +3331,7 @@
           <a:p>
             <a:fld id="{5FB62F81-FD80-4AA8-93CA-E835B40BE667}" type="datetimeFigureOut">
               <a:rPr lang="en-US" smtClean="0"/>
-              <a:t>10/2/2017</a:t>
+              <a:t>10/4/2017</a:t>
             </a:fld>
             <a:endParaRPr lang="en-US"/>
           </a:p>
@@ -3019,7 +3596,7 @@
           <a:p>
             <a:fld id="{5FB62F81-FD80-4AA8-93CA-E835B40BE667}" type="datetimeFigureOut">
               <a:rPr lang="en-US" smtClean="0"/>
-              <a:t>10/2/2017</a:t>
+              <a:t>10/4/2017</a:t>
             </a:fld>
             <a:endParaRPr lang="en-US"/>
           </a:p>
@@ -3431,7 +4008,7 @@
           <a:p>
             <a:fld id="{5FB62F81-FD80-4AA8-93CA-E835B40BE667}" type="datetimeFigureOut">
               <a:rPr lang="en-US" smtClean="0"/>
-              <a:t>10/2/2017</a:t>
+              <a:t>10/4/2017</a:t>
             </a:fld>
             <a:endParaRPr lang="en-US"/>
           </a:p>
@@ -3572,7 +4149,7 @@
           <a:p>
             <a:fld id="{5FB62F81-FD80-4AA8-93CA-E835B40BE667}" type="datetimeFigureOut">
               <a:rPr lang="en-US" smtClean="0"/>
-              <a:t>10/2/2017</a:t>
+              <a:t>10/4/2017</a:t>
             </a:fld>
             <a:endParaRPr lang="en-US"/>
           </a:p>
@@ -3685,7 +4262,7 @@
           <a:p>
             <a:fld id="{5FB62F81-FD80-4AA8-93CA-E835B40BE667}" type="datetimeFigureOut">
               <a:rPr lang="en-US" smtClean="0"/>
-              <a:t>10/2/2017</a:t>
+              <a:t>10/4/2017</a:t>
             </a:fld>
             <a:endParaRPr lang="en-US"/>
           </a:p>
@@ -3996,7 +4573,7 @@
           <a:p>
             <a:fld id="{5FB62F81-FD80-4AA8-93CA-E835B40BE667}" type="datetimeFigureOut">
               <a:rPr lang="en-US" smtClean="0"/>
-              <a:t>10/2/2017</a:t>
+              <a:t>10/4/2017</a:t>
             </a:fld>
             <a:endParaRPr lang="en-US"/>
           </a:p>
@@ -4223,7 +4800,7 @@
           <a:p>
             <a:fld id="{FB7712AD-3B21-4FE9-B722-CF9B0200D9B9}" type="datetimeFigureOut">
               <a:rPr lang="en-US" smtClean="0"/>
-              <a:t>10/2/2017</a:t>
+              <a:t>10/4/2017</a:t>
             </a:fld>
             <a:endParaRPr lang="en-US"/>
           </a:p>
@@ -4507,7 +5084,7 @@
           <a:p>
             <a:fld id="{5FB62F81-FD80-4AA8-93CA-E835B40BE667}" type="datetimeFigureOut">
               <a:rPr lang="en-US" smtClean="0"/>
-              <a:t>10/2/2017</a:t>
+              <a:t>10/4/2017</a:t>
             </a:fld>
             <a:endParaRPr lang="en-US"/>
           </a:p>
@@ -4705,7 +5282,7 @@
           <a:p>
             <a:fld id="{5FB62F81-FD80-4AA8-93CA-E835B40BE667}" type="datetimeFigureOut">
               <a:rPr lang="en-US" smtClean="0"/>
-              <a:t>10/2/2017</a:t>
+              <a:t>10/4/2017</a:t>
             </a:fld>
             <a:endParaRPr lang="en-US"/>
           </a:p>
@@ -4913,7 +5490,7 @@
           <a:p>
             <a:fld id="{5FB62F81-FD80-4AA8-93CA-E835B40BE667}" type="datetimeFigureOut">
               <a:rPr lang="en-US" smtClean="0"/>
-              <a:t>10/2/2017</a:t>
+              <a:t>10/4/2017</a:t>
             </a:fld>
             <a:endParaRPr lang="en-US"/>
           </a:p>
@@ -5120,7 +5697,7 @@
           <a:p>
             <a:fld id="{FB7712AD-3B21-4FE9-B722-CF9B0200D9B9}" type="datetimeFigureOut">
               <a:rPr lang="en-US" smtClean="0"/>
-              <a:t>10/2/2017</a:t>
+              <a:t>10/4/2017</a:t>
             </a:fld>
             <a:endParaRPr lang="en-US"/>
           </a:p>
@@ -5417,7 +5994,7 @@
           <a:p>
             <a:fld id="{FB7712AD-3B21-4FE9-B722-CF9B0200D9B9}" type="datetimeFigureOut">
               <a:rPr lang="en-US" smtClean="0"/>
-              <a:t>10/2/2017</a:t>
+              <a:t>10/4/2017</a:t>
             </a:fld>
             <a:endParaRPr lang="en-US"/>
           </a:p>
@@ -5853,7 +6430,7 @@
           <a:p>
             <a:fld id="{FB7712AD-3B21-4FE9-B722-CF9B0200D9B9}" type="datetimeFigureOut">
               <a:rPr lang="en-US" smtClean="0"/>
-              <a:t>10/2/2017</a:t>
+              <a:t>10/4/2017</a:t>
             </a:fld>
             <a:endParaRPr lang="en-US"/>
           </a:p>
@@ -5982,7 +6559,7 @@
           <a:p>
             <a:fld id="{FB7712AD-3B21-4FE9-B722-CF9B0200D9B9}" type="datetimeFigureOut">
               <a:rPr lang="en-US" smtClean="0"/>
-              <a:t>10/2/2017</a:t>
+              <a:t>10/4/2017</a:t>
             </a:fld>
             <a:endParaRPr lang="en-US"/>
           </a:p>
@@ -6089,7 +6666,7 @@
           <a:p>
             <a:fld id="{FB7712AD-3B21-4FE9-B722-CF9B0200D9B9}" type="datetimeFigureOut">
               <a:rPr lang="en-US" smtClean="0"/>
-              <a:t>10/2/2017</a:t>
+              <a:t>10/4/2017</a:t>
             </a:fld>
             <a:endParaRPr lang="en-US"/>
           </a:p>
@@ -6376,7 +6953,7 @@
           <a:p>
             <a:fld id="{FB7712AD-3B21-4FE9-B722-CF9B0200D9B9}" type="datetimeFigureOut">
               <a:rPr lang="en-US" smtClean="0"/>
-              <a:t>10/2/2017</a:t>
+              <a:t>10/4/2017</a:t>
             </a:fld>
             <a:endParaRPr lang="en-US"/>
           </a:p>
@@ -6643,7 +7220,7 @@
           <a:p>
             <a:fld id="{FB7712AD-3B21-4FE9-B722-CF9B0200D9B9}" type="datetimeFigureOut">
               <a:rPr lang="en-US" smtClean="0"/>
-              <a:t>10/2/2017</a:t>
+              <a:t>10/4/2017</a:t>
             </a:fld>
             <a:endParaRPr lang="en-US"/>
           </a:p>
@@ -6969,7 +7546,7 @@
           <a:p>
             <a:fld id="{FB7712AD-3B21-4FE9-B722-CF9B0200D9B9}" type="datetimeFigureOut">
               <a:rPr lang="en-US" smtClean="0"/>
-              <a:t>10/2/2017</a:t>
+              <a:t>10/4/2017</a:t>
             </a:fld>
             <a:endParaRPr lang="en-US"/>
           </a:p>
@@ -7668,7 +8245,7 @@
           <a:p>
             <a:fld id="{5FB62F81-FD80-4AA8-93CA-E835B40BE667}" type="datetimeFigureOut">
               <a:rPr lang="en-US" smtClean="0"/>
-              <a:t>10/2/2017</a:t>
+              <a:t>10/4/2017</a:t>
             </a:fld>
             <a:endParaRPr lang="en-US"/>
           </a:p>
@@ -14515,7 +15092,7 @@
             <a:r>
               <a:rPr lang="en-US" dirty="0">
                 <a:cs typeface="Calibri" panose="020F0502020204030204" pitchFamily="34" charset="0"/>
-                <a:hlinkClick r:id="rId2" action="ppaction://hlinkfile"/>
+                <a:hlinkClick r:id="rId3"/>
               </a:rPr>
               <a:t>[link]</a:t>
             </a:r>
@@ -15685,7 +16262,7 @@
             <a:r>
               <a:rPr lang="en-US" dirty="0">
                 <a:cs typeface="Calibri" panose="020F0502020204030204" pitchFamily="34" charset="0"/>
-                <a:hlinkClick r:id="rId2" action="ppaction://hlinkfile"/>
+                <a:hlinkClick r:id="rId3"/>
               </a:rPr>
               <a:t>[link]</a:t>
             </a:r>
@@ -15766,7 +16343,7 @@
           <a:p>
             <a:r>
               <a:rPr lang="en-US" sz="3600" dirty="0"/>
-              <a:t>End of Session 15</a:t>
+              <a:t>Start Session 16</a:t>
             </a:r>
           </a:p>
         </p:txBody>
@@ -17247,21 +17824,39 @@
             <a:pPr algn="ctr"/>
             <a:r>
               <a:rPr lang="en-US" dirty="0">
-                <a:latin typeface="Consolas" panose="020B0609020204030204" pitchFamily="49" charset="0"/>
-                <a:cs typeface="Consolas" panose="020B0609020204030204" pitchFamily="49" charset="0"/>
-              </a:rPr>
-              <a:t>pswd_chk.html</a:t>
-            </a:r>
+                <a:cs typeface="Calibri" panose="020F0502020204030204" pitchFamily="34" charset="0"/>
+              </a:rPr>
+              <a:t>pswd_chk.html </a:t>
+            </a:r>
+            <a:r>
+              <a:rPr lang="en-US" dirty="0">
+                <a:cs typeface="Calibri" panose="020F0502020204030204" pitchFamily="34" charset="0"/>
+                <a:hlinkClick r:id="rId3"/>
+              </a:rPr>
+              <a:t>[link]</a:t>
+            </a:r>
+            <a:endParaRPr lang="en-US" dirty="0">
+              <a:cs typeface="Calibri" panose="020F0502020204030204" pitchFamily="34" charset="0"/>
+            </a:endParaRPr>
           </a:p>
           <a:p>
             <a:pPr algn="ctr"/>
             <a:r>
               <a:rPr lang="en-US" dirty="0">
-                <a:latin typeface="Consolas" panose="020B0609020204030204" pitchFamily="49" charset="0"/>
-                <a:cs typeface="Consolas" panose="020B0609020204030204" pitchFamily="49" charset="0"/>
-              </a:rPr>
-              <a:t>validator.html</a:t>
-            </a:r>
+                <a:cs typeface="Calibri" panose="020F0502020204030204" pitchFamily="34" charset="0"/>
+              </a:rPr>
+              <a:t>validator.html </a:t>
+            </a:r>
+            <a:r>
+              <a:rPr lang="en-US" dirty="0">
+                <a:cs typeface="Calibri" panose="020F0502020204030204" pitchFamily="34" charset="0"/>
+                <a:hlinkClick r:id="rId4"/>
+              </a:rPr>
+              <a:t>[link]</a:t>
+            </a:r>
+            <a:endParaRPr lang="en-US" dirty="0">
+              <a:cs typeface="Calibri" panose="020F0502020204030204" pitchFamily="34" charset="0"/>
+            </a:endParaRPr>
           </a:p>
         </p:txBody>
       </p:sp>
@@ -20039,21 +20634,39 @@
             <a:pPr algn="ctr"/>
             <a:r>
               <a:rPr lang="en-US" dirty="0">
-                <a:latin typeface="Consolas" panose="020B0609020204030204" pitchFamily="49" charset="0"/>
-                <a:cs typeface="Consolas" panose="020B0609020204030204" pitchFamily="49" charset="0"/>
-              </a:rPr>
-              <a:t>radio_click.html</a:t>
-            </a:r>
+                <a:cs typeface="Calibri" panose="020F0502020204030204" pitchFamily="34" charset="0"/>
+              </a:rPr>
+              <a:t>radio_click.html </a:t>
+            </a:r>
+            <a:r>
+              <a:rPr lang="en-US" dirty="0">
+                <a:cs typeface="Calibri" panose="020F0502020204030204" pitchFamily="34" charset="0"/>
+                <a:hlinkClick r:id="rId3"/>
+              </a:rPr>
+              <a:t>[link]</a:t>
+            </a:r>
+            <a:endParaRPr lang="en-US" dirty="0">
+              <a:cs typeface="Calibri" panose="020F0502020204030204" pitchFamily="34" charset="0"/>
+            </a:endParaRPr>
           </a:p>
           <a:p>
             <a:pPr algn="ctr"/>
             <a:r>
               <a:rPr lang="en-US" dirty="0">
-                <a:latin typeface="Consolas" panose="020B0609020204030204" pitchFamily="49" charset="0"/>
-                <a:cs typeface="Consolas" panose="020B0609020204030204" pitchFamily="49" charset="0"/>
-              </a:rPr>
-              <a:t>radio_click2.html</a:t>
-            </a:r>
+                <a:cs typeface="Calibri" panose="020F0502020204030204" pitchFamily="34" charset="0"/>
+              </a:rPr>
+              <a:t>radio_click2.html </a:t>
+            </a:r>
+            <a:r>
+              <a:rPr lang="en-US" dirty="0">
+                <a:cs typeface="Calibri" panose="020F0502020204030204" pitchFamily="34" charset="0"/>
+                <a:hlinkClick r:id="rId4"/>
+              </a:rPr>
+              <a:t>[link]</a:t>
+            </a:r>
+            <a:endParaRPr lang="en-US" dirty="0">
+              <a:cs typeface="Calibri" panose="020F0502020204030204" pitchFamily="34" charset="0"/>
+            </a:endParaRPr>
           </a:p>
           <a:p>
             <a:pPr algn="ctr"/>
@@ -20085,6 +20698,112 @@
 </file>
 
 <file path=ppt/slides/slide36.xml><?xml version="1.0" encoding="utf-8"?>
+<p:sld xmlns:a="http://schemas.openxmlformats.org/drawingml/2006/main" xmlns:r="http://schemas.openxmlformats.org/officeDocument/2006/relationships" xmlns:p="http://schemas.openxmlformats.org/presentationml/2006/main">
+  <p:cSld>
+    <p:bg>
+      <p:bgPr>
+        <a:solidFill>
+          <a:schemeClr val="bg1">
+            <a:lumMod val="75000"/>
+          </a:schemeClr>
+        </a:solidFill>
+        <a:effectLst/>
+      </p:bgPr>
+    </p:bg>
+    <p:spTree>
+      <p:nvGrpSpPr>
+        <p:cNvPr id="1" name=""/>
+        <p:cNvGrpSpPr/>
+        <p:nvPr/>
+      </p:nvGrpSpPr>
+      <p:grpSpPr>
+        <a:xfrm>
+          <a:off x="0" y="0"/>
+          <a:ext cx="0" cy="0"/>
+          <a:chOff x="0" y="0"/>
+          <a:chExt cx="0" cy="0"/>
+        </a:xfrm>
+      </p:grpSpPr>
+      <p:sp>
+        <p:nvSpPr>
+          <p:cNvPr id="2" name="Title 1"/>
+          <p:cNvSpPr>
+            <a:spLocks noGrp="1"/>
+          </p:cNvSpPr>
+          <p:nvPr>
+            <p:ph type="ctrTitle"/>
+          </p:nvPr>
+        </p:nvSpPr>
+        <p:spPr>
+          <a:xfrm>
+            <a:off x="1143000" y="1699022"/>
+            <a:ext cx="6858000" cy="1790700"/>
+          </a:xfrm>
+        </p:spPr>
+        <p:txBody>
+          <a:bodyPr>
+            <a:normAutofit/>
+          </a:bodyPr>
+          <a:lstStyle/>
+          <a:p>
+            <a:r>
+              <a:rPr lang="en-US" sz="3600" dirty="0"/>
+              <a:t>End of Session 16</a:t>
+            </a:r>
+          </a:p>
+        </p:txBody>
+      </p:sp>
+      <p:sp>
+        <p:nvSpPr>
+          <p:cNvPr id="3" name="Subtitle 2"/>
+          <p:cNvSpPr>
+            <a:spLocks noGrp="1"/>
+          </p:cNvSpPr>
+          <p:nvPr>
+            <p:ph type="subTitle" idx="1"/>
+          </p:nvPr>
+        </p:nvSpPr>
+        <p:spPr>
+          <a:xfrm>
+            <a:off x="1143000" y="3558778"/>
+            <a:ext cx="6858000" cy="1648517"/>
+          </a:xfrm>
+        </p:spPr>
+        <p:txBody>
+          <a:bodyPr>
+            <a:normAutofit/>
+          </a:bodyPr>
+          <a:lstStyle/>
+          <a:p>
+            <a:pPr algn="l"/>
+            <a:r>
+              <a:rPr lang="en-US" dirty="0"/>
+              <a:t>Course Number: CPSC-24700</a:t>
+            </a:r>
+          </a:p>
+          <a:p>
+            <a:pPr algn="l"/>
+            <a:r>
+              <a:rPr lang="en-US" dirty="0"/>
+              <a:t>Instructor: Eric Pogue</a:t>
+            </a:r>
+          </a:p>
+        </p:txBody>
+      </p:sp>
+    </p:spTree>
+    <p:extLst>
+      <p:ext uri="{BB962C8B-B14F-4D97-AF65-F5344CB8AC3E}">
+        <p14:creationId xmlns:p14="http://schemas.microsoft.com/office/powerpoint/2010/main" val="2567981252"/>
+      </p:ext>
+    </p:extLst>
+  </p:cSld>
+  <p:clrMapOvr>
+    <a:masterClrMapping/>
+  </p:clrMapOvr>
+</p:sld>
+</file>
+
+<file path=ppt/slides/slide37.xml><?xml version="1.0" encoding="utf-8"?>
 <p:sld xmlns:a="http://schemas.openxmlformats.org/drawingml/2006/main" xmlns:r="http://schemas.openxmlformats.org/officeDocument/2006/relationships" xmlns:p="http://schemas.openxmlformats.org/presentationml/2006/main">
   <p:cSld>
     <p:spTree>
@@ -20382,7 +21101,7 @@
             <a:fld id="{9648F39E-9C37-485F-AC97-16BB4BDF9F49}" type="slidenum">
               <a:rPr kumimoji="0" lang="en-US" smtClean="0"/>
               <a:pPr/>
-              <a:t>36</a:t>
+              <a:t>37</a:t>
             </a:fld>
             <a:endParaRPr kumimoji="0" lang="en-US"/>
           </a:p>
@@ -20826,7 +21545,7 @@
 </p:sld>
 </file>
 
-<file path=ppt/slides/slide37.xml><?xml version="1.0" encoding="utf-8"?>
+<file path=ppt/slides/slide38.xml><?xml version="1.0" encoding="utf-8"?>
 <p:sld xmlns:a="http://schemas.openxmlformats.org/drawingml/2006/main" xmlns:r="http://schemas.openxmlformats.org/officeDocument/2006/relationships" xmlns:p="http://schemas.openxmlformats.org/presentationml/2006/main">
   <p:cSld>
     <p:spTree>
@@ -20918,7 +21637,7 @@
 </p:sld>
 </file>
 
-<file path=ppt/slides/slide38.xml><?xml version="1.0" encoding="utf-8"?>
+<file path=ppt/slides/slide39.xml><?xml version="1.0" encoding="utf-8"?>
 <p:sld xmlns:a="http://schemas.openxmlformats.org/drawingml/2006/main" xmlns:r="http://schemas.openxmlformats.org/officeDocument/2006/relationships" xmlns:p="http://schemas.openxmlformats.org/presentationml/2006/main">
   <p:cSld>
     <p:spTree>
@@ -20970,7 +21689,59 @@
 </p:sld>
 </file>
 
-<file path=ppt/slides/slide39.xml><?xml version="1.0" encoding="utf-8"?>
+<file path=ppt/slides/slide4.xml><?xml version="1.0" encoding="utf-8"?>
+<p:sld xmlns:a="http://schemas.openxmlformats.org/drawingml/2006/main" xmlns:r="http://schemas.openxmlformats.org/officeDocument/2006/relationships" xmlns:p="http://schemas.openxmlformats.org/presentationml/2006/main">
+  <p:cSld>
+    <p:spTree>
+      <p:nvGrpSpPr>
+        <p:cNvPr id="1" name=""/>
+        <p:cNvGrpSpPr/>
+        <p:nvPr/>
+      </p:nvGrpSpPr>
+      <p:grpSpPr>
+        <a:xfrm>
+          <a:off x="0" y="0"/>
+          <a:ext cx="0" cy="0"/>
+          <a:chOff x="0" y="0"/>
+          <a:chExt cx="0" cy="0"/>
+        </a:xfrm>
+      </p:grpSpPr>
+      <p:sp>
+        <p:nvSpPr>
+          <p:cNvPr id="4" name="Title 3"/>
+          <p:cNvSpPr>
+            <a:spLocks noGrp="1"/>
+          </p:cNvSpPr>
+          <p:nvPr>
+            <p:ph type="ctrTitle"/>
+          </p:nvPr>
+        </p:nvSpPr>
+        <p:spPr/>
+        <p:txBody>
+          <a:bodyPr/>
+          <a:lstStyle/>
+          <a:p>
+            <a:r>
+              <a:rPr lang="en-US" b="1" dirty="0"/>
+              <a:t>Document Object Model</a:t>
+            </a:r>
+          </a:p>
+        </p:txBody>
+      </p:sp>
+    </p:spTree>
+    <p:extLst>
+      <p:ext uri="{BB962C8B-B14F-4D97-AF65-F5344CB8AC3E}">
+        <p14:creationId xmlns:p14="http://schemas.microsoft.com/office/powerpoint/2010/main" val="3834091470"/>
+      </p:ext>
+    </p:extLst>
+  </p:cSld>
+  <p:clrMapOvr>
+    <a:masterClrMapping/>
+  </p:clrMapOvr>
+</p:sld>
+</file>
+
+<file path=ppt/slides/slide40.xml><?xml version="1.0" encoding="utf-8"?>
 <p:sld xmlns:a="http://schemas.openxmlformats.org/drawingml/2006/main" xmlns:r="http://schemas.openxmlformats.org/officeDocument/2006/relationships" xmlns:p="http://schemas.openxmlformats.org/presentationml/2006/main">
   <p:cSld>
     <p:spTree>
@@ -21259,7 +22030,7 @@
             <a:fld id="{9648F39E-9C37-485F-AC97-16BB4BDF9F49}" type="slidenum">
               <a:rPr kumimoji="0" lang="en-US" smtClean="0"/>
               <a:pPr/>
-              <a:t>39</a:t>
+              <a:t>40</a:t>
             </a:fld>
             <a:endParaRPr kumimoji="0" lang="en-US"/>
           </a:p>
@@ -21556,59 +22327,7 @@
 </p:sld>
 </file>
 
-<file path=ppt/slides/slide4.xml><?xml version="1.0" encoding="utf-8"?>
-<p:sld xmlns:a="http://schemas.openxmlformats.org/drawingml/2006/main" xmlns:r="http://schemas.openxmlformats.org/officeDocument/2006/relationships" xmlns:p="http://schemas.openxmlformats.org/presentationml/2006/main">
-  <p:cSld>
-    <p:spTree>
-      <p:nvGrpSpPr>
-        <p:cNvPr id="1" name=""/>
-        <p:cNvGrpSpPr/>
-        <p:nvPr/>
-      </p:nvGrpSpPr>
-      <p:grpSpPr>
-        <a:xfrm>
-          <a:off x="0" y="0"/>
-          <a:ext cx="0" cy="0"/>
-          <a:chOff x="0" y="0"/>
-          <a:chExt cx="0" cy="0"/>
-        </a:xfrm>
-      </p:grpSpPr>
-      <p:sp>
-        <p:nvSpPr>
-          <p:cNvPr id="4" name="Title 3"/>
-          <p:cNvSpPr>
-            <a:spLocks noGrp="1"/>
-          </p:cNvSpPr>
-          <p:nvPr>
-            <p:ph type="ctrTitle"/>
-          </p:nvPr>
-        </p:nvSpPr>
-        <p:spPr/>
-        <p:txBody>
-          <a:bodyPr/>
-          <a:lstStyle/>
-          <a:p>
-            <a:r>
-              <a:rPr lang="en-US" b="1" dirty="0"/>
-              <a:t>Document Object Model</a:t>
-            </a:r>
-          </a:p>
-        </p:txBody>
-      </p:sp>
-    </p:spTree>
-    <p:extLst>
-      <p:ext uri="{BB962C8B-B14F-4D97-AF65-F5344CB8AC3E}">
-        <p14:creationId xmlns:p14="http://schemas.microsoft.com/office/powerpoint/2010/main" val="3834091470"/>
-      </p:ext>
-    </p:extLst>
-  </p:cSld>
-  <p:clrMapOvr>
-    <a:masterClrMapping/>
-  </p:clrMapOvr>
-</p:sld>
-</file>
-
-<file path=ppt/slides/slide40.xml><?xml version="1.0" encoding="utf-8"?>
+<file path=ppt/slides/slide41.xml><?xml version="1.0" encoding="utf-8"?>
 <p:sld xmlns:a="http://schemas.openxmlformats.org/drawingml/2006/main" xmlns:r="http://schemas.openxmlformats.org/officeDocument/2006/relationships" xmlns:p="http://schemas.openxmlformats.org/presentationml/2006/main">
   <p:cSld>
     <p:spTree>
@@ -21720,7 +22439,7 @@
 </p:sld>
 </file>
 
-<file path=ppt/slides/slide41.xml><?xml version="1.0" encoding="utf-8"?>
+<file path=ppt/slides/slide42.xml><?xml version="1.0" encoding="utf-8"?>
 <p:sld xmlns:a="http://schemas.openxmlformats.org/drawingml/2006/main" xmlns:r="http://schemas.openxmlformats.org/officeDocument/2006/relationships" xmlns:p="http://schemas.openxmlformats.org/presentationml/2006/main">
   <p:cSld>
     <p:spTree>
@@ -21772,7 +22491,7 @@
 </p:sld>
 </file>
 
-<file path=ppt/slides/slide42.xml><?xml version="1.0" encoding="utf-8"?>
+<file path=ppt/slides/slide43.xml><?xml version="1.0" encoding="utf-8"?>
 <p:sld xmlns:a="http://schemas.openxmlformats.org/drawingml/2006/main" xmlns:r="http://schemas.openxmlformats.org/officeDocument/2006/relationships" xmlns:p="http://schemas.openxmlformats.org/presentationml/2006/main">
   <p:cSld>
     <p:spTree>
@@ -21972,7 +22691,7 @@
             <a:fld id="{9648F39E-9C37-485F-AC97-16BB4BDF9F49}" type="slidenum">
               <a:rPr kumimoji="0" lang="en-US" smtClean="0"/>
               <a:pPr/>
-              <a:t>42</a:t>
+              <a:t>43</a:t>
             </a:fld>
             <a:endParaRPr kumimoji="0" lang="en-US"/>
           </a:p>
@@ -22308,7 +23027,7 @@
 </p:sld>
 </file>
 
-<file path=ppt/slides/slide43.xml><?xml version="1.0" encoding="utf-8"?>
+<file path=ppt/slides/slide44.xml><?xml version="1.0" encoding="utf-8"?>
 <p:sld xmlns:a="http://schemas.openxmlformats.org/drawingml/2006/main" xmlns:r="http://schemas.openxmlformats.org/officeDocument/2006/relationships" xmlns:p="http://schemas.openxmlformats.org/presentationml/2006/main">
   <p:cSld>
     <p:spTree>
@@ -22634,7 +23353,7 @@
             <a:fld id="{9648F39E-9C37-485F-AC97-16BB4BDF9F49}" type="slidenum">
               <a:rPr kumimoji="0" lang="en-US" smtClean="0"/>
               <a:pPr/>
-              <a:t>43</a:t>
+              <a:t>44</a:t>
             </a:fld>
             <a:endParaRPr kumimoji="0" lang="en-US"/>
           </a:p>
@@ -22931,7 +23650,7 @@
 </p:sld>
 </file>
 
-<file path=ppt/slides/slide44.xml><?xml version="1.0" encoding="utf-8"?>
+<file path=ppt/slides/slide45.xml><?xml version="1.0" encoding="utf-8"?>
 <p:sld xmlns:a="http://schemas.openxmlformats.org/drawingml/2006/main" xmlns:r="http://schemas.openxmlformats.org/officeDocument/2006/relationships" xmlns:p="http://schemas.openxmlformats.org/presentationml/2006/main">
   <p:cSld>
     <p:spTree>
@@ -22983,7 +23702,7 @@
 </p:sld>
 </file>
 
-<file path=ppt/slides/slide45.xml><?xml version="1.0" encoding="utf-8"?>
+<file path=ppt/slides/slide46.xml><?xml version="1.0" encoding="utf-8"?>
 <p:sld xmlns:a="http://schemas.openxmlformats.org/drawingml/2006/main" xmlns:r="http://schemas.openxmlformats.org/officeDocument/2006/relationships" xmlns:p="http://schemas.openxmlformats.org/presentationml/2006/main">
   <p:cSld>
     <p:spTree>
@@ -23336,7 +24055,7 @@
 </p:sld>
 </file>
 
-<file path=ppt/slides/slide46.xml><?xml version="1.0" encoding="utf-8"?>
+<file path=ppt/slides/slide47.xml><?xml version="1.0" encoding="utf-8"?>
 <p:sld xmlns:a="http://schemas.openxmlformats.org/drawingml/2006/main" xmlns:r="http://schemas.openxmlformats.org/officeDocument/2006/relationships" xmlns:p="http://schemas.openxmlformats.org/presentationml/2006/main">
   <p:cSld>
     <p:spTree>
@@ -23715,7 +24434,7 @@
 </p:sld>
 </file>
 
-<file path=ppt/slides/slide47.xml><?xml version="1.0" encoding="utf-8"?>
+<file path=ppt/slides/slide48.xml><?xml version="1.0" encoding="utf-8"?>
 <p:sld xmlns:a="http://schemas.openxmlformats.org/drawingml/2006/main" xmlns:r="http://schemas.openxmlformats.org/officeDocument/2006/relationships" xmlns:p="http://schemas.openxmlformats.org/presentationml/2006/main">
   <p:cSld>
     <p:spTree>
@@ -24312,7 +25031,7 @@
 </p:sld>
 </file>
 
-<file path=ppt/slides/slide48.xml><?xml version="1.0" encoding="utf-8"?>
+<file path=ppt/slides/slide49.xml><?xml version="1.0" encoding="utf-8"?>
 <p:sld xmlns:a="http://schemas.openxmlformats.org/drawingml/2006/main" xmlns:r="http://schemas.openxmlformats.org/officeDocument/2006/relationships" xmlns:p="http://schemas.openxmlformats.org/presentationml/2006/main">
   <p:cSld>
     <p:spTree>
@@ -24424,7 +25143,325 @@
 </p:sld>
 </file>
 
-<file path=ppt/slides/slide49.xml><?xml version="1.0" encoding="utf-8"?>
+<file path=ppt/slides/slide5.xml><?xml version="1.0" encoding="utf-8"?>
+<p:sld xmlns:a="http://schemas.openxmlformats.org/drawingml/2006/main" xmlns:r="http://schemas.openxmlformats.org/officeDocument/2006/relationships" xmlns:p="http://schemas.openxmlformats.org/presentationml/2006/main">
+  <p:cSld>
+    <p:spTree>
+      <p:nvGrpSpPr>
+        <p:cNvPr id="1" name=""/>
+        <p:cNvGrpSpPr/>
+        <p:nvPr/>
+      </p:nvGrpSpPr>
+      <p:grpSpPr>
+        <a:xfrm>
+          <a:off x="0" y="0"/>
+          <a:ext cx="0" cy="0"/>
+          <a:chOff x="0" y="0"/>
+          <a:chExt cx="0" cy="0"/>
+        </a:xfrm>
+      </p:grpSpPr>
+      <p:sp>
+        <p:nvSpPr>
+          <p:cNvPr id="5" name="Title 4"/>
+          <p:cNvSpPr>
+            <a:spLocks noGrp="1"/>
+          </p:cNvSpPr>
+          <p:nvPr>
+            <p:ph type="title"/>
+          </p:nvPr>
+        </p:nvSpPr>
+        <p:spPr/>
+        <p:txBody>
+          <a:bodyPr/>
+          <a:lstStyle/>
+          <a:p>
+            <a:r>
+              <a:rPr lang="en-US" dirty="0"/>
+              <a:t>The Document Object Model</a:t>
+            </a:r>
+          </a:p>
+        </p:txBody>
+      </p:sp>
+      <p:sp>
+        <p:nvSpPr>
+          <p:cNvPr id="6" name="Content Placeholder 5"/>
+          <p:cNvSpPr>
+            <a:spLocks noGrp="1"/>
+          </p:cNvSpPr>
+          <p:nvPr>
+            <p:ph idx="1"/>
+          </p:nvPr>
+        </p:nvSpPr>
+        <p:spPr>
+          <a:xfrm>
+            <a:off x="685800" y="1219200"/>
+            <a:ext cx="7772400" cy="4648200"/>
+          </a:xfrm>
+        </p:spPr>
+        <p:txBody>
+          <a:bodyPr>
+            <a:normAutofit/>
+          </a:bodyPr>
+          <a:lstStyle/>
+          <a:p>
+            <a:r>
+              <a:rPr lang="en-US" dirty="0"/>
+              <a:t>The </a:t>
+            </a:r>
+            <a:r>
+              <a:rPr lang="en-US" b="1" i="1" dirty="0">
+                <a:solidFill>
+                  <a:srgbClr val="FF0000"/>
+                </a:solidFill>
+              </a:rPr>
+              <a:t>Document Object Model (DOM) </a:t>
+            </a:r>
+            <a:r>
+              <a:rPr lang="en-US" dirty="0"/>
+              <a:t>is an abstract model that defines the interface between HTML documents and application programs—an API</a:t>
+            </a:r>
+          </a:p>
+          <a:p>
+            <a:endParaRPr lang="en-US" dirty="0"/>
+          </a:p>
+          <a:p>
+            <a:r>
+              <a:rPr lang="en-US" dirty="0"/>
+              <a:t>Documents in the DOM have a </a:t>
+            </a:r>
+            <a:r>
+              <a:rPr lang="en-US" dirty="0">
+                <a:solidFill>
+                  <a:srgbClr val="7030A0"/>
+                </a:solidFill>
+              </a:rPr>
+              <a:t>treelike structure</a:t>
+            </a:r>
+          </a:p>
+          <a:p>
+            <a:endParaRPr lang="en-US" dirty="0"/>
+          </a:p>
+          <a:p>
+            <a:endParaRPr lang="en-US" dirty="0"/>
+          </a:p>
+          <a:p>
+            <a:endParaRPr lang="en-US" dirty="0"/>
+          </a:p>
+          <a:p>
+            <a:endParaRPr lang="en-US" dirty="0"/>
+          </a:p>
+        </p:txBody>
+      </p:sp>
+      <p:sp>
+        <p:nvSpPr>
+          <p:cNvPr id="4" name="Slide Number Placeholder 3"/>
+          <p:cNvSpPr>
+            <a:spLocks noGrp="1"/>
+          </p:cNvSpPr>
+          <p:nvPr>
+            <p:ph type="sldNum" sz="quarter" idx="12"/>
+          </p:nvPr>
+        </p:nvSpPr>
+        <p:spPr/>
+        <p:txBody>
+          <a:bodyPr/>
+          <a:lstStyle/>
+          <a:p>
+            <a:fld id="{9648F39E-9C37-485F-AC97-16BB4BDF9F49}" type="slidenum">
+              <a:rPr kumimoji="0" lang="en-US" smtClean="0"/>
+              <a:pPr/>
+              <a:t>5</a:t>
+            </a:fld>
+            <a:endParaRPr kumimoji="0" lang="en-US" dirty="0"/>
+          </a:p>
+        </p:txBody>
+      </p:sp>
+      <p:pic>
+        <p:nvPicPr>
+          <p:cNvPr id="1026" name="Picture 2" descr="DOM HTML tree"/>
+          <p:cNvPicPr>
+            <a:picLocks noChangeAspect="1" noChangeArrowheads="1"/>
+          </p:cNvPicPr>
+          <p:nvPr/>
+        </p:nvPicPr>
+        <p:blipFill>
+          <a:blip r:embed="rId3">
+            <a:extLst>
+              <a:ext uri="{28A0092B-C50C-407E-A947-70E740481C1C}">
+                <a14:useLocalDpi xmlns:a14="http://schemas.microsoft.com/office/drawing/2010/main" val="0"/>
+              </a:ext>
+            </a:extLst>
+          </a:blip>
+          <a:srcRect/>
+          <a:stretch>
+            <a:fillRect/>
+          </a:stretch>
+        </p:blipFill>
+        <p:spPr bwMode="auto">
+          <a:xfrm>
+            <a:off x="1600200" y="3352800"/>
+            <a:ext cx="5791200" cy="3169670"/>
+          </a:xfrm>
+          <a:prstGeom prst="rect">
+            <a:avLst/>
+          </a:prstGeom>
+          <a:noFill/>
+          <a:extLst>
+            <a:ext uri="{909E8E84-426E-40DD-AFC4-6F175D3DCCD1}">
+              <a14:hiddenFill xmlns:a14="http://schemas.microsoft.com/office/drawing/2010/main">
+                <a:solidFill>
+                  <a:srgbClr val="FFFFFF"/>
+                </a:solidFill>
+              </a14:hiddenFill>
+            </a:ext>
+          </a:extLst>
+        </p:spPr>
+      </p:pic>
+    </p:spTree>
+    <p:extLst>
+      <p:ext uri="{BB962C8B-B14F-4D97-AF65-F5344CB8AC3E}">
+        <p14:creationId xmlns:p14="http://schemas.microsoft.com/office/powerpoint/2010/main" val="3288072464"/>
+      </p:ext>
+    </p:extLst>
+  </p:cSld>
+  <p:clrMapOvr>
+    <a:masterClrMapping/>
+  </p:clrMapOvr>
+  <p:timing>
+    <p:tnLst>
+      <p:par>
+        <p:cTn id="1" dur="indefinite" restart="never" nodeType="tmRoot">
+          <p:childTnLst>
+            <p:seq concurrent="1" nextAc="seek">
+              <p:cTn id="2" dur="indefinite" nodeType="mainSeq">
+                <p:childTnLst>
+                  <p:par>
+                    <p:cTn id="3" fill="hold">
+                      <p:stCondLst>
+                        <p:cond delay="indefinite"/>
+                      </p:stCondLst>
+                      <p:childTnLst>
+                        <p:par>
+                          <p:cTn id="4" fill="hold">
+                            <p:stCondLst>
+                              <p:cond delay="0"/>
+                            </p:stCondLst>
+                            <p:childTnLst>
+                              <p:par>
+                                <p:cTn id="5" presetID="1" presetClass="entr" presetSubtype="0" fill="hold" grpId="0" nodeType="clickEffect">
+                                  <p:stCondLst>
+                                    <p:cond delay="0"/>
+                                  </p:stCondLst>
+                                  <p:childTnLst>
+                                    <p:set>
+                                      <p:cBhvr>
+                                        <p:cTn id="6" dur="1" fill="hold">
+                                          <p:stCondLst>
+                                            <p:cond delay="0"/>
+                                          </p:stCondLst>
+                                        </p:cTn>
+                                        <p:tgtEl>
+                                          <p:spTgt spid="6">
+                                            <p:txEl>
+                                              <p:pRg st="0" end="0"/>
+                                            </p:txEl>
+                                          </p:spTgt>
+                                        </p:tgtEl>
+                                        <p:attrNameLst>
+                                          <p:attrName>style.visibility</p:attrName>
+                                        </p:attrNameLst>
+                                      </p:cBhvr>
+                                      <p:to>
+                                        <p:strVal val="visible"/>
+                                      </p:to>
+                                    </p:set>
+                                  </p:childTnLst>
+                                </p:cTn>
+                              </p:par>
+                            </p:childTnLst>
+                          </p:cTn>
+                        </p:par>
+                      </p:childTnLst>
+                    </p:cTn>
+                  </p:par>
+                  <p:par>
+                    <p:cTn id="7" fill="hold">
+                      <p:stCondLst>
+                        <p:cond delay="indefinite"/>
+                      </p:stCondLst>
+                      <p:childTnLst>
+                        <p:par>
+                          <p:cTn id="8" fill="hold">
+                            <p:stCondLst>
+                              <p:cond delay="0"/>
+                            </p:stCondLst>
+                            <p:childTnLst>
+                              <p:par>
+                                <p:cTn id="9" presetID="1" presetClass="entr" presetSubtype="0" fill="hold" grpId="0" nodeType="clickEffect">
+                                  <p:stCondLst>
+                                    <p:cond delay="0"/>
+                                  </p:stCondLst>
+                                  <p:childTnLst>
+                                    <p:set>
+                                      <p:cBhvr>
+                                        <p:cTn id="10" dur="1" fill="hold">
+                                          <p:stCondLst>
+                                            <p:cond delay="0"/>
+                                          </p:stCondLst>
+                                        </p:cTn>
+                                        <p:tgtEl>
+                                          <p:spTgt spid="6">
+                                            <p:txEl>
+                                              <p:pRg st="2" end="2"/>
+                                            </p:txEl>
+                                          </p:spTgt>
+                                        </p:tgtEl>
+                                        <p:attrNameLst>
+                                          <p:attrName>style.visibility</p:attrName>
+                                        </p:attrNameLst>
+                                      </p:cBhvr>
+                                      <p:to>
+                                        <p:strVal val="visible"/>
+                                      </p:to>
+                                    </p:set>
+                                  </p:childTnLst>
+                                </p:cTn>
+                              </p:par>
+                            </p:childTnLst>
+                          </p:cTn>
+                        </p:par>
+                      </p:childTnLst>
+                    </p:cTn>
+                  </p:par>
+                </p:childTnLst>
+              </p:cTn>
+              <p:prevCondLst>
+                <p:cond evt="onPrev" delay="0">
+                  <p:tgtEl>
+                    <p:sldTgt/>
+                  </p:tgtEl>
+                </p:cond>
+              </p:prevCondLst>
+              <p:nextCondLst>
+                <p:cond evt="onNext" delay="0">
+                  <p:tgtEl>
+                    <p:sldTgt/>
+                  </p:tgtEl>
+                </p:cond>
+              </p:nextCondLst>
+            </p:seq>
+          </p:childTnLst>
+        </p:cTn>
+      </p:par>
+    </p:tnLst>
+    <p:bldLst>
+      <p:bldP spid="6" grpId="0" build="p"/>
+    </p:bldLst>
+  </p:timing>
+</p:sld>
+</file>
+
+<file path=ppt/slides/slide50.xml><?xml version="1.0" encoding="utf-8"?>
 <p:sld xmlns:a="http://schemas.openxmlformats.org/drawingml/2006/main" xmlns:r="http://schemas.openxmlformats.org/officeDocument/2006/relationships" xmlns:p="http://schemas.openxmlformats.org/presentationml/2006/main">
   <p:cSld>
     <p:spTree>
@@ -24858,325 +25895,7 @@
 </p:sld>
 </file>
 
-<file path=ppt/slides/slide5.xml><?xml version="1.0" encoding="utf-8"?>
-<p:sld xmlns:a="http://schemas.openxmlformats.org/drawingml/2006/main" xmlns:r="http://schemas.openxmlformats.org/officeDocument/2006/relationships" xmlns:p="http://schemas.openxmlformats.org/presentationml/2006/main">
-  <p:cSld>
-    <p:spTree>
-      <p:nvGrpSpPr>
-        <p:cNvPr id="1" name=""/>
-        <p:cNvGrpSpPr/>
-        <p:nvPr/>
-      </p:nvGrpSpPr>
-      <p:grpSpPr>
-        <a:xfrm>
-          <a:off x="0" y="0"/>
-          <a:ext cx="0" cy="0"/>
-          <a:chOff x="0" y="0"/>
-          <a:chExt cx="0" cy="0"/>
-        </a:xfrm>
-      </p:grpSpPr>
-      <p:sp>
-        <p:nvSpPr>
-          <p:cNvPr id="5" name="Title 4"/>
-          <p:cNvSpPr>
-            <a:spLocks noGrp="1"/>
-          </p:cNvSpPr>
-          <p:nvPr>
-            <p:ph type="title"/>
-          </p:nvPr>
-        </p:nvSpPr>
-        <p:spPr/>
-        <p:txBody>
-          <a:bodyPr/>
-          <a:lstStyle/>
-          <a:p>
-            <a:r>
-              <a:rPr lang="en-US" dirty="0"/>
-              <a:t>The Document Object Model</a:t>
-            </a:r>
-          </a:p>
-        </p:txBody>
-      </p:sp>
-      <p:sp>
-        <p:nvSpPr>
-          <p:cNvPr id="6" name="Content Placeholder 5"/>
-          <p:cNvSpPr>
-            <a:spLocks noGrp="1"/>
-          </p:cNvSpPr>
-          <p:nvPr>
-            <p:ph idx="1"/>
-          </p:nvPr>
-        </p:nvSpPr>
-        <p:spPr>
-          <a:xfrm>
-            <a:off x="685800" y="1219200"/>
-            <a:ext cx="7772400" cy="4648200"/>
-          </a:xfrm>
-        </p:spPr>
-        <p:txBody>
-          <a:bodyPr>
-            <a:normAutofit/>
-          </a:bodyPr>
-          <a:lstStyle/>
-          <a:p>
-            <a:r>
-              <a:rPr lang="en-US" dirty="0"/>
-              <a:t>The </a:t>
-            </a:r>
-            <a:r>
-              <a:rPr lang="en-US" b="1" i="1" dirty="0">
-                <a:solidFill>
-                  <a:srgbClr val="FF0000"/>
-                </a:solidFill>
-              </a:rPr>
-              <a:t>Document Object Model (DOM) </a:t>
-            </a:r>
-            <a:r>
-              <a:rPr lang="en-US" dirty="0"/>
-              <a:t>is an abstract model that defines the interface between HTML documents and application programs—an API</a:t>
-            </a:r>
-          </a:p>
-          <a:p>
-            <a:endParaRPr lang="en-US" dirty="0"/>
-          </a:p>
-          <a:p>
-            <a:r>
-              <a:rPr lang="en-US" dirty="0"/>
-              <a:t>Documents in the DOM have a </a:t>
-            </a:r>
-            <a:r>
-              <a:rPr lang="en-US" dirty="0">
-                <a:solidFill>
-                  <a:srgbClr val="7030A0"/>
-                </a:solidFill>
-              </a:rPr>
-              <a:t>treelike structure</a:t>
-            </a:r>
-          </a:p>
-          <a:p>
-            <a:endParaRPr lang="en-US" dirty="0"/>
-          </a:p>
-          <a:p>
-            <a:endParaRPr lang="en-US" dirty="0"/>
-          </a:p>
-          <a:p>
-            <a:endParaRPr lang="en-US" dirty="0"/>
-          </a:p>
-          <a:p>
-            <a:endParaRPr lang="en-US" dirty="0"/>
-          </a:p>
-        </p:txBody>
-      </p:sp>
-      <p:sp>
-        <p:nvSpPr>
-          <p:cNvPr id="4" name="Slide Number Placeholder 3"/>
-          <p:cNvSpPr>
-            <a:spLocks noGrp="1"/>
-          </p:cNvSpPr>
-          <p:nvPr>
-            <p:ph type="sldNum" sz="quarter" idx="12"/>
-          </p:nvPr>
-        </p:nvSpPr>
-        <p:spPr/>
-        <p:txBody>
-          <a:bodyPr/>
-          <a:lstStyle/>
-          <a:p>
-            <a:fld id="{9648F39E-9C37-485F-AC97-16BB4BDF9F49}" type="slidenum">
-              <a:rPr kumimoji="0" lang="en-US" smtClean="0"/>
-              <a:pPr/>
-              <a:t>5</a:t>
-            </a:fld>
-            <a:endParaRPr kumimoji="0" lang="en-US" dirty="0"/>
-          </a:p>
-        </p:txBody>
-      </p:sp>
-      <p:pic>
-        <p:nvPicPr>
-          <p:cNvPr id="1026" name="Picture 2" descr="DOM HTML tree"/>
-          <p:cNvPicPr>
-            <a:picLocks noChangeAspect="1" noChangeArrowheads="1"/>
-          </p:cNvPicPr>
-          <p:nvPr/>
-        </p:nvPicPr>
-        <p:blipFill>
-          <a:blip r:embed="rId3">
-            <a:extLst>
-              <a:ext uri="{28A0092B-C50C-407E-A947-70E740481C1C}">
-                <a14:useLocalDpi xmlns:a14="http://schemas.microsoft.com/office/drawing/2010/main" val="0"/>
-              </a:ext>
-            </a:extLst>
-          </a:blip>
-          <a:srcRect/>
-          <a:stretch>
-            <a:fillRect/>
-          </a:stretch>
-        </p:blipFill>
-        <p:spPr bwMode="auto">
-          <a:xfrm>
-            <a:off x="1600200" y="3352800"/>
-            <a:ext cx="5791200" cy="3169670"/>
-          </a:xfrm>
-          <a:prstGeom prst="rect">
-            <a:avLst/>
-          </a:prstGeom>
-          <a:noFill/>
-          <a:extLst>
-            <a:ext uri="{909E8E84-426E-40DD-AFC4-6F175D3DCCD1}">
-              <a14:hiddenFill xmlns:a14="http://schemas.microsoft.com/office/drawing/2010/main">
-                <a:solidFill>
-                  <a:srgbClr val="FFFFFF"/>
-                </a:solidFill>
-              </a14:hiddenFill>
-            </a:ext>
-          </a:extLst>
-        </p:spPr>
-      </p:pic>
-    </p:spTree>
-    <p:extLst>
-      <p:ext uri="{BB962C8B-B14F-4D97-AF65-F5344CB8AC3E}">
-        <p14:creationId xmlns:p14="http://schemas.microsoft.com/office/powerpoint/2010/main" val="3288072464"/>
-      </p:ext>
-    </p:extLst>
-  </p:cSld>
-  <p:clrMapOvr>
-    <a:masterClrMapping/>
-  </p:clrMapOvr>
-  <p:timing>
-    <p:tnLst>
-      <p:par>
-        <p:cTn id="1" dur="indefinite" restart="never" nodeType="tmRoot">
-          <p:childTnLst>
-            <p:seq concurrent="1" nextAc="seek">
-              <p:cTn id="2" dur="indefinite" nodeType="mainSeq">
-                <p:childTnLst>
-                  <p:par>
-                    <p:cTn id="3" fill="hold">
-                      <p:stCondLst>
-                        <p:cond delay="indefinite"/>
-                      </p:stCondLst>
-                      <p:childTnLst>
-                        <p:par>
-                          <p:cTn id="4" fill="hold">
-                            <p:stCondLst>
-                              <p:cond delay="0"/>
-                            </p:stCondLst>
-                            <p:childTnLst>
-                              <p:par>
-                                <p:cTn id="5" presetID="1" presetClass="entr" presetSubtype="0" fill="hold" grpId="0" nodeType="clickEffect">
-                                  <p:stCondLst>
-                                    <p:cond delay="0"/>
-                                  </p:stCondLst>
-                                  <p:childTnLst>
-                                    <p:set>
-                                      <p:cBhvr>
-                                        <p:cTn id="6" dur="1" fill="hold">
-                                          <p:stCondLst>
-                                            <p:cond delay="0"/>
-                                          </p:stCondLst>
-                                        </p:cTn>
-                                        <p:tgtEl>
-                                          <p:spTgt spid="6">
-                                            <p:txEl>
-                                              <p:pRg st="0" end="0"/>
-                                            </p:txEl>
-                                          </p:spTgt>
-                                        </p:tgtEl>
-                                        <p:attrNameLst>
-                                          <p:attrName>style.visibility</p:attrName>
-                                        </p:attrNameLst>
-                                      </p:cBhvr>
-                                      <p:to>
-                                        <p:strVal val="visible"/>
-                                      </p:to>
-                                    </p:set>
-                                  </p:childTnLst>
-                                </p:cTn>
-                              </p:par>
-                            </p:childTnLst>
-                          </p:cTn>
-                        </p:par>
-                      </p:childTnLst>
-                    </p:cTn>
-                  </p:par>
-                  <p:par>
-                    <p:cTn id="7" fill="hold">
-                      <p:stCondLst>
-                        <p:cond delay="indefinite"/>
-                      </p:stCondLst>
-                      <p:childTnLst>
-                        <p:par>
-                          <p:cTn id="8" fill="hold">
-                            <p:stCondLst>
-                              <p:cond delay="0"/>
-                            </p:stCondLst>
-                            <p:childTnLst>
-                              <p:par>
-                                <p:cTn id="9" presetID="1" presetClass="entr" presetSubtype="0" fill="hold" grpId="0" nodeType="clickEffect">
-                                  <p:stCondLst>
-                                    <p:cond delay="0"/>
-                                  </p:stCondLst>
-                                  <p:childTnLst>
-                                    <p:set>
-                                      <p:cBhvr>
-                                        <p:cTn id="10" dur="1" fill="hold">
-                                          <p:stCondLst>
-                                            <p:cond delay="0"/>
-                                          </p:stCondLst>
-                                        </p:cTn>
-                                        <p:tgtEl>
-                                          <p:spTgt spid="6">
-                                            <p:txEl>
-                                              <p:pRg st="2" end="2"/>
-                                            </p:txEl>
-                                          </p:spTgt>
-                                        </p:tgtEl>
-                                        <p:attrNameLst>
-                                          <p:attrName>style.visibility</p:attrName>
-                                        </p:attrNameLst>
-                                      </p:cBhvr>
-                                      <p:to>
-                                        <p:strVal val="visible"/>
-                                      </p:to>
-                                    </p:set>
-                                  </p:childTnLst>
-                                </p:cTn>
-                              </p:par>
-                            </p:childTnLst>
-                          </p:cTn>
-                        </p:par>
-                      </p:childTnLst>
-                    </p:cTn>
-                  </p:par>
-                </p:childTnLst>
-              </p:cTn>
-              <p:prevCondLst>
-                <p:cond evt="onPrev" delay="0">
-                  <p:tgtEl>
-                    <p:sldTgt/>
-                  </p:tgtEl>
-                </p:cond>
-              </p:prevCondLst>
-              <p:nextCondLst>
-                <p:cond evt="onNext" delay="0">
-                  <p:tgtEl>
-                    <p:sldTgt/>
-                  </p:tgtEl>
-                </p:cond>
-              </p:nextCondLst>
-            </p:seq>
-          </p:childTnLst>
-        </p:cTn>
-      </p:par>
-    </p:tnLst>
-    <p:bldLst>
-      <p:bldP spid="6" grpId="0" build="p"/>
-    </p:bldLst>
-  </p:timing>
-</p:sld>
-</file>
-
-<file path=ppt/slides/slide50.xml><?xml version="1.0" encoding="utf-8"?>
+<file path=ppt/slides/slide51.xml><?xml version="1.0" encoding="utf-8"?>
 <p:sld xmlns:a="http://schemas.openxmlformats.org/drawingml/2006/main" xmlns:r="http://schemas.openxmlformats.org/officeDocument/2006/relationships" xmlns:p="http://schemas.openxmlformats.org/presentationml/2006/main">
   <p:cSld>
     <p:spTree>
@@ -25766,7 +26485,7 @@
 </p:sld>
 </file>
 
-<file path=ppt/slides/slide51.xml><?xml version="1.0" encoding="utf-8"?>
+<file path=ppt/slides/slide52.xml><?xml version="1.0" encoding="utf-8"?>
 <p:sld xmlns:a="http://schemas.openxmlformats.org/drawingml/2006/main" xmlns:r="http://schemas.openxmlformats.org/officeDocument/2006/relationships" xmlns:p="http://schemas.openxmlformats.org/presentationml/2006/main">
   <p:cSld>
     <p:spTree>
@@ -26243,7 +26962,7 @@
 </p:sld>
 </file>
 
-<file path=ppt/slides/slide52.xml><?xml version="1.0" encoding="utf-8"?>
+<file path=ppt/slides/slide53.xml><?xml version="1.0" encoding="utf-8"?>
 <p:sld xmlns:a="http://schemas.openxmlformats.org/drawingml/2006/main" xmlns:r="http://schemas.openxmlformats.org/officeDocument/2006/relationships" xmlns:p="http://schemas.openxmlformats.org/presentationml/2006/main">
   <p:cSld>
     <p:spTree>
@@ -26335,7 +27054,7 @@
 </p:sld>
 </file>
 
-<file path=ppt/slides/slide53.xml><?xml version="1.0" encoding="utf-8"?>
+<file path=ppt/slides/slide54.xml><?xml version="1.0" encoding="utf-8"?>
 <p:sld xmlns:a="http://schemas.openxmlformats.org/drawingml/2006/main" xmlns:r="http://schemas.openxmlformats.org/officeDocument/2006/relationships" xmlns:p="http://schemas.openxmlformats.org/presentationml/2006/main">
   <p:cSld>
     <p:spTree>
@@ -27461,7 +28180,7 @@
             <a:r>
               <a:rPr lang="en-US" dirty="0">
                 <a:cs typeface="Calibri" panose="020F0502020204030204" pitchFamily="34" charset="0"/>
-                <a:hlinkClick r:id="rId2" action="ppaction://hlinkfile"/>
+                <a:hlinkClick r:id="rId3"/>
               </a:rPr>
               <a:t>[link]</a:t>
             </a:r>

</xml_diff>

<commit_message>
Add javascript-and-html links to index.html
</commit_message>
<xml_diff>
--- a/CPSC-24700/Presentations/javascript-and-html.pptx
+++ b/CPSC-24700/Presentations/javascript-and-html.pptx
@@ -6,7 +6,7 @@
     <p:sldMasterId id="2147483672" r:id="rId2"/>
   </p:sldMasterIdLst>
   <p:notesMasterIdLst>
-    <p:notesMasterId r:id="rId57"/>
+    <p:notesMasterId r:id="rId56"/>
   </p:notesMasterIdLst>
   <p:sldIdLst>
     <p:sldId id="291" r:id="rId3"/>
@@ -34,35 +34,34 @@
     <p:sldId id="267" r:id="rId25"/>
     <p:sldId id="272" r:id="rId26"/>
     <p:sldId id="305" r:id="rId27"/>
-    <p:sldId id="319" r:id="rId28"/>
-    <p:sldId id="279" r:id="rId29"/>
-    <p:sldId id="273" r:id="rId30"/>
-    <p:sldId id="306" r:id="rId31"/>
-    <p:sldId id="280" r:id="rId32"/>
-    <p:sldId id="313" r:id="rId33"/>
-    <p:sldId id="314" r:id="rId34"/>
-    <p:sldId id="315" r:id="rId35"/>
-    <p:sldId id="316" r:id="rId36"/>
-    <p:sldId id="317" r:id="rId37"/>
-    <p:sldId id="321" r:id="rId38"/>
-    <p:sldId id="281" r:id="rId39"/>
-    <p:sldId id="307" r:id="rId40"/>
-    <p:sldId id="296" r:id="rId41"/>
-    <p:sldId id="274" r:id="rId42"/>
-    <p:sldId id="308" r:id="rId43"/>
-    <p:sldId id="297" r:id="rId44"/>
-    <p:sldId id="275" r:id="rId45"/>
-    <p:sldId id="298" r:id="rId46"/>
-    <p:sldId id="299" r:id="rId47"/>
-    <p:sldId id="282" r:id="rId48"/>
-    <p:sldId id="301" r:id="rId49"/>
-    <p:sldId id="283" r:id="rId50"/>
-    <p:sldId id="284" r:id="rId51"/>
-    <p:sldId id="300" r:id="rId52"/>
-    <p:sldId id="286" r:id="rId53"/>
-    <p:sldId id="287" r:id="rId54"/>
-    <p:sldId id="309" r:id="rId55"/>
-    <p:sldId id="290" r:id="rId56"/>
+    <p:sldId id="279" r:id="rId28"/>
+    <p:sldId id="273" r:id="rId29"/>
+    <p:sldId id="306" r:id="rId30"/>
+    <p:sldId id="280" r:id="rId31"/>
+    <p:sldId id="313" r:id="rId32"/>
+    <p:sldId id="314" r:id="rId33"/>
+    <p:sldId id="315" r:id="rId34"/>
+    <p:sldId id="316" r:id="rId35"/>
+    <p:sldId id="317" r:id="rId36"/>
+    <p:sldId id="322" r:id="rId37"/>
+    <p:sldId id="281" r:id="rId38"/>
+    <p:sldId id="307" r:id="rId39"/>
+    <p:sldId id="296" r:id="rId40"/>
+    <p:sldId id="274" r:id="rId41"/>
+    <p:sldId id="308" r:id="rId42"/>
+    <p:sldId id="297" r:id="rId43"/>
+    <p:sldId id="275" r:id="rId44"/>
+    <p:sldId id="298" r:id="rId45"/>
+    <p:sldId id="299" r:id="rId46"/>
+    <p:sldId id="282" r:id="rId47"/>
+    <p:sldId id="301" r:id="rId48"/>
+    <p:sldId id="283" r:id="rId49"/>
+    <p:sldId id="284" r:id="rId50"/>
+    <p:sldId id="300" r:id="rId51"/>
+    <p:sldId id="286" r:id="rId52"/>
+    <p:sldId id="287" r:id="rId53"/>
+    <p:sldId id="309" r:id="rId54"/>
+    <p:sldId id="290" r:id="rId55"/>
   </p:sldIdLst>
   <p:sldSz cx="9144000" cy="6858000" type="screen4x3"/>
   <p:notesSz cx="6858000" cy="9144000"/>
@@ -969,7 +968,19 @@
           <a:bodyPr/>
           <a:lstStyle/>
           <a:p>
+            <a:r>
+              <a:rPr lang="en-US" dirty="0"/>
+              <a:t>It’s important to note that input will also need to be validated on the server. Otherwise the sever will be susceptible to spoofing… having an non-browser send data to it that has not been validated. A server should never assume that data coming in is adequately validated. </a:t>
+            </a:r>
+          </a:p>
+          <a:p>
             <a:endParaRPr lang="en-US" dirty="0"/>
+          </a:p>
+          <a:p>
+            <a:r>
+              <a:rPr lang="en-US" dirty="0"/>
+              <a:t>Also, good practice would suggest attempting to reformat the content to better assist the user. </a:t>
+            </a:r>
           </a:p>
         </p:txBody>
       </p:sp>
@@ -988,78 +999,18 @@
           <a:bodyPr/>
           <a:lstStyle/>
           <a:p>
-            <a:pPr marL="0" marR="0" lvl="0" indent="0" algn="r" defTabSz="914400" rtl="0" eaLnBrk="1" fontAlgn="auto" latinLnBrk="0" hangingPunct="1">
-              <a:lnSpc>
-                <a:spcPct val="100000"/>
-              </a:lnSpc>
-              <a:spcBef>
-                <a:spcPts val="0"/>
-              </a:spcBef>
-              <a:spcAft>
-                <a:spcPts val="0"/>
-              </a:spcAft>
-              <a:buClrTx/>
-              <a:buSzTx/>
-              <a:buFontTx/>
-              <a:buNone/>
-              <a:tabLst/>
-              <a:defRPr/>
-            </a:pPr>
-            <a:fld id="{5394DE12-7B9B-46AA-AC19-C30A49928B9B}" type="slidenum">
-              <a:rPr kumimoji="0" lang="en-US" sz="1200" b="0" i="0" u="none" strike="noStrike" kern="1200" cap="none" spc="0" normalizeH="0" baseline="0" noProof="0" smtClean="0">
-                <a:ln>
-                  <a:noFill/>
-                </a:ln>
-                <a:solidFill>
-                  <a:prstClr val="black"/>
-                </a:solidFill>
-                <a:effectLst/>
-                <a:uLnTx/>
-                <a:uFillTx/>
-                <a:latin typeface="Calibri" panose="020F0502020204030204"/>
-                <a:ea typeface="+mn-ea"/>
-                <a:cs typeface="+mn-cs"/>
-              </a:rPr>
-              <a:pPr marL="0" marR="0" lvl="0" indent="0" algn="r" defTabSz="914400" rtl="0" eaLnBrk="1" fontAlgn="auto" latinLnBrk="0" hangingPunct="1">
-                <a:lnSpc>
-                  <a:spcPct val="100000"/>
-                </a:lnSpc>
-                <a:spcBef>
-                  <a:spcPts val="0"/>
-                </a:spcBef>
-                <a:spcAft>
-                  <a:spcPts val="0"/>
-                </a:spcAft>
-                <a:buClrTx/>
-                <a:buSzTx/>
-                <a:buFontTx/>
-                <a:buNone/>
-                <a:tabLst/>
-                <a:defRPr/>
-              </a:pPr>
-              <a:t>26</a:t>
+            <a:fld id="{40F5A9F4-14AB-4E34-9372-28158D5523BB}" type="slidenum">
+              <a:rPr lang="en-US" smtClean="0"/>
+              <a:t>27</a:t>
             </a:fld>
-            <a:endParaRPr kumimoji="0" lang="en-US" sz="1200" b="0" i="0" u="none" strike="noStrike" kern="1200" cap="none" spc="0" normalizeH="0" baseline="0" noProof="0" dirty="0">
-              <a:ln>
-                <a:noFill/>
-              </a:ln>
-              <a:solidFill>
-                <a:prstClr val="black"/>
-              </a:solidFill>
-              <a:effectLst/>
-              <a:uLnTx/>
-              <a:uFillTx/>
-              <a:latin typeface="Calibri" panose="020F0502020204030204"/>
-              <a:ea typeface="+mn-ea"/>
-              <a:cs typeface="+mn-cs"/>
-            </a:endParaRPr>
+            <a:endParaRPr lang="en-US" dirty="0"/>
           </a:p>
         </p:txBody>
       </p:sp>
     </p:spTree>
     <p:extLst>
       <p:ext uri="{BB962C8B-B14F-4D97-AF65-F5344CB8AC3E}">
-        <p14:creationId xmlns:p14="http://schemas.microsoft.com/office/powerpoint/2010/main" val="887556209"/>
+        <p14:creationId xmlns:p14="http://schemas.microsoft.com/office/powerpoint/2010/main" val="1904762970"/>
       </p:ext>
     </p:extLst>
   </p:cSld>
@@ -1113,19 +1064,7 @@
           <a:bodyPr/>
           <a:lstStyle/>
           <a:p>
-            <a:r>
-              <a:rPr lang="en-US" dirty="0"/>
-              <a:t>It’s important to note that input will also need to be validated on the server. Otherwise the sever will be susceptible to spoofing… having an non-browser send data to it that has not been validated. A server should never assume that data coming in is adequately validated. </a:t>
-            </a:r>
-          </a:p>
-          <a:p>
             <a:endParaRPr lang="en-US" dirty="0"/>
-          </a:p>
-          <a:p>
-            <a:r>
-              <a:rPr lang="en-US" dirty="0"/>
-              <a:t>Also, good practice would suggest attempting to reformat the content to better assist the user. </a:t>
-            </a:r>
           </a:p>
         </p:txBody>
       </p:sp>
@@ -1148,14 +1087,14 @@
               <a:rPr lang="en-US" smtClean="0"/>
               <a:t>28</a:t>
             </a:fld>
-            <a:endParaRPr lang="en-US" dirty="0"/>
+            <a:endParaRPr lang="en-US"/>
           </a:p>
         </p:txBody>
       </p:sp>
     </p:spTree>
     <p:extLst>
       <p:ext uri="{BB962C8B-B14F-4D97-AF65-F5344CB8AC3E}">
-        <p14:creationId xmlns:p14="http://schemas.microsoft.com/office/powerpoint/2010/main" val="1904762970"/>
+        <p14:creationId xmlns:p14="http://schemas.microsoft.com/office/powerpoint/2010/main" val="132243976"/>
       </p:ext>
     </p:extLst>
   </p:cSld>
@@ -1230,7 +1169,7 @@
           <a:p>
             <a:fld id="{40F5A9F4-14AB-4E34-9372-28158D5523BB}" type="slidenum">
               <a:rPr lang="en-US" smtClean="0"/>
-              <a:t>29</a:t>
+              <a:t>34</a:t>
             </a:fld>
             <a:endParaRPr lang="en-US"/>
           </a:p>
@@ -1239,7 +1178,7 @@
     </p:spTree>
     <p:extLst>
       <p:ext uri="{BB962C8B-B14F-4D97-AF65-F5344CB8AC3E}">
-        <p14:creationId xmlns:p14="http://schemas.microsoft.com/office/powerpoint/2010/main" val="132243976"/>
+        <p14:creationId xmlns:p14="http://schemas.microsoft.com/office/powerpoint/2010/main" val="1293131616"/>
       </p:ext>
     </p:extLst>
   </p:cSld>
@@ -1312,18 +1251,78 @@
           <a:bodyPr/>
           <a:lstStyle/>
           <a:p>
-            <a:fld id="{40F5A9F4-14AB-4E34-9372-28158D5523BB}" type="slidenum">
-              <a:rPr lang="en-US" smtClean="0"/>
+            <a:pPr marL="0" marR="0" lvl="0" indent="0" algn="r" defTabSz="914400" rtl="0" eaLnBrk="1" fontAlgn="auto" latinLnBrk="0" hangingPunct="1">
+              <a:lnSpc>
+                <a:spcPct val="100000"/>
+              </a:lnSpc>
+              <a:spcBef>
+                <a:spcPts val="0"/>
+              </a:spcBef>
+              <a:spcAft>
+                <a:spcPts val="0"/>
+              </a:spcAft>
+              <a:buClrTx/>
+              <a:buSzTx/>
+              <a:buFontTx/>
+              <a:buNone/>
+              <a:tabLst/>
+              <a:defRPr/>
+            </a:pPr>
+            <a:fld id="{5394DE12-7B9B-46AA-AC19-C30A49928B9B}" type="slidenum">
+              <a:rPr kumimoji="0" lang="en-US" sz="1200" b="0" i="0" u="none" strike="noStrike" kern="1200" cap="none" spc="0" normalizeH="0" baseline="0" noProof="0" smtClean="0">
+                <a:ln>
+                  <a:noFill/>
+                </a:ln>
+                <a:solidFill>
+                  <a:prstClr val="black"/>
+                </a:solidFill>
+                <a:effectLst/>
+                <a:uLnTx/>
+                <a:uFillTx/>
+                <a:latin typeface="Calibri" panose="020F0502020204030204"/>
+                <a:ea typeface="+mn-ea"/>
+                <a:cs typeface="+mn-cs"/>
+              </a:rPr>
+              <a:pPr marL="0" marR="0" lvl="0" indent="0" algn="r" defTabSz="914400" rtl="0" eaLnBrk="1" fontAlgn="auto" latinLnBrk="0" hangingPunct="1">
+                <a:lnSpc>
+                  <a:spcPct val="100000"/>
+                </a:lnSpc>
+                <a:spcBef>
+                  <a:spcPts val="0"/>
+                </a:spcBef>
+                <a:spcAft>
+                  <a:spcPts val="0"/>
+                </a:spcAft>
+                <a:buClrTx/>
+                <a:buSzTx/>
+                <a:buFontTx/>
+                <a:buNone/>
+                <a:tabLst/>
+                <a:defRPr/>
+              </a:pPr>
               <a:t>35</a:t>
             </a:fld>
-            <a:endParaRPr lang="en-US"/>
+            <a:endParaRPr kumimoji="0" lang="en-US" sz="1200" b="0" i="0" u="none" strike="noStrike" kern="1200" cap="none" spc="0" normalizeH="0" baseline="0" noProof="0" dirty="0">
+              <a:ln>
+                <a:noFill/>
+              </a:ln>
+              <a:solidFill>
+                <a:prstClr val="black"/>
+              </a:solidFill>
+              <a:effectLst/>
+              <a:uLnTx/>
+              <a:uFillTx/>
+              <a:latin typeface="Calibri" panose="020F0502020204030204"/>
+              <a:ea typeface="+mn-ea"/>
+              <a:cs typeface="+mn-cs"/>
+            </a:endParaRPr>
           </a:p>
         </p:txBody>
       </p:sp>
     </p:spTree>
     <p:extLst>
       <p:ext uri="{BB962C8B-B14F-4D97-AF65-F5344CB8AC3E}">
-        <p14:creationId xmlns:p14="http://schemas.microsoft.com/office/powerpoint/2010/main" val="1293131616"/>
+        <p14:creationId xmlns:p14="http://schemas.microsoft.com/office/powerpoint/2010/main" val="3808177536"/>
       </p:ext>
     </p:extLst>
   </p:cSld>
@@ -1377,6 +1376,14 @@
           <a:bodyPr/>
           <a:lstStyle/>
           <a:p>
+            <a:r>
+              <a:rPr lang="en-US" dirty="0"/>
+              <a:t>example:</a:t>
+            </a:r>
+            <a:r>
+              <a:rPr lang="en-US" baseline="0" dirty="0"/>
+              <a:t> validator2.html</a:t>
+            </a:r>
             <a:endParaRPr lang="en-US" dirty="0"/>
           </a:p>
         </p:txBody>
@@ -1396,161 +1403,9 @@
           <a:bodyPr/>
           <a:lstStyle/>
           <a:p>
-            <a:pPr marL="0" marR="0" lvl="0" indent="0" algn="r" defTabSz="914400" rtl="0" eaLnBrk="1" fontAlgn="auto" latinLnBrk="0" hangingPunct="1">
-              <a:lnSpc>
-                <a:spcPct val="100000"/>
-              </a:lnSpc>
-              <a:spcBef>
-                <a:spcPts val="0"/>
-              </a:spcBef>
-              <a:spcAft>
-                <a:spcPts val="0"/>
-              </a:spcAft>
-              <a:buClrTx/>
-              <a:buSzTx/>
-              <a:buFontTx/>
-              <a:buNone/>
-              <a:tabLst/>
-              <a:defRPr/>
-            </a:pPr>
-            <a:fld id="{5394DE12-7B9B-46AA-AC19-C30A49928B9B}" type="slidenum">
-              <a:rPr kumimoji="0" lang="en-US" sz="1200" b="0" i="0" u="none" strike="noStrike" kern="1200" cap="none" spc="0" normalizeH="0" baseline="0" noProof="0" smtClean="0">
-                <a:ln>
-                  <a:noFill/>
-                </a:ln>
-                <a:solidFill>
-                  <a:prstClr val="black"/>
-                </a:solidFill>
-                <a:effectLst/>
-                <a:uLnTx/>
-                <a:uFillTx/>
-                <a:latin typeface="Calibri" panose="020F0502020204030204"/>
-                <a:ea typeface="+mn-ea"/>
-                <a:cs typeface="+mn-cs"/>
-              </a:rPr>
-              <a:pPr marL="0" marR="0" lvl="0" indent="0" algn="r" defTabSz="914400" rtl="0" eaLnBrk="1" fontAlgn="auto" latinLnBrk="0" hangingPunct="1">
-                <a:lnSpc>
-                  <a:spcPct val="100000"/>
-                </a:lnSpc>
-                <a:spcBef>
-                  <a:spcPts val="0"/>
-                </a:spcBef>
-                <a:spcAft>
-                  <a:spcPts val="0"/>
-                </a:spcAft>
-                <a:buClrTx/>
-                <a:buSzTx/>
-                <a:buFontTx/>
-                <a:buNone/>
-                <a:tabLst/>
-                <a:defRPr/>
-              </a:pPr>
-              <a:t>36</a:t>
-            </a:fld>
-            <a:endParaRPr kumimoji="0" lang="en-US" sz="1200" b="0" i="0" u="none" strike="noStrike" kern="1200" cap="none" spc="0" normalizeH="0" baseline="0" noProof="0" dirty="0">
-              <a:ln>
-                <a:noFill/>
-              </a:ln>
-              <a:solidFill>
-                <a:prstClr val="black"/>
-              </a:solidFill>
-              <a:effectLst/>
-              <a:uLnTx/>
-              <a:uFillTx/>
-              <a:latin typeface="Calibri" panose="020F0502020204030204"/>
-              <a:ea typeface="+mn-ea"/>
-              <a:cs typeface="+mn-cs"/>
-            </a:endParaRPr>
-          </a:p>
-        </p:txBody>
-      </p:sp>
-    </p:spTree>
-    <p:extLst>
-      <p:ext uri="{BB962C8B-B14F-4D97-AF65-F5344CB8AC3E}">
-        <p14:creationId xmlns:p14="http://schemas.microsoft.com/office/powerpoint/2010/main" val="2944331274"/>
-      </p:ext>
-    </p:extLst>
-  </p:cSld>
-  <p:clrMapOvr>
-    <a:masterClrMapping/>
-  </p:clrMapOvr>
-</p:notes>
-</file>
-
-<file path=ppt/notesSlides/notesSlide19.xml><?xml version="1.0" encoding="utf-8"?>
-<p:notes xmlns:a="http://schemas.openxmlformats.org/drawingml/2006/main" xmlns:r="http://schemas.openxmlformats.org/officeDocument/2006/relationships" xmlns:p="http://schemas.openxmlformats.org/presentationml/2006/main">
-  <p:cSld>
-    <p:spTree>
-      <p:nvGrpSpPr>
-        <p:cNvPr id="1" name=""/>
-        <p:cNvGrpSpPr/>
-        <p:nvPr/>
-      </p:nvGrpSpPr>
-      <p:grpSpPr>
-        <a:xfrm>
-          <a:off x="0" y="0"/>
-          <a:ext cx="0" cy="0"/>
-          <a:chOff x="0" y="0"/>
-          <a:chExt cx="0" cy="0"/>
-        </a:xfrm>
-      </p:grpSpPr>
-      <p:sp>
-        <p:nvSpPr>
-          <p:cNvPr id="2" name="Slide Image Placeholder 1"/>
-          <p:cNvSpPr>
-            <a:spLocks noGrp="1" noRot="1" noChangeAspect="1"/>
-          </p:cNvSpPr>
-          <p:nvPr>
-            <p:ph type="sldImg"/>
-          </p:nvPr>
-        </p:nvSpPr>
-        <p:spPr/>
-      </p:sp>
-      <p:sp>
-        <p:nvSpPr>
-          <p:cNvPr id="3" name="Notes Placeholder 2"/>
-          <p:cNvSpPr>
-            <a:spLocks noGrp="1"/>
-          </p:cNvSpPr>
-          <p:nvPr>
-            <p:ph type="body" idx="1"/>
-          </p:nvPr>
-        </p:nvSpPr>
-        <p:spPr/>
-        <p:txBody>
-          <a:bodyPr/>
-          <a:lstStyle/>
-          <a:p>
-            <a:r>
-              <a:rPr lang="en-US" dirty="0"/>
-              <a:t>example:</a:t>
-            </a:r>
-            <a:r>
-              <a:rPr lang="en-US" baseline="0" dirty="0"/>
-              <a:t> validator2.html</a:t>
-            </a:r>
-            <a:endParaRPr lang="en-US" dirty="0"/>
-          </a:p>
-        </p:txBody>
-      </p:sp>
-      <p:sp>
-        <p:nvSpPr>
-          <p:cNvPr id="4" name="Slide Number Placeholder 3"/>
-          <p:cNvSpPr>
-            <a:spLocks noGrp="1"/>
-          </p:cNvSpPr>
-          <p:nvPr>
-            <p:ph type="sldNum" sz="quarter" idx="10"/>
-          </p:nvPr>
-        </p:nvSpPr>
-        <p:spPr/>
-        <p:txBody>
-          <a:bodyPr/>
-          <a:lstStyle/>
-          <a:p>
             <a:fld id="{40F5A9F4-14AB-4E34-9372-28158D5523BB}" type="slidenum">
               <a:rPr lang="en-US" smtClean="0"/>
-              <a:t>52</a:t>
+              <a:t>51</a:t>
             </a:fld>
             <a:endParaRPr lang="en-US"/>
           </a:p>
@@ -16295,112 +16150,6 @@
 <file path=ppt/slides/slide26.xml><?xml version="1.0" encoding="utf-8"?>
 <p:sld xmlns:a="http://schemas.openxmlformats.org/drawingml/2006/main" xmlns:r="http://schemas.openxmlformats.org/officeDocument/2006/relationships" xmlns:p="http://schemas.openxmlformats.org/presentationml/2006/main">
   <p:cSld>
-    <p:bg>
-      <p:bgPr>
-        <a:solidFill>
-          <a:schemeClr val="bg1">
-            <a:lumMod val="75000"/>
-          </a:schemeClr>
-        </a:solidFill>
-        <a:effectLst/>
-      </p:bgPr>
-    </p:bg>
-    <p:spTree>
-      <p:nvGrpSpPr>
-        <p:cNvPr id="1" name=""/>
-        <p:cNvGrpSpPr/>
-        <p:nvPr/>
-      </p:nvGrpSpPr>
-      <p:grpSpPr>
-        <a:xfrm>
-          <a:off x="0" y="0"/>
-          <a:ext cx="0" cy="0"/>
-          <a:chOff x="0" y="0"/>
-          <a:chExt cx="0" cy="0"/>
-        </a:xfrm>
-      </p:grpSpPr>
-      <p:sp>
-        <p:nvSpPr>
-          <p:cNvPr id="2" name="Title 1"/>
-          <p:cNvSpPr>
-            <a:spLocks noGrp="1"/>
-          </p:cNvSpPr>
-          <p:nvPr>
-            <p:ph type="ctrTitle"/>
-          </p:nvPr>
-        </p:nvSpPr>
-        <p:spPr>
-          <a:xfrm>
-            <a:off x="1143000" y="1699022"/>
-            <a:ext cx="6858000" cy="1790700"/>
-          </a:xfrm>
-        </p:spPr>
-        <p:txBody>
-          <a:bodyPr>
-            <a:normAutofit/>
-          </a:bodyPr>
-          <a:lstStyle/>
-          <a:p>
-            <a:r>
-              <a:rPr lang="en-US" sz="3600" dirty="0"/>
-              <a:t>Start Session 16</a:t>
-            </a:r>
-          </a:p>
-        </p:txBody>
-      </p:sp>
-      <p:sp>
-        <p:nvSpPr>
-          <p:cNvPr id="3" name="Subtitle 2"/>
-          <p:cNvSpPr>
-            <a:spLocks noGrp="1"/>
-          </p:cNvSpPr>
-          <p:nvPr>
-            <p:ph type="subTitle" idx="1"/>
-          </p:nvPr>
-        </p:nvSpPr>
-        <p:spPr>
-          <a:xfrm>
-            <a:off x="1143000" y="3558778"/>
-            <a:ext cx="6858000" cy="1648517"/>
-          </a:xfrm>
-        </p:spPr>
-        <p:txBody>
-          <a:bodyPr>
-            <a:normAutofit/>
-          </a:bodyPr>
-          <a:lstStyle/>
-          <a:p>
-            <a:pPr algn="l"/>
-            <a:r>
-              <a:rPr lang="en-US" dirty="0"/>
-              <a:t>Course Number: CPSC-24700</a:t>
-            </a:r>
-          </a:p>
-          <a:p>
-            <a:pPr algn="l"/>
-            <a:r>
-              <a:rPr lang="en-US" dirty="0"/>
-              <a:t>Instructor: Eric Pogue</a:t>
-            </a:r>
-          </a:p>
-        </p:txBody>
-      </p:sp>
-    </p:spTree>
-    <p:extLst>
-      <p:ext uri="{BB962C8B-B14F-4D97-AF65-F5344CB8AC3E}">
-        <p14:creationId xmlns:p14="http://schemas.microsoft.com/office/powerpoint/2010/main" val="1130818612"/>
-      </p:ext>
-    </p:extLst>
-  </p:cSld>
-  <p:clrMapOvr>
-    <a:masterClrMapping/>
-  </p:clrMapOvr>
-</p:sld>
-</file>
-
-<file path=ppt/slides/slide27.xml><?xml version="1.0" encoding="utf-8"?>
-<p:sld xmlns:a="http://schemas.openxmlformats.org/drawingml/2006/main" xmlns:r="http://schemas.openxmlformats.org/officeDocument/2006/relationships" xmlns:p="http://schemas.openxmlformats.org/presentationml/2006/main">
-  <p:cSld>
     <p:spTree>
       <p:nvGrpSpPr>
         <p:cNvPr id="1" name=""/>
@@ -16736,7 +16485,7 @@
             <a:fld id="{9648F39E-9C37-485F-AC97-16BB4BDF9F49}" type="slidenum">
               <a:rPr kumimoji="0" lang="en-US" smtClean="0"/>
               <a:pPr/>
-              <a:t>27</a:t>
+              <a:t>26</a:t>
             </a:fld>
             <a:endParaRPr kumimoji="0" lang="en-US"/>
           </a:p>
@@ -17232,7 +16981,7 @@
 </p:sld>
 </file>
 
-<file path=ppt/slides/slide28.xml><?xml version="1.0" encoding="utf-8"?>
+<file path=ppt/slides/slide27.xml><?xml version="1.0" encoding="utf-8"?>
 <p:sld xmlns:a="http://schemas.openxmlformats.org/drawingml/2006/main" xmlns:r="http://schemas.openxmlformats.org/officeDocument/2006/relationships" xmlns:p="http://schemas.openxmlformats.org/presentationml/2006/main">
   <p:cSld>
     <p:spTree>
@@ -17407,7 +17156,7 @@
             <a:fld id="{9648F39E-9C37-485F-AC97-16BB4BDF9F49}" type="slidenum">
               <a:rPr kumimoji="0" lang="en-US" smtClean="0"/>
               <a:pPr/>
-              <a:t>28</a:t>
+              <a:t>27</a:t>
             </a:fld>
             <a:endParaRPr kumimoji="0" lang="en-US"/>
           </a:p>
@@ -17753,7 +17502,7 @@
 </p:sld>
 </file>
 
-<file path=ppt/slides/slide29.xml><?xml version="1.0" encoding="utf-8"?>
+<file path=ppt/slides/slide28.xml><?xml version="1.0" encoding="utf-8"?>
 <p:sld xmlns:a="http://schemas.openxmlformats.org/drawingml/2006/main" xmlns:r="http://schemas.openxmlformats.org/officeDocument/2006/relationships" xmlns:p="http://schemas.openxmlformats.org/presentationml/2006/main">
   <p:cSld>
     <p:spTree>
@@ -17873,126 +17622,7 @@
 </p:sld>
 </file>
 
-<file path=ppt/slides/slide3.xml><?xml version="1.0" encoding="utf-8"?>
-<p:sld xmlns:a="http://schemas.openxmlformats.org/drawingml/2006/main" xmlns:r="http://schemas.openxmlformats.org/officeDocument/2006/relationships" xmlns:p="http://schemas.openxmlformats.org/presentationml/2006/main">
-  <p:cSld>
-    <p:spTree>
-      <p:nvGrpSpPr>
-        <p:cNvPr id="1" name=""/>
-        <p:cNvGrpSpPr/>
-        <p:nvPr/>
-      </p:nvGrpSpPr>
-      <p:grpSpPr>
-        <a:xfrm>
-          <a:off x="0" y="0"/>
-          <a:ext cx="0" cy="0"/>
-          <a:chOff x="0" y="0"/>
-          <a:chExt cx="0" cy="0"/>
-        </a:xfrm>
-      </p:grpSpPr>
-      <p:sp>
-        <p:nvSpPr>
-          <p:cNvPr id="2" name="Title 1"/>
-          <p:cNvSpPr>
-            <a:spLocks noGrp="1"/>
-          </p:cNvSpPr>
-          <p:nvPr>
-            <p:ph type="title"/>
-          </p:nvPr>
-        </p:nvSpPr>
-        <p:spPr>
-          <a:solidFill>
-            <a:schemeClr val="accent6">
-              <a:lumMod val="20000"/>
-              <a:lumOff val="80000"/>
-            </a:schemeClr>
-          </a:solidFill>
-        </p:spPr>
-        <p:txBody>
-          <a:bodyPr/>
-          <a:lstStyle/>
-          <a:p>
-            <a:r>
-              <a:rPr lang="en-US" dirty="0"/>
-              <a:t>Examples</a:t>
-            </a:r>
-          </a:p>
-        </p:txBody>
-      </p:sp>
-      <p:sp>
-        <p:nvSpPr>
-          <p:cNvPr id="3" name="Content Placeholder 2"/>
-          <p:cNvSpPr>
-            <a:spLocks noGrp="1"/>
-          </p:cNvSpPr>
-          <p:nvPr>
-            <p:ph idx="1"/>
-          </p:nvPr>
-        </p:nvSpPr>
-        <p:spPr/>
-        <p:txBody>
-          <a:bodyPr/>
-          <a:lstStyle/>
-          <a:p>
-            <a:pPr algn="ctr"/>
-            <a:endParaRPr lang="en-US" dirty="0">
-              <a:latin typeface="Consolas" panose="020B0609020204030204" pitchFamily="49" charset="0"/>
-              <a:cs typeface="Consolas" panose="020B0609020204030204" pitchFamily="49" charset="0"/>
-            </a:endParaRPr>
-          </a:p>
-          <a:p>
-            <a:pPr algn="ctr"/>
-            <a:r>
-              <a:rPr lang="en-US" dirty="0"/>
-              <a:t>Yahtzee Dice </a:t>
-            </a:r>
-            <a:r>
-              <a:rPr lang="en-US" dirty="0">
-                <a:hlinkClick r:id="rId3"/>
-              </a:rPr>
-              <a:t>[link]</a:t>
-            </a:r>
-            <a:endParaRPr lang="en-US" dirty="0"/>
-          </a:p>
-          <a:p>
-            <a:pPr algn="ctr"/>
-            <a:r>
-              <a:rPr lang="en-US" dirty="0"/>
-              <a:t>Yahtzee Dice with External JS </a:t>
-            </a:r>
-            <a:r>
-              <a:rPr lang="en-US" dirty="0">
-                <a:cs typeface="Calibri" panose="020F0502020204030204" pitchFamily="34" charset="0"/>
-                <a:hlinkClick r:id="rId4"/>
-              </a:rPr>
-              <a:t>[link]</a:t>
-            </a:r>
-            <a:endParaRPr lang="en-US" dirty="0">
-              <a:cs typeface="Calibri" panose="020F0502020204030204" pitchFamily="34" charset="0"/>
-            </a:endParaRPr>
-          </a:p>
-          <a:p>
-            <a:pPr algn="ctr"/>
-            <a:endParaRPr lang="en-US" dirty="0">
-              <a:cs typeface="Calibri" panose="020F0502020204030204" pitchFamily="34" charset="0"/>
-            </a:endParaRPr>
-          </a:p>
-        </p:txBody>
-      </p:sp>
-    </p:spTree>
-    <p:extLst>
-      <p:ext uri="{BB962C8B-B14F-4D97-AF65-F5344CB8AC3E}">
-        <p14:creationId xmlns:p14="http://schemas.microsoft.com/office/powerpoint/2010/main" val="4030860443"/>
-      </p:ext>
-    </p:extLst>
-  </p:cSld>
-  <p:clrMapOvr>
-    <a:masterClrMapping/>
-  </p:clrMapOvr>
-</p:sld>
-</file>
-
-<file path=ppt/slides/slide30.xml><?xml version="1.0" encoding="utf-8"?>
+<file path=ppt/slides/slide29.xml><?xml version="1.0" encoding="utf-8"?>
 <p:sld xmlns:a="http://schemas.openxmlformats.org/drawingml/2006/main" xmlns:r="http://schemas.openxmlformats.org/officeDocument/2006/relationships" xmlns:p="http://schemas.openxmlformats.org/presentationml/2006/main">
   <p:cSld>
     <p:spTree>
@@ -18481,7 +18111,126 @@
 </p:sld>
 </file>
 
-<file path=ppt/slides/slide31.xml><?xml version="1.0" encoding="utf-8"?>
+<file path=ppt/slides/slide3.xml><?xml version="1.0" encoding="utf-8"?>
+<p:sld xmlns:a="http://schemas.openxmlformats.org/drawingml/2006/main" xmlns:r="http://schemas.openxmlformats.org/officeDocument/2006/relationships" xmlns:p="http://schemas.openxmlformats.org/presentationml/2006/main">
+  <p:cSld>
+    <p:spTree>
+      <p:nvGrpSpPr>
+        <p:cNvPr id="1" name=""/>
+        <p:cNvGrpSpPr/>
+        <p:nvPr/>
+      </p:nvGrpSpPr>
+      <p:grpSpPr>
+        <a:xfrm>
+          <a:off x="0" y="0"/>
+          <a:ext cx="0" cy="0"/>
+          <a:chOff x="0" y="0"/>
+          <a:chExt cx="0" cy="0"/>
+        </a:xfrm>
+      </p:grpSpPr>
+      <p:sp>
+        <p:nvSpPr>
+          <p:cNvPr id="2" name="Title 1"/>
+          <p:cNvSpPr>
+            <a:spLocks noGrp="1"/>
+          </p:cNvSpPr>
+          <p:nvPr>
+            <p:ph type="title"/>
+          </p:nvPr>
+        </p:nvSpPr>
+        <p:spPr>
+          <a:solidFill>
+            <a:schemeClr val="accent6">
+              <a:lumMod val="20000"/>
+              <a:lumOff val="80000"/>
+            </a:schemeClr>
+          </a:solidFill>
+        </p:spPr>
+        <p:txBody>
+          <a:bodyPr/>
+          <a:lstStyle/>
+          <a:p>
+            <a:r>
+              <a:rPr lang="en-US" dirty="0"/>
+              <a:t>Examples</a:t>
+            </a:r>
+          </a:p>
+        </p:txBody>
+      </p:sp>
+      <p:sp>
+        <p:nvSpPr>
+          <p:cNvPr id="3" name="Content Placeholder 2"/>
+          <p:cNvSpPr>
+            <a:spLocks noGrp="1"/>
+          </p:cNvSpPr>
+          <p:nvPr>
+            <p:ph idx="1"/>
+          </p:nvPr>
+        </p:nvSpPr>
+        <p:spPr/>
+        <p:txBody>
+          <a:bodyPr/>
+          <a:lstStyle/>
+          <a:p>
+            <a:pPr algn="ctr"/>
+            <a:endParaRPr lang="en-US" dirty="0">
+              <a:latin typeface="Consolas" panose="020B0609020204030204" pitchFamily="49" charset="0"/>
+              <a:cs typeface="Consolas" panose="020B0609020204030204" pitchFamily="49" charset="0"/>
+            </a:endParaRPr>
+          </a:p>
+          <a:p>
+            <a:pPr algn="ctr"/>
+            <a:r>
+              <a:rPr lang="en-US" dirty="0"/>
+              <a:t>Yahtzee Dice </a:t>
+            </a:r>
+            <a:r>
+              <a:rPr lang="en-US" dirty="0">
+                <a:hlinkClick r:id="rId3"/>
+              </a:rPr>
+              <a:t>[link]</a:t>
+            </a:r>
+            <a:endParaRPr lang="en-US" dirty="0"/>
+          </a:p>
+          <a:p>
+            <a:pPr algn="ctr"/>
+            <a:r>
+              <a:rPr lang="en-US" dirty="0"/>
+              <a:t>Yahtzee Dice with External JS </a:t>
+            </a:r>
+            <a:r>
+              <a:rPr lang="en-US" dirty="0">
+                <a:cs typeface="Calibri" panose="020F0502020204030204" pitchFamily="34" charset="0"/>
+                <a:hlinkClick r:id="rId4"/>
+              </a:rPr>
+              <a:t>[link]</a:t>
+            </a:r>
+            <a:endParaRPr lang="en-US" dirty="0">
+              <a:cs typeface="Calibri" panose="020F0502020204030204" pitchFamily="34" charset="0"/>
+            </a:endParaRPr>
+          </a:p>
+          <a:p>
+            <a:pPr algn="ctr"/>
+            <a:endParaRPr lang="en-US" dirty="0">
+              <a:cs typeface="Calibri" panose="020F0502020204030204" pitchFamily="34" charset="0"/>
+            </a:endParaRPr>
+          </a:p>
+        </p:txBody>
+      </p:sp>
+    </p:spTree>
+    <p:extLst>
+      <p:ext uri="{BB962C8B-B14F-4D97-AF65-F5344CB8AC3E}">
+        <p14:creationId xmlns:p14="http://schemas.microsoft.com/office/powerpoint/2010/main" val="4030860443"/>
+      </p:ext>
+    </p:extLst>
+  </p:cSld>
+  <p:clrMapOvr>
+    <a:masterClrMapping/>
+  </p:clrMapOvr>
+</p:sld>
+</file>
+
+<file path=ppt/slides/slide30.xml><?xml version="1.0" encoding="utf-8"?>
 <p:sld xmlns:a="http://schemas.openxmlformats.org/drawingml/2006/main" xmlns:r="http://schemas.openxmlformats.org/officeDocument/2006/relationships" xmlns:p="http://schemas.openxmlformats.org/presentationml/2006/main">
   <p:cSld>
     <p:spTree>
@@ -18654,7 +18403,7 @@
             <a:fld id="{9648F39E-9C37-485F-AC97-16BB4BDF9F49}" type="slidenum">
               <a:rPr kumimoji="0" lang="en-US" smtClean="0"/>
               <a:pPr/>
-              <a:t>31</a:t>
+              <a:t>30</a:t>
             </a:fld>
             <a:endParaRPr kumimoji="0" lang="en-US"/>
           </a:p>
@@ -18951,7 +18700,7 @@
 </p:sld>
 </file>
 
-<file path=ppt/slides/slide32.xml><?xml version="1.0" encoding="utf-8"?>
+<file path=ppt/slides/slide31.xml><?xml version="1.0" encoding="utf-8"?>
 <p:sld xmlns:a="http://schemas.openxmlformats.org/drawingml/2006/main" xmlns:r="http://schemas.openxmlformats.org/officeDocument/2006/relationships" xmlns:p="http://schemas.openxmlformats.org/presentationml/2006/main">
   <p:cSld>
     <p:spTree>
@@ -19312,7 +19061,7 @@
             <a:fld id="{9648F39E-9C37-485F-AC97-16BB4BDF9F49}" type="slidenum">
               <a:rPr kumimoji="0" lang="en-US" smtClean="0"/>
               <a:pPr/>
-              <a:t>32</a:t>
+              <a:t>31</a:t>
             </a:fld>
             <a:endParaRPr kumimoji="0" lang="en-US"/>
           </a:p>
@@ -19849,6 +19598,352 @@
 </p:sld>
 </file>
 
+<file path=ppt/slides/slide32.xml><?xml version="1.0" encoding="utf-8"?>
+<p:sld xmlns:a="http://schemas.openxmlformats.org/drawingml/2006/main" xmlns:r="http://schemas.openxmlformats.org/officeDocument/2006/relationships" xmlns:p="http://schemas.openxmlformats.org/presentationml/2006/main">
+  <p:cSld>
+    <p:spTree>
+      <p:nvGrpSpPr>
+        <p:cNvPr id="1" name=""/>
+        <p:cNvGrpSpPr/>
+        <p:nvPr/>
+      </p:nvGrpSpPr>
+      <p:grpSpPr>
+        <a:xfrm>
+          <a:off x="0" y="0"/>
+          <a:ext cx="0" cy="0"/>
+          <a:chOff x="0" y="0"/>
+          <a:chExt cx="0" cy="0"/>
+        </a:xfrm>
+      </p:grpSpPr>
+      <p:sp>
+        <p:nvSpPr>
+          <p:cNvPr id="2" name="Title 1"/>
+          <p:cNvSpPr>
+            <a:spLocks noGrp="1"/>
+          </p:cNvSpPr>
+          <p:nvPr>
+            <p:ph type="title"/>
+          </p:nvPr>
+        </p:nvSpPr>
+        <p:spPr/>
+        <p:txBody>
+          <a:bodyPr>
+            <a:normAutofit/>
+          </a:bodyPr>
+          <a:lstStyle/>
+          <a:p>
+            <a:r>
+              <a:rPr lang="en-US" dirty="0"/>
+              <a:t>Handling Events from Radio Buttons</a:t>
+            </a:r>
+          </a:p>
+        </p:txBody>
+      </p:sp>
+      <p:sp>
+        <p:nvSpPr>
+          <p:cNvPr id="3" name="Content Placeholder 2"/>
+          <p:cNvSpPr>
+            <a:spLocks noGrp="1"/>
+          </p:cNvSpPr>
+          <p:nvPr>
+            <p:ph idx="1"/>
+          </p:nvPr>
+        </p:nvSpPr>
+        <p:spPr/>
+        <p:txBody>
+          <a:bodyPr>
+            <a:normAutofit/>
+          </a:bodyPr>
+          <a:lstStyle/>
+          <a:p>
+            <a:pPr marL="0" lvl="1" indent="0">
+              <a:buNone/>
+            </a:pPr>
+            <a:r>
+              <a:rPr lang="en-US" dirty="0"/>
+              <a:t>2. We can then implement the </a:t>
+            </a:r>
+            <a:r>
+              <a:rPr lang="en-US" dirty="0" err="1">
+                <a:latin typeface="Courier New" pitchFamily="49" charset="0"/>
+                <a:cs typeface="Courier New" pitchFamily="49" charset="0"/>
+              </a:rPr>
+              <a:t>planeChoice</a:t>
+            </a:r>
+            <a:r>
+              <a:rPr lang="en-US" dirty="0">
+                <a:cs typeface="Courier New" pitchFamily="49" charset="0"/>
+              </a:rPr>
+              <a:t> </a:t>
+            </a:r>
+            <a:r>
+              <a:rPr lang="en-US" dirty="0"/>
+              <a:t>function to determine whether which button is clicked by </a:t>
+            </a:r>
+            <a:r>
+              <a:rPr lang="en-US" dirty="0">
+                <a:solidFill>
+                  <a:srgbClr val="7030A0"/>
+                </a:solidFill>
+              </a:rPr>
+              <a:t>examining the checked property of each radio button object</a:t>
+            </a:r>
+            <a:r>
+              <a:rPr lang="en-US" dirty="0"/>
+              <a:t>, e.g.:</a:t>
+            </a:r>
+          </a:p>
+          <a:p>
+            <a:pPr marL="285750" lvl="1">
+              <a:buNone/>
+            </a:pPr>
+            <a:r>
+              <a:rPr lang="en-US" dirty="0">
+                <a:latin typeface="Courier New" pitchFamily="49" charset="0"/>
+                <a:cs typeface="Courier New" pitchFamily="49" charset="0"/>
+              </a:rPr>
+              <a:t>   </a:t>
+            </a:r>
+            <a:r>
+              <a:rPr lang="en-US" dirty="0" err="1">
+                <a:latin typeface="Courier New" pitchFamily="49" charset="0"/>
+                <a:cs typeface="Courier New" pitchFamily="49" charset="0"/>
+              </a:rPr>
+              <a:t>var</a:t>
+            </a:r>
+            <a:r>
+              <a:rPr lang="en-US" dirty="0">
+                <a:latin typeface="Courier New" pitchFamily="49" charset="0"/>
+                <a:cs typeface="Courier New" pitchFamily="49" charset="0"/>
+              </a:rPr>
+              <a:t> </a:t>
+            </a:r>
+            <a:r>
+              <a:rPr lang="en-US" dirty="0" err="1">
+                <a:latin typeface="Courier New" pitchFamily="49" charset="0"/>
+                <a:cs typeface="Courier New" pitchFamily="49" charset="0"/>
+              </a:rPr>
+              <a:t>dom</a:t>
+            </a:r>
+            <a:r>
+              <a:rPr lang="en-US" dirty="0">
+                <a:latin typeface="Courier New" pitchFamily="49" charset="0"/>
+                <a:cs typeface="Courier New" pitchFamily="49" charset="0"/>
+              </a:rPr>
+              <a:t> = </a:t>
+            </a:r>
+            <a:r>
+              <a:rPr lang="en-US" dirty="0" err="1">
+                <a:latin typeface="Courier New" pitchFamily="49" charset="0"/>
+                <a:cs typeface="Courier New" pitchFamily="49" charset="0"/>
+              </a:rPr>
+              <a:t>document.getElementById</a:t>
+            </a:r>
+            <a:r>
+              <a:rPr lang="en-US" dirty="0">
+                <a:latin typeface="Courier New" pitchFamily="49" charset="0"/>
+                <a:cs typeface="Courier New" pitchFamily="49" charset="0"/>
+              </a:rPr>
+              <a:t>(″</a:t>
+            </a:r>
+            <a:r>
+              <a:rPr lang="en-US" dirty="0" err="1">
+                <a:latin typeface="Courier New" pitchFamily="49" charset="0"/>
+                <a:cs typeface="Courier New" pitchFamily="49" charset="0"/>
+              </a:rPr>
+              <a:t>myForm</a:t>
+            </a:r>
+            <a:r>
+              <a:rPr lang="en-US" dirty="0">
+                <a:latin typeface="Courier New" pitchFamily="49" charset="0"/>
+                <a:cs typeface="Courier New" pitchFamily="49" charset="0"/>
+              </a:rPr>
+              <a:t>″);</a:t>
+            </a:r>
+          </a:p>
+          <a:p>
+            <a:pPr marL="285750" lvl="1">
+              <a:buNone/>
+            </a:pPr>
+            <a:r>
+              <a:rPr lang="en-US" dirty="0">
+                <a:latin typeface="Courier New" pitchFamily="49" charset="0"/>
+                <a:cs typeface="Courier New" pitchFamily="49" charset="0"/>
+              </a:rPr>
+              <a:t>   for (</a:t>
+            </a:r>
+            <a:r>
+              <a:rPr lang="en-US" dirty="0" err="1">
+                <a:latin typeface="Courier New" pitchFamily="49" charset="0"/>
+                <a:cs typeface="Courier New" pitchFamily="49" charset="0"/>
+              </a:rPr>
+              <a:t>var</a:t>
+            </a:r>
+            <a:r>
+              <a:rPr lang="en-US" dirty="0">
+                <a:latin typeface="Courier New" pitchFamily="49" charset="0"/>
+                <a:cs typeface="Courier New" pitchFamily="49" charset="0"/>
+              </a:rPr>
+              <a:t> index = 0; </a:t>
+            </a:r>
+          </a:p>
+          <a:p>
+            <a:pPr marL="285750" lvl="1">
+              <a:buNone/>
+            </a:pPr>
+            <a:r>
+              <a:rPr lang="en-US" dirty="0">
+                <a:latin typeface="Courier New" pitchFamily="49" charset="0"/>
+                <a:cs typeface="Courier New" pitchFamily="49" charset="0"/>
+              </a:rPr>
+              <a:t>     index &lt; </a:t>
+            </a:r>
+            <a:r>
+              <a:rPr lang="en-US" dirty="0" err="1">
+                <a:latin typeface="Courier New" pitchFamily="49" charset="0"/>
+                <a:cs typeface="Courier New" pitchFamily="49" charset="0"/>
+              </a:rPr>
+              <a:t>dom.planeButton.length</a:t>
+            </a:r>
+            <a:r>
+              <a:rPr lang="en-US" dirty="0">
+                <a:latin typeface="Courier New" pitchFamily="49" charset="0"/>
+                <a:cs typeface="Courier New" pitchFamily="49" charset="0"/>
+              </a:rPr>
+              <a:t>; index++) {</a:t>
+            </a:r>
+          </a:p>
+          <a:p>
+            <a:pPr marL="285750" lvl="1">
+              <a:buNone/>
+            </a:pPr>
+            <a:r>
+              <a:rPr lang="en-US" dirty="0">
+                <a:latin typeface="Courier New" pitchFamily="49" charset="0"/>
+                <a:cs typeface="Courier New" pitchFamily="49" charset="0"/>
+              </a:rPr>
+              <a:t>     if (</a:t>
+            </a:r>
+            <a:r>
+              <a:rPr lang="en-US" dirty="0" err="1">
+                <a:latin typeface="Courier New" pitchFamily="49" charset="0"/>
+                <a:cs typeface="Courier New" pitchFamily="49" charset="0"/>
+              </a:rPr>
+              <a:t>dom.planeButton</a:t>
+            </a:r>
+            <a:r>
+              <a:rPr lang="en-US" dirty="0">
+                <a:latin typeface="Courier New" pitchFamily="49" charset="0"/>
+                <a:cs typeface="Courier New" pitchFamily="49" charset="0"/>
+              </a:rPr>
+              <a:t>[index].checked) {</a:t>
+            </a:r>
+          </a:p>
+          <a:p>
+            <a:pPr marL="285750" lvl="1">
+              <a:buNone/>
+            </a:pPr>
+            <a:r>
+              <a:rPr lang="en-US" dirty="0">
+                <a:latin typeface="Courier New" pitchFamily="49" charset="0"/>
+                <a:cs typeface="Courier New" pitchFamily="49" charset="0"/>
+              </a:rPr>
+              <a:t>       plane = </a:t>
+            </a:r>
+            <a:r>
+              <a:rPr lang="en-US" dirty="0" err="1">
+                <a:latin typeface="Courier New" pitchFamily="49" charset="0"/>
+                <a:cs typeface="Courier New" pitchFamily="49" charset="0"/>
+              </a:rPr>
+              <a:t>dom.planeButton</a:t>
+            </a:r>
+            <a:r>
+              <a:rPr lang="en-US" dirty="0">
+                <a:latin typeface="Courier New" pitchFamily="49" charset="0"/>
+                <a:cs typeface="Courier New" pitchFamily="49" charset="0"/>
+              </a:rPr>
+              <a:t>[index].value;</a:t>
+            </a:r>
+          </a:p>
+          <a:p>
+            <a:pPr marL="285750" lvl="1">
+              <a:buNone/>
+            </a:pPr>
+            <a:r>
+              <a:rPr lang="en-US" dirty="0">
+                <a:latin typeface="Courier New" pitchFamily="49" charset="0"/>
+                <a:cs typeface="Courier New" pitchFamily="49" charset="0"/>
+              </a:rPr>
+              <a:t>       break;</a:t>
+            </a:r>
+          </a:p>
+          <a:p>
+            <a:pPr marL="285750" lvl="1">
+              <a:buNone/>
+            </a:pPr>
+            <a:r>
+              <a:rPr lang="en-US" dirty="0">
+                <a:latin typeface="Courier New" pitchFamily="49" charset="0"/>
+                <a:cs typeface="Courier New" pitchFamily="49" charset="0"/>
+              </a:rPr>
+              <a:t>     }</a:t>
+            </a:r>
+          </a:p>
+          <a:p>
+            <a:pPr marL="285750" lvl="1">
+              <a:buNone/>
+            </a:pPr>
+            <a:r>
+              <a:rPr lang="en-US" dirty="0">
+                <a:latin typeface="Courier New" pitchFamily="49" charset="0"/>
+                <a:cs typeface="Courier New" pitchFamily="49" charset="0"/>
+              </a:rPr>
+              <a:t>   }</a:t>
+            </a:r>
+          </a:p>
+          <a:p>
+            <a:pPr lvl="1"/>
+            <a:endParaRPr lang="en-US" dirty="0"/>
+          </a:p>
+        </p:txBody>
+      </p:sp>
+      <p:sp>
+        <p:nvSpPr>
+          <p:cNvPr id="4" name="Slide Number Placeholder 3"/>
+          <p:cNvSpPr>
+            <a:spLocks noGrp="1"/>
+          </p:cNvSpPr>
+          <p:nvPr>
+            <p:ph type="sldNum" sz="quarter" idx="12"/>
+          </p:nvPr>
+        </p:nvSpPr>
+        <p:spPr/>
+        <p:txBody>
+          <a:bodyPr/>
+          <a:lstStyle/>
+          <a:p>
+            <a:fld id="{9648F39E-9C37-485F-AC97-16BB4BDF9F49}" type="slidenum">
+              <a:rPr kumimoji="0" lang="en-US" smtClean="0"/>
+              <a:pPr/>
+              <a:t>32</a:t>
+            </a:fld>
+            <a:endParaRPr kumimoji="0" lang="en-US"/>
+          </a:p>
+        </p:txBody>
+      </p:sp>
+    </p:spTree>
+    <p:extLst>
+      <p:ext uri="{BB962C8B-B14F-4D97-AF65-F5344CB8AC3E}">
+        <p14:creationId xmlns:p14="http://schemas.microsoft.com/office/powerpoint/2010/main" val="2913970114"/>
+      </p:ext>
+    </p:extLst>
+  </p:cSld>
+  <p:clrMapOvr>
+    <a:masterClrMapping/>
+  </p:clrMapOvr>
+</p:sld>
+</file>
+
 <file path=ppt/slides/slide33.xml><?xml version="1.0" encoding="utf-8"?>
 <p:sld xmlns:a="http://schemas.openxmlformats.org/drawingml/2006/main" xmlns:r="http://schemas.openxmlformats.org/officeDocument/2006/relationships" xmlns:p="http://schemas.openxmlformats.org/presentationml/2006/main">
   <p:cSld>
@@ -19907,29 +20002,9 @@
           </a:bodyPr>
           <a:lstStyle/>
           <a:p>
-            <a:pPr marL="0" lvl="1" indent="0">
-              <a:buNone/>
-            </a:pPr>
             <a:r>
               <a:rPr lang="en-US" dirty="0"/>
-              <a:t>2. We can then implement the </a:t>
-            </a:r>
-            <a:r>
-              <a:rPr lang="en-US" dirty="0" err="1">
-                <a:latin typeface="Courier New" pitchFamily="49" charset="0"/>
-                <a:cs typeface="Courier New" pitchFamily="49" charset="0"/>
-              </a:rPr>
-              <a:t>planeChoice</a:t>
-            </a:r>
-            <a:r>
-              <a:rPr lang="en-US" dirty="0">
-                <a:cs typeface="Courier New" pitchFamily="49" charset="0"/>
-              </a:rPr>
-              <a:t> </a:t>
-            </a:r>
-            <a:r>
-              <a:rPr lang="en-US" dirty="0"/>
-              <a:t>function to determine whether which button is clicked by </a:t>
+              <a:t>The disadvantage of specifying handlers by assigning them to event properties is that there is </a:t>
             </a:r>
             <a:r>
               <a:rPr lang="en-US" dirty="0">
@@ -19937,224 +20012,37 @@
                   <a:srgbClr val="7030A0"/>
                 </a:solidFill>
               </a:rPr>
-              <a:t>examining the checked property of each radio button object</a:t>
-            </a:r>
+              <a:t>no way to use parameters</a:t>
+            </a:r>
+          </a:p>
+          <a:p>
+            <a:endParaRPr lang="en-US" dirty="0"/>
+          </a:p>
+          <a:p>
             <a:r>
               <a:rPr lang="en-US" dirty="0"/>
-              <a:t>, e.g.:</a:t>
-            </a:r>
-          </a:p>
-          <a:p>
-            <a:pPr marL="285750" lvl="1">
-              <a:buNone/>
+              <a:t>So why do this?</a:t>
+            </a:r>
+          </a:p>
+          <a:p>
+            <a:pPr marL="457200" indent="-457200">
+              <a:buFont typeface="+mj-lt"/>
+              <a:buAutoNum type="arabicPeriod"/>
             </a:pPr>
             <a:r>
-              <a:rPr lang="en-US" dirty="0">
-                <a:latin typeface="Courier New" pitchFamily="49" charset="0"/>
-                <a:cs typeface="Courier New" pitchFamily="49" charset="0"/>
-              </a:rPr>
-              <a:t>   </a:t>
-            </a:r>
-            <a:r>
-              <a:rPr lang="en-US" dirty="0" err="1">
-                <a:latin typeface="Courier New" pitchFamily="49" charset="0"/>
-                <a:cs typeface="Courier New" pitchFamily="49" charset="0"/>
-              </a:rPr>
-              <a:t>var</a:t>
-            </a:r>
-            <a:r>
-              <a:rPr lang="en-US" dirty="0">
-                <a:latin typeface="Courier New" pitchFamily="49" charset="0"/>
-                <a:cs typeface="Courier New" pitchFamily="49" charset="0"/>
-              </a:rPr>
-              <a:t> </a:t>
-            </a:r>
-            <a:r>
-              <a:rPr lang="en-US" dirty="0" err="1">
-                <a:latin typeface="Courier New" pitchFamily="49" charset="0"/>
-                <a:cs typeface="Courier New" pitchFamily="49" charset="0"/>
-              </a:rPr>
-              <a:t>dom</a:t>
-            </a:r>
-            <a:r>
-              <a:rPr lang="en-US" dirty="0">
-                <a:latin typeface="Courier New" pitchFamily="49" charset="0"/>
-                <a:cs typeface="Courier New" pitchFamily="49" charset="0"/>
-              </a:rPr>
-              <a:t> = </a:t>
-            </a:r>
-            <a:r>
-              <a:rPr lang="en-US" dirty="0" err="1">
-                <a:latin typeface="Courier New" pitchFamily="49" charset="0"/>
-                <a:cs typeface="Courier New" pitchFamily="49" charset="0"/>
-              </a:rPr>
-              <a:t>document.getElementById</a:t>
-            </a:r>
-            <a:r>
-              <a:rPr lang="en-US" dirty="0">
-                <a:latin typeface="Courier New" pitchFamily="49" charset="0"/>
-                <a:cs typeface="Courier New" pitchFamily="49" charset="0"/>
-              </a:rPr>
-              <a:t>(″</a:t>
-            </a:r>
-            <a:r>
-              <a:rPr lang="en-US" dirty="0" err="1">
-                <a:latin typeface="Courier New" pitchFamily="49" charset="0"/>
-                <a:cs typeface="Courier New" pitchFamily="49" charset="0"/>
-              </a:rPr>
-              <a:t>myForm</a:t>
-            </a:r>
-            <a:r>
-              <a:rPr lang="en-US" dirty="0">
-                <a:latin typeface="Courier New" pitchFamily="49" charset="0"/>
-                <a:cs typeface="Courier New" pitchFamily="49" charset="0"/>
-              </a:rPr>
-              <a:t>″);</a:t>
-            </a:r>
-          </a:p>
-          <a:p>
-            <a:pPr marL="285750" lvl="1">
-              <a:buNone/>
+              <a:rPr lang="en-US" dirty="0"/>
+              <a:t>It is good to keep HTML and JavaScript separate</a:t>
+            </a:r>
+          </a:p>
+          <a:p>
+            <a:pPr marL="457200" indent="-457200">
+              <a:buFont typeface="+mj-lt"/>
+              <a:buAutoNum type="arabicPeriod"/>
             </a:pPr>
             <a:r>
-              <a:rPr lang="en-US" dirty="0">
-                <a:latin typeface="Courier New" pitchFamily="49" charset="0"/>
-                <a:cs typeface="Courier New" pitchFamily="49" charset="0"/>
-              </a:rPr>
-              <a:t>   for (</a:t>
-            </a:r>
-            <a:r>
-              <a:rPr lang="en-US" dirty="0" err="1">
-                <a:latin typeface="Courier New" pitchFamily="49" charset="0"/>
-                <a:cs typeface="Courier New" pitchFamily="49" charset="0"/>
-              </a:rPr>
-              <a:t>var</a:t>
-            </a:r>
-            <a:r>
-              <a:rPr lang="en-US" dirty="0">
-                <a:latin typeface="Courier New" pitchFamily="49" charset="0"/>
-                <a:cs typeface="Courier New" pitchFamily="49" charset="0"/>
-              </a:rPr>
-              <a:t> index = 0; </a:t>
-            </a:r>
-          </a:p>
-          <a:p>
-            <a:pPr marL="285750" lvl="1">
-              <a:buNone/>
-            </a:pPr>
-            <a:r>
-              <a:rPr lang="en-US" dirty="0">
-                <a:latin typeface="Courier New" pitchFamily="49" charset="0"/>
-                <a:cs typeface="Courier New" pitchFamily="49" charset="0"/>
-              </a:rPr>
-              <a:t>     index &lt; </a:t>
-            </a:r>
-            <a:r>
-              <a:rPr lang="en-US" dirty="0" err="1">
-                <a:latin typeface="Courier New" pitchFamily="49" charset="0"/>
-                <a:cs typeface="Courier New" pitchFamily="49" charset="0"/>
-              </a:rPr>
-              <a:t>dom.planeButton.length</a:t>
-            </a:r>
-            <a:r>
-              <a:rPr lang="en-US" dirty="0">
-                <a:latin typeface="Courier New" pitchFamily="49" charset="0"/>
-                <a:cs typeface="Courier New" pitchFamily="49" charset="0"/>
-              </a:rPr>
-              <a:t>; index++) {</a:t>
-            </a:r>
-          </a:p>
-          <a:p>
-            <a:pPr marL="285750" lvl="1">
-              <a:buNone/>
-            </a:pPr>
-            <a:r>
-              <a:rPr lang="en-US" dirty="0">
-                <a:latin typeface="Courier New" pitchFamily="49" charset="0"/>
-                <a:cs typeface="Courier New" pitchFamily="49" charset="0"/>
-              </a:rPr>
-              <a:t>     if (</a:t>
-            </a:r>
-            <a:r>
-              <a:rPr lang="en-US" dirty="0" err="1">
-                <a:latin typeface="Courier New" pitchFamily="49" charset="0"/>
-                <a:cs typeface="Courier New" pitchFamily="49" charset="0"/>
-              </a:rPr>
-              <a:t>dom.planeButton</a:t>
-            </a:r>
-            <a:r>
-              <a:rPr lang="en-US" dirty="0">
-                <a:latin typeface="Courier New" pitchFamily="49" charset="0"/>
-                <a:cs typeface="Courier New" pitchFamily="49" charset="0"/>
-              </a:rPr>
-              <a:t>[index].checked) {</a:t>
-            </a:r>
-          </a:p>
-          <a:p>
-            <a:pPr marL="285750" lvl="1">
-              <a:buNone/>
-            </a:pPr>
-            <a:r>
-              <a:rPr lang="en-US" dirty="0">
-                <a:latin typeface="Courier New" pitchFamily="49" charset="0"/>
-                <a:cs typeface="Courier New" pitchFamily="49" charset="0"/>
-              </a:rPr>
-              <a:t>       plane = </a:t>
-            </a:r>
-            <a:r>
-              <a:rPr lang="en-US" dirty="0" err="1">
-                <a:latin typeface="Courier New" pitchFamily="49" charset="0"/>
-                <a:cs typeface="Courier New" pitchFamily="49" charset="0"/>
-              </a:rPr>
-              <a:t>dom.planeButton</a:t>
-            </a:r>
-            <a:r>
-              <a:rPr lang="en-US" dirty="0">
-                <a:latin typeface="Courier New" pitchFamily="49" charset="0"/>
-                <a:cs typeface="Courier New" pitchFamily="49" charset="0"/>
-              </a:rPr>
-              <a:t>[index].value;</a:t>
-            </a:r>
-          </a:p>
-          <a:p>
-            <a:pPr marL="285750" lvl="1">
-              <a:buNone/>
-            </a:pPr>
-            <a:r>
-              <a:rPr lang="en-US" dirty="0">
-                <a:latin typeface="Courier New" pitchFamily="49" charset="0"/>
-                <a:cs typeface="Courier New" pitchFamily="49" charset="0"/>
-              </a:rPr>
-              <a:t>       break;</a:t>
-            </a:r>
-          </a:p>
-          <a:p>
-            <a:pPr marL="285750" lvl="1">
-              <a:buNone/>
-            </a:pPr>
-            <a:r>
-              <a:rPr lang="en-US" dirty="0">
-                <a:latin typeface="Courier New" pitchFamily="49" charset="0"/>
-                <a:cs typeface="Courier New" pitchFamily="49" charset="0"/>
-              </a:rPr>
-              <a:t>     }</a:t>
-            </a:r>
-          </a:p>
-          <a:p>
-            <a:pPr marL="285750" lvl="1">
-              <a:buNone/>
-            </a:pPr>
-            <a:r>
-              <a:rPr lang="en-US" dirty="0">
-                <a:latin typeface="Courier New" pitchFamily="49" charset="0"/>
-                <a:cs typeface="Courier New" pitchFamily="49" charset="0"/>
-              </a:rPr>
-              <a:t>   }</a:t>
-            </a:r>
-          </a:p>
-          <a:p>
-            <a:pPr lvl="1"/>
-            <a:endParaRPr lang="en-US" dirty="0"/>
+              <a:rPr lang="en-US" dirty="0"/>
+              <a:t>The handler could be changed during use</a:t>
+            </a:r>
           </a:p>
         </p:txBody>
       </p:sp>
@@ -20177,145 +20065,6 @@
               <a:rPr kumimoji="0" lang="en-US" smtClean="0"/>
               <a:pPr/>
               <a:t>33</a:t>
-            </a:fld>
-            <a:endParaRPr kumimoji="0" lang="en-US"/>
-          </a:p>
-        </p:txBody>
-      </p:sp>
-    </p:spTree>
-    <p:extLst>
-      <p:ext uri="{BB962C8B-B14F-4D97-AF65-F5344CB8AC3E}">
-        <p14:creationId xmlns:p14="http://schemas.microsoft.com/office/powerpoint/2010/main" val="2913970114"/>
-      </p:ext>
-    </p:extLst>
-  </p:cSld>
-  <p:clrMapOvr>
-    <a:masterClrMapping/>
-  </p:clrMapOvr>
-</p:sld>
-</file>
-
-<file path=ppt/slides/slide34.xml><?xml version="1.0" encoding="utf-8"?>
-<p:sld xmlns:a="http://schemas.openxmlformats.org/drawingml/2006/main" xmlns:r="http://schemas.openxmlformats.org/officeDocument/2006/relationships" xmlns:p="http://schemas.openxmlformats.org/presentationml/2006/main">
-  <p:cSld>
-    <p:spTree>
-      <p:nvGrpSpPr>
-        <p:cNvPr id="1" name=""/>
-        <p:cNvGrpSpPr/>
-        <p:nvPr/>
-      </p:nvGrpSpPr>
-      <p:grpSpPr>
-        <a:xfrm>
-          <a:off x="0" y="0"/>
-          <a:ext cx="0" cy="0"/>
-          <a:chOff x="0" y="0"/>
-          <a:chExt cx="0" cy="0"/>
-        </a:xfrm>
-      </p:grpSpPr>
-      <p:sp>
-        <p:nvSpPr>
-          <p:cNvPr id="2" name="Title 1"/>
-          <p:cNvSpPr>
-            <a:spLocks noGrp="1"/>
-          </p:cNvSpPr>
-          <p:nvPr>
-            <p:ph type="title"/>
-          </p:nvPr>
-        </p:nvSpPr>
-        <p:spPr/>
-        <p:txBody>
-          <a:bodyPr>
-            <a:normAutofit/>
-          </a:bodyPr>
-          <a:lstStyle/>
-          <a:p>
-            <a:r>
-              <a:rPr lang="en-US" dirty="0"/>
-              <a:t>Handling Events from Radio Buttons</a:t>
-            </a:r>
-          </a:p>
-        </p:txBody>
-      </p:sp>
-      <p:sp>
-        <p:nvSpPr>
-          <p:cNvPr id="3" name="Content Placeholder 2"/>
-          <p:cNvSpPr>
-            <a:spLocks noGrp="1"/>
-          </p:cNvSpPr>
-          <p:nvPr>
-            <p:ph idx="1"/>
-          </p:nvPr>
-        </p:nvSpPr>
-        <p:spPr/>
-        <p:txBody>
-          <a:bodyPr>
-            <a:normAutofit/>
-          </a:bodyPr>
-          <a:lstStyle/>
-          <a:p>
-            <a:r>
-              <a:rPr lang="en-US" dirty="0"/>
-              <a:t>The disadvantage of specifying handlers by assigning them to event properties is that there is </a:t>
-            </a:r>
-            <a:r>
-              <a:rPr lang="en-US" dirty="0">
-                <a:solidFill>
-                  <a:srgbClr val="7030A0"/>
-                </a:solidFill>
-              </a:rPr>
-              <a:t>no way to use parameters</a:t>
-            </a:r>
-          </a:p>
-          <a:p>
-            <a:endParaRPr lang="en-US" dirty="0"/>
-          </a:p>
-          <a:p>
-            <a:r>
-              <a:rPr lang="en-US" dirty="0"/>
-              <a:t>So why do this?</a:t>
-            </a:r>
-          </a:p>
-          <a:p>
-            <a:pPr marL="457200" indent="-457200">
-              <a:buFont typeface="+mj-lt"/>
-              <a:buAutoNum type="arabicPeriod"/>
-            </a:pPr>
-            <a:r>
-              <a:rPr lang="en-US" dirty="0"/>
-              <a:t>It is good to keep HTML and JavaScript separate</a:t>
-            </a:r>
-          </a:p>
-          <a:p>
-            <a:pPr marL="457200" indent="-457200">
-              <a:buFont typeface="+mj-lt"/>
-              <a:buAutoNum type="arabicPeriod"/>
-            </a:pPr>
-            <a:r>
-              <a:rPr lang="en-US" dirty="0"/>
-              <a:t>The handler could be changed during use</a:t>
-            </a:r>
-          </a:p>
-        </p:txBody>
-      </p:sp>
-      <p:sp>
-        <p:nvSpPr>
-          <p:cNvPr id="4" name="Slide Number Placeholder 3"/>
-          <p:cNvSpPr>
-            <a:spLocks noGrp="1"/>
-          </p:cNvSpPr>
-          <p:nvPr>
-            <p:ph type="sldNum" sz="quarter" idx="12"/>
-          </p:nvPr>
-        </p:nvSpPr>
-        <p:spPr/>
-        <p:txBody>
-          <a:bodyPr/>
-          <a:lstStyle/>
-          <a:p>
-            <a:fld id="{9648F39E-9C37-485F-AC97-16BB4BDF9F49}" type="slidenum">
-              <a:rPr kumimoji="0" lang="en-US" smtClean="0"/>
-              <a:pPr/>
-              <a:t>34</a:t>
             </a:fld>
             <a:endParaRPr kumimoji="0" lang="en-US"/>
           </a:p>
@@ -20563,7 +20312,7 @@
 </p:sld>
 </file>
 
-<file path=ppt/slides/slide35.xml><?xml version="1.0" encoding="utf-8"?>
+<file path=ppt/slides/slide34.xml><?xml version="1.0" encoding="utf-8"?>
 <p:sld xmlns:a="http://schemas.openxmlformats.org/drawingml/2006/main" xmlns:r="http://schemas.openxmlformats.org/officeDocument/2006/relationships" xmlns:p="http://schemas.openxmlformats.org/presentationml/2006/main">
   <p:cSld>
     <p:spTree>
@@ -20697,7 +20446,7 @@
 </p:sld>
 </file>
 
-<file path=ppt/slides/slide36.xml><?xml version="1.0" encoding="utf-8"?>
+<file path=ppt/slides/slide35.xml><?xml version="1.0" encoding="utf-8"?>
 <p:sld xmlns:a="http://schemas.openxmlformats.org/drawingml/2006/main" xmlns:r="http://schemas.openxmlformats.org/officeDocument/2006/relationships" xmlns:p="http://schemas.openxmlformats.org/presentationml/2006/main">
   <p:cSld>
     <p:bg>
@@ -20748,7 +20497,7 @@
           <a:p>
             <a:r>
               <a:rPr lang="en-US" sz="3600" dirty="0"/>
-              <a:t>End of Session 16</a:t>
+              <a:t>Start Session 17</a:t>
             </a:r>
           </a:p>
         </p:txBody>
@@ -20793,7 +20542,7 @@
     </p:spTree>
     <p:extLst>
       <p:ext uri="{BB962C8B-B14F-4D97-AF65-F5344CB8AC3E}">
-        <p14:creationId xmlns:p14="http://schemas.microsoft.com/office/powerpoint/2010/main" val="2567981252"/>
+        <p14:creationId xmlns:p14="http://schemas.microsoft.com/office/powerpoint/2010/main" val="3914311443"/>
       </p:ext>
     </p:extLst>
   </p:cSld>
@@ -20803,7 +20552,7 @@
 </p:sld>
 </file>
 
-<file path=ppt/slides/slide37.xml><?xml version="1.0" encoding="utf-8"?>
+<file path=ppt/slides/slide36.xml><?xml version="1.0" encoding="utf-8"?>
 <p:sld xmlns:a="http://schemas.openxmlformats.org/drawingml/2006/main" xmlns:r="http://schemas.openxmlformats.org/officeDocument/2006/relationships" xmlns:p="http://schemas.openxmlformats.org/presentationml/2006/main">
   <p:cSld>
     <p:spTree>
@@ -21101,7 +20850,7 @@
             <a:fld id="{9648F39E-9C37-485F-AC97-16BB4BDF9F49}" type="slidenum">
               <a:rPr kumimoji="0" lang="en-US" smtClean="0"/>
               <a:pPr/>
-              <a:t>37</a:t>
+              <a:t>36</a:t>
             </a:fld>
             <a:endParaRPr kumimoji="0" lang="en-US"/>
           </a:p>
@@ -21545,7 +21294,7 @@
 </p:sld>
 </file>
 
-<file path=ppt/slides/slide38.xml><?xml version="1.0" encoding="utf-8"?>
+<file path=ppt/slides/slide37.xml><?xml version="1.0" encoding="utf-8"?>
 <p:sld xmlns:a="http://schemas.openxmlformats.org/drawingml/2006/main" xmlns:r="http://schemas.openxmlformats.org/officeDocument/2006/relationships" xmlns:p="http://schemas.openxmlformats.org/presentationml/2006/main">
   <p:cSld>
     <p:spTree>
@@ -21637,7 +21386,7 @@
 </p:sld>
 </file>
 
-<file path=ppt/slides/slide39.xml><?xml version="1.0" encoding="utf-8"?>
+<file path=ppt/slides/slide38.xml><?xml version="1.0" encoding="utf-8"?>
 <p:sld xmlns:a="http://schemas.openxmlformats.org/drawingml/2006/main" xmlns:r="http://schemas.openxmlformats.org/officeDocument/2006/relationships" xmlns:p="http://schemas.openxmlformats.org/presentationml/2006/main">
   <p:cSld>
     <p:spTree>
@@ -21689,59 +21438,7 @@
 </p:sld>
 </file>
 
-<file path=ppt/slides/slide4.xml><?xml version="1.0" encoding="utf-8"?>
-<p:sld xmlns:a="http://schemas.openxmlformats.org/drawingml/2006/main" xmlns:r="http://schemas.openxmlformats.org/officeDocument/2006/relationships" xmlns:p="http://schemas.openxmlformats.org/presentationml/2006/main">
-  <p:cSld>
-    <p:spTree>
-      <p:nvGrpSpPr>
-        <p:cNvPr id="1" name=""/>
-        <p:cNvGrpSpPr/>
-        <p:nvPr/>
-      </p:nvGrpSpPr>
-      <p:grpSpPr>
-        <a:xfrm>
-          <a:off x="0" y="0"/>
-          <a:ext cx="0" cy="0"/>
-          <a:chOff x="0" y="0"/>
-          <a:chExt cx="0" cy="0"/>
-        </a:xfrm>
-      </p:grpSpPr>
-      <p:sp>
-        <p:nvSpPr>
-          <p:cNvPr id="4" name="Title 3"/>
-          <p:cNvSpPr>
-            <a:spLocks noGrp="1"/>
-          </p:cNvSpPr>
-          <p:nvPr>
-            <p:ph type="ctrTitle"/>
-          </p:nvPr>
-        </p:nvSpPr>
-        <p:spPr/>
-        <p:txBody>
-          <a:bodyPr/>
-          <a:lstStyle/>
-          <a:p>
-            <a:r>
-              <a:rPr lang="en-US" b="1" dirty="0"/>
-              <a:t>Document Object Model</a:t>
-            </a:r>
-          </a:p>
-        </p:txBody>
-      </p:sp>
-    </p:spTree>
-    <p:extLst>
-      <p:ext uri="{BB962C8B-B14F-4D97-AF65-F5344CB8AC3E}">
-        <p14:creationId xmlns:p14="http://schemas.microsoft.com/office/powerpoint/2010/main" val="3834091470"/>
-      </p:ext>
-    </p:extLst>
-  </p:cSld>
-  <p:clrMapOvr>
-    <a:masterClrMapping/>
-  </p:clrMapOvr>
-</p:sld>
-</file>
-
-<file path=ppt/slides/slide40.xml><?xml version="1.0" encoding="utf-8"?>
+<file path=ppt/slides/slide39.xml><?xml version="1.0" encoding="utf-8"?>
 <p:sld xmlns:a="http://schemas.openxmlformats.org/drawingml/2006/main" xmlns:r="http://schemas.openxmlformats.org/officeDocument/2006/relationships" xmlns:p="http://schemas.openxmlformats.org/presentationml/2006/main">
   <p:cSld>
     <p:spTree>
@@ -22030,7 +21727,7 @@
             <a:fld id="{9648F39E-9C37-485F-AC97-16BB4BDF9F49}" type="slidenum">
               <a:rPr kumimoji="0" lang="en-US" smtClean="0"/>
               <a:pPr/>
-              <a:t>40</a:t>
+              <a:t>39</a:t>
             </a:fld>
             <a:endParaRPr kumimoji="0" lang="en-US"/>
           </a:p>
@@ -22327,7 +22024,59 @@
 </p:sld>
 </file>
 
-<file path=ppt/slides/slide41.xml><?xml version="1.0" encoding="utf-8"?>
+<file path=ppt/slides/slide4.xml><?xml version="1.0" encoding="utf-8"?>
+<p:sld xmlns:a="http://schemas.openxmlformats.org/drawingml/2006/main" xmlns:r="http://schemas.openxmlformats.org/officeDocument/2006/relationships" xmlns:p="http://schemas.openxmlformats.org/presentationml/2006/main">
+  <p:cSld>
+    <p:spTree>
+      <p:nvGrpSpPr>
+        <p:cNvPr id="1" name=""/>
+        <p:cNvGrpSpPr/>
+        <p:nvPr/>
+      </p:nvGrpSpPr>
+      <p:grpSpPr>
+        <a:xfrm>
+          <a:off x="0" y="0"/>
+          <a:ext cx="0" cy="0"/>
+          <a:chOff x="0" y="0"/>
+          <a:chExt cx="0" cy="0"/>
+        </a:xfrm>
+      </p:grpSpPr>
+      <p:sp>
+        <p:nvSpPr>
+          <p:cNvPr id="4" name="Title 3"/>
+          <p:cNvSpPr>
+            <a:spLocks noGrp="1"/>
+          </p:cNvSpPr>
+          <p:nvPr>
+            <p:ph type="ctrTitle"/>
+          </p:nvPr>
+        </p:nvSpPr>
+        <p:spPr/>
+        <p:txBody>
+          <a:bodyPr/>
+          <a:lstStyle/>
+          <a:p>
+            <a:r>
+              <a:rPr lang="en-US" b="1" dirty="0"/>
+              <a:t>Document Object Model</a:t>
+            </a:r>
+          </a:p>
+        </p:txBody>
+      </p:sp>
+    </p:spTree>
+    <p:extLst>
+      <p:ext uri="{BB962C8B-B14F-4D97-AF65-F5344CB8AC3E}">
+        <p14:creationId xmlns:p14="http://schemas.microsoft.com/office/powerpoint/2010/main" val="3834091470"/>
+      </p:ext>
+    </p:extLst>
+  </p:cSld>
+  <p:clrMapOvr>
+    <a:masterClrMapping/>
+  </p:clrMapOvr>
+</p:sld>
+</file>
+
+<file path=ppt/slides/slide40.xml><?xml version="1.0" encoding="utf-8"?>
 <p:sld xmlns:a="http://schemas.openxmlformats.org/drawingml/2006/main" xmlns:r="http://schemas.openxmlformats.org/officeDocument/2006/relationships" xmlns:p="http://schemas.openxmlformats.org/presentationml/2006/main">
   <p:cSld>
     <p:spTree>
@@ -22439,7 +22188,7 @@
 </p:sld>
 </file>
 
-<file path=ppt/slides/slide42.xml><?xml version="1.0" encoding="utf-8"?>
+<file path=ppt/slides/slide41.xml><?xml version="1.0" encoding="utf-8"?>
 <p:sld xmlns:a="http://schemas.openxmlformats.org/drawingml/2006/main" xmlns:r="http://schemas.openxmlformats.org/officeDocument/2006/relationships" xmlns:p="http://schemas.openxmlformats.org/presentationml/2006/main">
   <p:cSld>
     <p:spTree>
@@ -22491,7 +22240,7 @@
 </p:sld>
 </file>
 
-<file path=ppt/slides/slide43.xml><?xml version="1.0" encoding="utf-8"?>
+<file path=ppt/slides/slide42.xml><?xml version="1.0" encoding="utf-8"?>
 <p:sld xmlns:a="http://schemas.openxmlformats.org/drawingml/2006/main" xmlns:r="http://schemas.openxmlformats.org/officeDocument/2006/relationships" xmlns:p="http://schemas.openxmlformats.org/presentationml/2006/main">
   <p:cSld>
     <p:spTree>
@@ -22691,7 +22440,7 @@
             <a:fld id="{9648F39E-9C37-485F-AC97-16BB4BDF9F49}" type="slidenum">
               <a:rPr kumimoji="0" lang="en-US" smtClean="0"/>
               <a:pPr/>
-              <a:t>43</a:t>
+              <a:t>42</a:t>
             </a:fld>
             <a:endParaRPr kumimoji="0" lang="en-US"/>
           </a:p>
@@ -23027,7 +22776,7 @@
 </p:sld>
 </file>
 
-<file path=ppt/slides/slide44.xml><?xml version="1.0" encoding="utf-8"?>
+<file path=ppt/slides/slide43.xml><?xml version="1.0" encoding="utf-8"?>
 <p:sld xmlns:a="http://schemas.openxmlformats.org/drawingml/2006/main" xmlns:r="http://schemas.openxmlformats.org/officeDocument/2006/relationships" xmlns:p="http://schemas.openxmlformats.org/presentationml/2006/main">
   <p:cSld>
     <p:spTree>
@@ -23353,7 +23102,7 @@
             <a:fld id="{9648F39E-9C37-485F-AC97-16BB4BDF9F49}" type="slidenum">
               <a:rPr kumimoji="0" lang="en-US" smtClean="0"/>
               <a:pPr/>
-              <a:t>44</a:t>
+              <a:t>43</a:t>
             </a:fld>
             <a:endParaRPr kumimoji="0" lang="en-US"/>
           </a:p>
@@ -23650,7 +23399,7 @@
 </p:sld>
 </file>
 
-<file path=ppt/slides/slide45.xml><?xml version="1.0" encoding="utf-8"?>
+<file path=ppt/slides/slide44.xml><?xml version="1.0" encoding="utf-8"?>
 <p:sld xmlns:a="http://schemas.openxmlformats.org/drawingml/2006/main" xmlns:r="http://schemas.openxmlformats.org/officeDocument/2006/relationships" xmlns:p="http://schemas.openxmlformats.org/presentationml/2006/main">
   <p:cSld>
     <p:spTree>
@@ -23702,7 +23451,7 @@
 </p:sld>
 </file>
 
-<file path=ppt/slides/slide46.xml><?xml version="1.0" encoding="utf-8"?>
+<file path=ppt/slides/slide45.xml><?xml version="1.0" encoding="utf-8"?>
 <p:sld xmlns:a="http://schemas.openxmlformats.org/drawingml/2006/main" xmlns:r="http://schemas.openxmlformats.org/officeDocument/2006/relationships" xmlns:p="http://schemas.openxmlformats.org/presentationml/2006/main">
   <p:cSld>
     <p:spTree>
@@ -24055,7 +23804,7 @@
 </p:sld>
 </file>
 
-<file path=ppt/slides/slide47.xml><?xml version="1.0" encoding="utf-8"?>
+<file path=ppt/slides/slide46.xml><?xml version="1.0" encoding="utf-8"?>
 <p:sld xmlns:a="http://schemas.openxmlformats.org/drawingml/2006/main" xmlns:r="http://schemas.openxmlformats.org/officeDocument/2006/relationships" xmlns:p="http://schemas.openxmlformats.org/presentationml/2006/main">
   <p:cSld>
     <p:spTree>
@@ -24434,7 +24183,7 @@
 </p:sld>
 </file>
 
-<file path=ppt/slides/slide48.xml><?xml version="1.0" encoding="utf-8"?>
+<file path=ppt/slides/slide47.xml><?xml version="1.0" encoding="utf-8"?>
 <p:sld xmlns:a="http://schemas.openxmlformats.org/drawingml/2006/main" xmlns:r="http://schemas.openxmlformats.org/officeDocument/2006/relationships" xmlns:p="http://schemas.openxmlformats.org/presentationml/2006/main">
   <p:cSld>
     <p:spTree>
@@ -25031,7 +24780,7 @@
 </p:sld>
 </file>
 
-<file path=ppt/slides/slide49.xml><?xml version="1.0" encoding="utf-8"?>
+<file path=ppt/slides/slide48.xml><?xml version="1.0" encoding="utf-8"?>
 <p:sld xmlns:a="http://schemas.openxmlformats.org/drawingml/2006/main" xmlns:r="http://schemas.openxmlformats.org/officeDocument/2006/relationships" xmlns:p="http://schemas.openxmlformats.org/presentationml/2006/main">
   <p:cSld>
     <p:spTree>
@@ -25143,325 +24892,7 @@
 </p:sld>
 </file>
 
-<file path=ppt/slides/slide5.xml><?xml version="1.0" encoding="utf-8"?>
-<p:sld xmlns:a="http://schemas.openxmlformats.org/drawingml/2006/main" xmlns:r="http://schemas.openxmlformats.org/officeDocument/2006/relationships" xmlns:p="http://schemas.openxmlformats.org/presentationml/2006/main">
-  <p:cSld>
-    <p:spTree>
-      <p:nvGrpSpPr>
-        <p:cNvPr id="1" name=""/>
-        <p:cNvGrpSpPr/>
-        <p:nvPr/>
-      </p:nvGrpSpPr>
-      <p:grpSpPr>
-        <a:xfrm>
-          <a:off x="0" y="0"/>
-          <a:ext cx="0" cy="0"/>
-          <a:chOff x="0" y="0"/>
-          <a:chExt cx="0" cy="0"/>
-        </a:xfrm>
-      </p:grpSpPr>
-      <p:sp>
-        <p:nvSpPr>
-          <p:cNvPr id="5" name="Title 4"/>
-          <p:cNvSpPr>
-            <a:spLocks noGrp="1"/>
-          </p:cNvSpPr>
-          <p:nvPr>
-            <p:ph type="title"/>
-          </p:nvPr>
-        </p:nvSpPr>
-        <p:spPr/>
-        <p:txBody>
-          <a:bodyPr/>
-          <a:lstStyle/>
-          <a:p>
-            <a:r>
-              <a:rPr lang="en-US" dirty="0"/>
-              <a:t>The Document Object Model</a:t>
-            </a:r>
-          </a:p>
-        </p:txBody>
-      </p:sp>
-      <p:sp>
-        <p:nvSpPr>
-          <p:cNvPr id="6" name="Content Placeholder 5"/>
-          <p:cNvSpPr>
-            <a:spLocks noGrp="1"/>
-          </p:cNvSpPr>
-          <p:nvPr>
-            <p:ph idx="1"/>
-          </p:nvPr>
-        </p:nvSpPr>
-        <p:spPr>
-          <a:xfrm>
-            <a:off x="685800" y="1219200"/>
-            <a:ext cx="7772400" cy="4648200"/>
-          </a:xfrm>
-        </p:spPr>
-        <p:txBody>
-          <a:bodyPr>
-            <a:normAutofit/>
-          </a:bodyPr>
-          <a:lstStyle/>
-          <a:p>
-            <a:r>
-              <a:rPr lang="en-US" dirty="0"/>
-              <a:t>The </a:t>
-            </a:r>
-            <a:r>
-              <a:rPr lang="en-US" b="1" i="1" dirty="0">
-                <a:solidFill>
-                  <a:srgbClr val="FF0000"/>
-                </a:solidFill>
-              </a:rPr>
-              <a:t>Document Object Model (DOM) </a:t>
-            </a:r>
-            <a:r>
-              <a:rPr lang="en-US" dirty="0"/>
-              <a:t>is an abstract model that defines the interface between HTML documents and application programs—an API</a:t>
-            </a:r>
-          </a:p>
-          <a:p>
-            <a:endParaRPr lang="en-US" dirty="0"/>
-          </a:p>
-          <a:p>
-            <a:r>
-              <a:rPr lang="en-US" dirty="0"/>
-              <a:t>Documents in the DOM have a </a:t>
-            </a:r>
-            <a:r>
-              <a:rPr lang="en-US" dirty="0">
-                <a:solidFill>
-                  <a:srgbClr val="7030A0"/>
-                </a:solidFill>
-              </a:rPr>
-              <a:t>treelike structure</a:t>
-            </a:r>
-          </a:p>
-          <a:p>
-            <a:endParaRPr lang="en-US" dirty="0"/>
-          </a:p>
-          <a:p>
-            <a:endParaRPr lang="en-US" dirty="0"/>
-          </a:p>
-          <a:p>
-            <a:endParaRPr lang="en-US" dirty="0"/>
-          </a:p>
-          <a:p>
-            <a:endParaRPr lang="en-US" dirty="0"/>
-          </a:p>
-        </p:txBody>
-      </p:sp>
-      <p:sp>
-        <p:nvSpPr>
-          <p:cNvPr id="4" name="Slide Number Placeholder 3"/>
-          <p:cNvSpPr>
-            <a:spLocks noGrp="1"/>
-          </p:cNvSpPr>
-          <p:nvPr>
-            <p:ph type="sldNum" sz="quarter" idx="12"/>
-          </p:nvPr>
-        </p:nvSpPr>
-        <p:spPr/>
-        <p:txBody>
-          <a:bodyPr/>
-          <a:lstStyle/>
-          <a:p>
-            <a:fld id="{9648F39E-9C37-485F-AC97-16BB4BDF9F49}" type="slidenum">
-              <a:rPr kumimoji="0" lang="en-US" smtClean="0"/>
-              <a:pPr/>
-              <a:t>5</a:t>
-            </a:fld>
-            <a:endParaRPr kumimoji="0" lang="en-US" dirty="0"/>
-          </a:p>
-        </p:txBody>
-      </p:sp>
-      <p:pic>
-        <p:nvPicPr>
-          <p:cNvPr id="1026" name="Picture 2" descr="DOM HTML tree"/>
-          <p:cNvPicPr>
-            <a:picLocks noChangeAspect="1" noChangeArrowheads="1"/>
-          </p:cNvPicPr>
-          <p:nvPr/>
-        </p:nvPicPr>
-        <p:blipFill>
-          <a:blip r:embed="rId3">
-            <a:extLst>
-              <a:ext uri="{28A0092B-C50C-407E-A947-70E740481C1C}">
-                <a14:useLocalDpi xmlns:a14="http://schemas.microsoft.com/office/drawing/2010/main" val="0"/>
-              </a:ext>
-            </a:extLst>
-          </a:blip>
-          <a:srcRect/>
-          <a:stretch>
-            <a:fillRect/>
-          </a:stretch>
-        </p:blipFill>
-        <p:spPr bwMode="auto">
-          <a:xfrm>
-            <a:off x="1600200" y="3352800"/>
-            <a:ext cx="5791200" cy="3169670"/>
-          </a:xfrm>
-          <a:prstGeom prst="rect">
-            <a:avLst/>
-          </a:prstGeom>
-          <a:noFill/>
-          <a:extLst>
-            <a:ext uri="{909E8E84-426E-40DD-AFC4-6F175D3DCCD1}">
-              <a14:hiddenFill xmlns:a14="http://schemas.microsoft.com/office/drawing/2010/main">
-                <a:solidFill>
-                  <a:srgbClr val="FFFFFF"/>
-                </a:solidFill>
-              </a14:hiddenFill>
-            </a:ext>
-          </a:extLst>
-        </p:spPr>
-      </p:pic>
-    </p:spTree>
-    <p:extLst>
-      <p:ext uri="{BB962C8B-B14F-4D97-AF65-F5344CB8AC3E}">
-        <p14:creationId xmlns:p14="http://schemas.microsoft.com/office/powerpoint/2010/main" val="3288072464"/>
-      </p:ext>
-    </p:extLst>
-  </p:cSld>
-  <p:clrMapOvr>
-    <a:masterClrMapping/>
-  </p:clrMapOvr>
-  <p:timing>
-    <p:tnLst>
-      <p:par>
-        <p:cTn id="1" dur="indefinite" restart="never" nodeType="tmRoot">
-          <p:childTnLst>
-            <p:seq concurrent="1" nextAc="seek">
-              <p:cTn id="2" dur="indefinite" nodeType="mainSeq">
-                <p:childTnLst>
-                  <p:par>
-                    <p:cTn id="3" fill="hold">
-                      <p:stCondLst>
-                        <p:cond delay="indefinite"/>
-                      </p:stCondLst>
-                      <p:childTnLst>
-                        <p:par>
-                          <p:cTn id="4" fill="hold">
-                            <p:stCondLst>
-                              <p:cond delay="0"/>
-                            </p:stCondLst>
-                            <p:childTnLst>
-                              <p:par>
-                                <p:cTn id="5" presetID="1" presetClass="entr" presetSubtype="0" fill="hold" grpId="0" nodeType="clickEffect">
-                                  <p:stCondLst>
-                                    <p:cond delay="0"/>
-                                  </p:stCondLst>
-                                  <p:childTnLst>
-                                    <p:set>
-                                      <p:cBhvr>
-                                        <p:cTn id="6" dur="1" fill="hold">
-                                          <p:stCondLst>
-                                            <p:cond delay="0"/>
-                                          </p:stCondLst>
-                                        </p:cTn>
-                                        <p:tgtEl>
-                                          <p:spTgt spid="6">
-                                            <p:txEl>
-                                              <p:pRg st="0" end="0"/>
-                                            </p:txEl>
-                                          </p:spTgt>
-                                        </p:tgtEl>
-                                        <p:attrNameLst>
-                                          <p:attrName>style.visibility</p:attrName>
-                                        </p:attrNameLst>
-                                      </p:cBhvr>
-                                      <p:to>
-                                        <p:strVal val="visible"/>
-                                      </p:to>
-                                    </p:set>
-                                  </p:childTnLst>
-                                </p:cTn>
-                              </p:par>
-                            </p:childTnLst>
-                          </p:cTn>
-                        </p:par>
-                      </p:childTnLst>
-                    </p:cTn>
-                  </p:par>
-                  <p:par>
-                    <p:cTn id="7" fill="hold">
-                      <p:stCondLst>
-                        <p:cond delay="indefinite"/>
-                      </p:stCondLst>
-                      <p:childTnLst>
-                        <p:par>
-                          <p:cTn id="8" fill="hold">
-                            <p:stCondLst>
-                              <p:cond delay="0"/>
-                            </p:stCondLst>
-                            <p:childTnLst>
-                              <p:par>
-                                <p:cTn id="9" presetID="1" presetClass="entr" presetSubtype="0" fill="hold" grpId="0" nodeType="clickEffect">
-                                  <p:stCondLst>
-                                    <p:cond delay="0"/>
-                                  </p:stCondLst>
-                                  <p:childTnLst>
-                                    <p:set>
-                                      <p:cBhvr>
-                                        <p:cTn id="10" dur="1" fill="hold">
-                                          <p:stCondLst>
-                                            <p:cond delay="0"/>
-                                          </p:stCondLst>
-                                        </p:cTn>
-                                        <p:tgtEl>
-                                          <p:spTgt spid="6">
-                                            <p:txEl>
-                                              <p:pRg st="2" end="2"/>
-                                            </p:txEl>
-                                          </p:spTgt>
-                                        </p:tgtEl>
-                                        <p:attrNameLst>
-                                          <p:attrName>style.visibility</p:attrName>
-                                        </p:attrNameLst>
-                                      </p:cBhvr>
-                                      <p:to>
-                                        <p:strVal val="visible"/>
-                                      </p:to>
-                                    </p:set>
-                                  </p:childTnLst>
-                                </p:cTn>
-                              </p:par>
-                            </p:childTnLst>
-                          </p:cTn>
-                        </p:par>
-                      </p:childTnLst>
-                    </p:cTn>
-                  </p:par>
-                </p:childTnLst>
-              </p:cTn>
-              <p:prevCondLst>
-                <p:cond evt="onPrev" delay="0">
-                  <p:tgtEl>
-                    <p:sldTgt/>
-                  </p:tgtEl>
-                </p:cond>
-              </p:prevCondLst>
-              <p:nextCondLst>
-                <p:cond evt="onNext" delay="0">
-                  <p:tgtEl>
-                    <p:sldTgt/>
-                  </p:tgtEl>
-                </p:cond>
-              </p:nextCondLst>
-            </p:seq>
-          </p:childTnLst>
-        </p:cTn>
-      </p:par>
-    </p:tnLst>
-    <p:bldLst>
-      <p:bldP spid="6" grpId="0" build="p"/>
-    </p:bldLst>
-  </p:timing>
-</p:sld>
-</file>
-
-<file path=ppt/slides/slide50.xml><?xml version="1.0" encoding="utf-8"?>
+<file path=ppt/slides/slide49.xml><?xml version="1.0" encoding="utf-8"?>
 <p:sld xmlns:a="http://schemas.openxmlformats.org/drawingml/2006/main" xmlns:r="http://schemas.openxmlformats.org/officeDocument/2006/relationships" xmlns:p="http://schemas.openxmlformats.org/presentationml/2006/main">
   <p:cSld>
     <p:spTree>
@@ -25895,7 +25326,325 @@
 </p:sld>
 </file>
 
-<file path=ppt/slides/slide51.xml><?xml version="1.0" encoding="utf-8"?>
+<file path=ppt/slides/slide5.xml><?xml version="1.0" encoding="utf-8"?>
+<p:sld xmlns:a="http://schemas.openxmlformats.org/drawingml/2006/main" xmlns:r="http://schemas.openxmlformats.org/officeDocument/2006/relationships" xmlns:p="http://schemas.openxmlformats.org/presentationml/2006/main">
+  <p:cSld>
+    <p:spTree>
+      <p:nvGrpSpPr>
+        <p:cNvPr id="1" name=""/>
+        <p:cNvGrpSpPr/>
+        <p:nvPr/>
+      </p:nvGrpSpPr>
+      <p:grpSpPr>
+        <a:xfrm>
+          <a:off x="0" y="0"/>
+          <a:ext cx="0" cy="0"/>
+          <a:chOff x="0" y="0"/>
+          <a:chExt cx="0" cy="0"/>
+        </a:xfrm>
+      </p:grpSpPr>
+      <p:sp>
+        <p:nvSpPr>
+          <p:cNvPr id="5" name="Title 4"/>
+          <p:cNvSpPr>
+            <a:spLocks noGrp="1"/>
+          </p:cNvSpPr>
+          <p:nvPr>
+            <p:ph type="title"/>
+          </p:nvPr>
+        </p:nvSpPr>
+        <p:spPr/>
+        <p:txBody>
+          <a:bodyPr/>
+          <a:lstStyle/>
+          <a:p>
+            <a:r>
+              <a:rPr lang="en-US" dirty="0"/>
+              <a:t>The Document Object Model</a:t>
+            </a:r>
+          </a:p>
+        </p:txBody>
+      </p:sp>
+      <p:sp>
+        <p:nvSpPr>
+          <p:cNvPr id="6" name="Content Placeholder 5"/>
+          <p:cNvSpPr>
+            <a:spLocks noGrp="1"/>
+          </p:cNvSpPr>
+          <p:nvPr>
+            <p:ph idx="1"/>
+          </p:nvPr>
+        </p:nvSpPr>
+        <p:spPr>
+          <a:xfrm>
+            <a:off x="685800" y="1219200"/>
+            <a:ext cx="7772400" cy="4648200"/>
+          </a:xfrm>
+        </p:spPr>
+        <p:txBody>
+          <a:bodyPr>
+            <a:normAutofit/>
+          </a:bodyPr>
+          <a:lstStyle/>
+          <a:p>
+            <a:r>
+              <a:rPr lang="en-US" dirty="0"/>
+              <a:t>The </a:t>
+            </a:r>
+            <a:r>
+              <a:rPr lang="en-US" b="1" i="1" dirty="0">
+                <a:solidFill>
+                  <a:srgbClr val="FF0000"/>
+                </a:solidFill>
+              </a:rPr>
+              <a:t>Document Object Model (DOM) </a:t>
+            </a:r>
+            <a:r>
+              <a:rPr lang="en-US" dirty="0"/>
+              <a:t>is an abstract model that defines the interface between HTML documents and application programs—an API</a:t>
+            </a:r>
+          </a:p>
+          <a:p>
+            <a:endParaRPr lang="en-US" dirty="0"/>
+          </a:p>
+          <a:p>
+            <a:r>
+              <a:rPr lang="en-US" dirty="0"/>
+              <a:t>Documents in the DOM have a </a:t>
+            </a:r>
+            <a:r>
+              <a:rPr lang="en-US" dirty="0">
+                <a:solidFill>
+                  <a:srgbClr val="7030A0"/>
+                </a:solidFill>
+              </a:rPr>
+              <a:t>treelike structure</a:t>
+            </a:r>
+          </a:p>
+          <a:p>
+            <a:endParaRPr lang="en-US" dirty="0"/>
+          </a:p>
+          <a:p>
+            <a:endParaRPr lang="en-US" dirty="0"/>
+          </a:p>
+          <a:p>
+            <a:endParaRPr lang="en-US" dirty="0"/>
+          </a:p>
+          <a:p>
+            <a:endParaRPr lang="en-US" dirty="0"/>
+          </a:p>
+        </p:txBody>
+      </p:sp>
+      <p:sp>
+        <p:nvSpPr>
+          <p:cNvPr id="4" name="Slide Number Placeholder 3"/>
+          <p:cNvSpPr>
+            <a:spLocks noGrp="1"/>
+          </p:cNvSpPr>
+          <p:nvPr>
+            <p:ph type="sldNum" sz="quarter" idx="12"/>
+          </p:nvPr>
+        </p:nvSpPr>
+        <p:spPr/>
+        <p:txBody>
+          <a:bodyPr/>
+          <a:lstStyle/>
+          <a:p>
+            <a:fld id="{9648F39E-9C37-485F-AC97-16BB4BDF9F49}" type="slidenum">
+              <a:rPr kumimoji="0" lang="en-US" smtClean="0"/>
+              <a:pPr/>
+              <a:t>5</a:t>
+            </a:fld>
+            <a:endParaRPr kumimoji="0" lang="en-US" dirty="0"/>
+          </a:p>
+        </p:txBody>
+      </p:sp>
+      <p:pic>
+        <p:nvPicPr>
+          <p:cNvPr id="1026" name="Picture 2" descr="DOM HTML tree"/>
+          <p:cNvPicPr>
+            <a:picLocks noChangeAspect="1" noChangeArrowheads="1"/>
+          </p:cNvPicPr>
+          <p:nvPr/>
+        </p:nvPicPr>
+        <p:blipFill>
+          <a:blip r:embed="rId3">
+            <a:extLst>
+              <a:ext uri="{28A0092B-C50C-407E-A947-70E740481C1C}">
+                <a14:useLocalDpi xmlns:a14="http://schemas.microsoft.com/office/drawing/2010/main" val="0"/>
+              </a:ext>
+            </a:extLst>
+          </a:blip>
+          <a:srcRect/>
+          <a:stretch>
+            <a:fillRect/>
+          </a:stretch>
+        </p:blipFill>
+        <p:spPr bwMode="auto">
+          <a:xfrm>
+            <a:off x="1600200" y="3352800"/>
+            <a:ext cx="5791200" cy="3169670"/>
+          </a:xfrm>
+          <a:prstGeom prst="rect">
+            <a:avLst/>
+          </a:prstGeom>
+          <a:noFill/>
+          <a:extLst>
+            <a:ext uri="{909E8E84-426E-40DD-AFC4-6F175D3DCCD1}">
+              <a14:hiddenFill xmlns:a14="http://schemas.microsoft.com/office/drawing/2010/main">
+                <a:solidFill>
+                  <a:srgbClr val="FFFFFF"/>
+                </a:solidFill>
+              </a14:hiddenFill>
+            </a:ext>
+          </a:extLst>
+        </p:spPr>
+      </p:pic>
+    </p:spTree>
+    <p:extLst>
+      <p:ext uri="{BB962C8B-B14F-4D97-AF65-F5344CB8AC3E}">
+        <p14:creationId xmlns:p14="http://schemas.microsoft.com/office/powerpoint/2010/main" val="3288072464"/>
+      </p:ext>
+    </p:extLst>
+  </p:cSld>
+  <p:clrMapOvr>
+    <a:masterClrMapping/>
+  </p:clrMapOvr>
+  <p:timing>
+    <p:tnLst>
+      <p:par>
+        <p:cTn id="1" dur="indefinite" restart="never" nodeType="tmRoot">
+          <p:childTnLst>
+            <p:seq concurrent="1" nextAc="seek">
+              <p:cTn id="2" dur="indefinite" nodeType="mainSeq">
+                <p:childTnLst>
+                  <p:par>
+                    <p:cTn id="3" fill="hold">
+                      <p:stCondLst>
+                        <p:cond delay="indefinite"/>
+                      </p:stCondLst>
+                      <p:childTnLst>
+                        <p:par>
+                          <p:cTn id="4" fill="hold">
+                            <p:stCondLst>
+                              <p:cond delay="0"/>
+                            </p:stCondLst>
+                            <p:childTnLst>
+                              <p:par>
+                                <p:cTn id="5" presetID="1" presetClass="entr" presetSubtype="0" fill="hold" grpId="0" nodeType="clickEffect">
+                                  <p:stCondLst>
+                                    <p:cond delay="0"/>
+                                  </p:stCondLst>
+                                  <p:childTnLst>
+                                    <p:set>
+                                      <p:cBhvr>
+                                        <p:cTn id="6" dur="1" fill="hold">
+                                          <p:stCondLst>
+                                            <p:cond delay="0"/>
+                                          </p:stCondLst>
+                                        </p:cTn>
+                                        <p:tgtEl>
+                                          <p:spTgt spid="6">
+                                            <p:txEl>
+                                              <p:pRg st="0" end="0"/>
+                                            </p:txEl>
+                                          </p:spTgt>
+                                        </p:tgtEl>
+                                        <p:attrNameLst>
+                                          <p:attrName>style.visibility</p:attrName>
+                                        </p:attrNameLst>
+                                      </p:cBhvr>
+                                      <p:to>
+                                        <p:strVal val="visible"/>
+                                      </p:to>
+                                    </p:set>
+                                  </p:childTnLst>
+                                </p:cTn>
+                              </p:par>
+                            </p:childTnLst>
+                          </p:cTn>
+                        </p:par>
+                      </p:childTnLst>
+                    </p:cTn>
+                  </p:par>
+                  <p:par>
+                    <p:cTn id="7" fill="hold">
+                      <p:stCondLst>
+                        <p:cond delay="indefinite"/>
+                      </p:stCondLst>
+                      <p:childTnLst>
+                        <p:par>
+                          <p:cTn id="8" fill="hold">
+                            <p:stCondLst>
+                              <p:cond delay="0"/>
+                            </p:stCondLst>
+                            <p:childTnLst>
+                              <p:par>
+                                <p:cTn id="9" presetID="1" presetClass="entr" presetSubtype="0" fill="hold" grpId="0" nodeType="clickEffect">
+                                  <p:stCondLst>
+                                    <p:cond delay="0"/>
+                                  </p:stCondLst>
+                                  <p:childTnLst>
+                                    <p:set>
+                                      <p:cBhvr>
+                                        <p:cTn id="10" dur="1" fill="hold">
+                                          <p:stCondLst>
+                                            <p:cond delay="0"/>
+                                          </p:stCondLst>
+                                        </p:cTn>
+                                        <p:tgtEl>
+                                          <p:spTgt spid="6">
+                                            <p:txEl>
+                                              <p:pRg st="2" end="2"/>
+                                            </p:txEl>
+                                          </p:spTgt>
+                                        </p:tgtEl>
+                                        <p:attrNameLst>
+                                          <p:attrName>style.visibility</p:attrName>
+                                        </p:attrNameLst>
+                                      </p:cBhvr>
+                                      <p:to>
+                                        <p:strVal val="visible"/>
+                                      </p:to>
+                                    </p:set>
+                                  </p:childTnLst>
+                                </p:cTn>
+                              </p:par>
+                            </p:childTnLst>
+                          </p:cTn>
+                        </p:par>
+                      </p:childTnLst>
+                    </p:cTn>
+                  </p:par>
+                </p:childTnLst>
+              </p:cTn>
+              <p:prevCondLst>
+                <p:cond evt="onPrev" delay="0">
+                  <p:tgtEl>
+                    <p:sldTgt/>
+                  </p:tgtEl>
+                </p:cond>
+              </p:prevCondLst>
+              <p:nextCondLst>
+                <p:cond evt="onNext" delay="0">
+                  <p:tgtEl>
+                    <p:sldTgt/>
+                  </p:tgtEl>
+                </p:cond>
+              </p:nextCondLst>
+            </p:seq>
+          </p:childTnLst>
+        </p:cTn>
+      </p:par>
+    </p:tnLst>
+    <p:bldLst>
+      <p:bldP spid="6" grpId="0" build="p"/>
+    </p:bldLst>
+  </p:timing>
+</p:sld>
+</file>
+
+<file path=ppt/slides/slide50.xml><?xml version="1.0" encoding="utf-8"?>
 <p:sld xmlns:a="http://schemas.openxmlformats.org/drawingml/2006/main" xmlns:r="http://schemas.openxmlformats.org/officeDocument/2006/relationships" xmlns:p="http://schemas.openxmlformats.org/presentationml/2006/main">
   <p:cSld>
     <p:spTree>
@@ -26485,7 +26234,7 @@
 </p:sld>
 </file>
 
-<file path=ppt/slides/slide52.xml><?xml version="1.0" encoding="utf-8"?>
+<file path=ppt/slides/slide51.xml><?xml version="1.0" encoding="utf-8"?>
 <p:sld xmlns:a="http://schemas.openxmlformats.org/drawingml/2006/main" xmlns:r="http://schemas.openxmlformats.org/officeDocument/2006/relationships" xmlns:p="http://schemas.openxmlformats.org/presentationml/2006/main">
   <p:cSld>
     <p:spTree>
@@ -26962,7 +26711,7 @@
 </p:sld>
 </file>
 
-<file path=ppt/slides/slide53.xml><?xml version="1.0" encoding="utf-8"?>
+<file path=ppt/slides/slide52.xml><?xml version="1.0" encoding="utf-8"?>
 <p:sld xmlns:a="http://schemas.openxmlformats.org/drawingml/2006/main" xmlns:r="http://schemas.openxmlformats.org/officeDocument/2006/relationships" xmlns:p="http://schemas.openxmlformats.org/presentationml/2006/main">
   <p:cSld>
     <p:spTree>
@@ -27054,7 +26803,7 @@
 </p:sld>
 </file>
 
-<file path=ppt/slides/slide54.xml><?xml version="1.0" encoding="utf-8"?>
+<file path=ppt/slides/slide53.xml><?xml version="1.0" encoding="utf-8"?>
 <p:sld xmlns:a="http://schemas.openxmlformats.org/drawingml/2006/main" xmlns:r="http://schemas.openxmlformats.org/officeDocument/2006/relationships" xmlns:p="http://schemas.openxmlformats.org/presentationml/2006/main">
   <p:cSld>
     <p:spTree>

</xml_diff>

<commit_message>
Add and update session 17 documents.
</commit_message>
<xml_diff>
--- a/CPSC-24700/Presentations/javascript-and-html.pptx
+++ b/CPSC-24700/Presentations/javascript-and-html.pptx
@@ -265,7 +265,7 @@
           <a:p>
             <a:fld id="{82AC26F5-A2E7-4901-A403-BBD25C17198C}" type="datetimeFigureOut">
               <a:rPr lang="en-US" smtClean="0"/>
-              <a:t>10/4/2017</a:t>
+              <a:t>10/9/2017</a:t>
             </a:fld>
             <a:endParaRPr lang="en-US"/>
           </a:p>
@@ -2127,7 +2127,7 @@
           <a:p>
             <a:fld id="{FB7712AD-3B21-4FE9-B722-CF9B0200D9B9}" type="datetimeFigureOut">
               <a:rPr lang="en-US" smtClean="0"/>
-              <a:t>10/4/2017</a:t>
+              <a:t>10/9/2017</a:t>
             </a:fld>
             <a:endParaRPr lang="en-US"/>
           </a:p>
@@ -2307,7 +2307,7 @@
           <a:p>
             <a:fld id="{FB7712AD-3B21-4FE9-B722-CF9B0200D9B9}" type="datetimeFigureOut">
               <a:rPr lang="en-US" smtClean="0"/>
-              <a:t>10/4/2017</a:t>
+              <a:t>10/9/2017</a:t>
             </a:fld>
             <a:endParaRPr lang="en-US"/>
           </a:p>
@@ -2497,7 +2497,7 @@
           <a:p>
             <a:fld id="{FB7712AD-3B21-4FE9-B722-CF9B0200D9B9}" type="datetimeFigureOut">
               <a:rPr lang="en-US" smtClean="0"/>
-              <a:t>10/4/2017</a:t>
+              <a:t>10/9/2017</a:t>
             </a:fld>
             <a:endParaRPr lang="en-US"/>
           </a:p>
@@ -2713,7 +2713,7 @@
           <a:p>
             <a:fld id="{5FB62F81-FD80-4AA8-93CA-E835B40BE667}" type="datetimeFigureOut">
               <a:rPr lang="en-US" smtClean="0"/>
-              <a:t>10/4/2017</a:t>
+              <a:t>10/9/2017</a:t>
             </a:fld>
             <a:endParaRPr lang="en-US"/>
           </a:p>
@@ -2911,7 +2911,7 @@
           <a:p>
             <a:fld id="{5FB62F81-FD80-4AA8-93CA-E835B40BE667}" type="datetimeFigureOut">
               <a:rPr lang="en-US" smtClean="0"/>
-              <a:t>10/4/2017</a:t>
+              <a:t>10/9/2017</a:t>
             </a:fld>
             <a:endParaRPr lang="en-US"/>
           </a:p>
@@ -3186,7 +3186,7 @@
           <a:p>
             <a:fld id="{5FB62F81-FD80-4AA8-93CA-E835B40BE667}" type="datetimeFigureOut">
               <a:rPr lang="en-US" smtClean="0"/>
-              <a:t>10/4/2017</a:t>
+              <a:t>10/9/2017</a:t>
             </a:fld>
             <a:endParaRPr lang="en-US"/>
           </a:p>
@@ -3451,7 +3451,7 @@
           <a:p>
             <a:fld id="{5FB62F81-FD80-4AA8-93CA-E835B40BE667}" type="datetimeFigureOut">
               <a:rPr lang="en-US" smtClean="0"/>
-              <a:t>10/4/2017</a:t>
+              <a:t>10/9/2017</a:t>
             </a:fld>
             <a:endParaRPr lang="en-US"/>
           </a:p>
@@ -3863,7 +3863,7 @@
           <a:p>
             <a:fld id="{5FB62F81-FD80-4AA8-93CA-E835B40BE667}" type="datetimeFigureOut">
               <a:rPr lang="en-US" smtClean="0"/>
-              <a:t>10/4/2017</a:t>
+              <a:t>10/9/2017</a:t>
             </a:fld>
             <a:endParaRPr lang="en-US"/>
           </a:p>
@@ -4004,7 +4004,7 @@
           <a:p>
             <a:fld id="{5FB62F81-FD80-4AA8-93CA-E835B40BE667}" type="datetimeFigureOut">
               <a:rPr lang="en-US" smtClean="0"/>
-              <a:t>10/4/2017</a:t>
+              <a:t>10/9/2017</a:t>
             </a:fld>
             <a:endParaRPr lang="en-US"/>
           </a:p>
@@ -4117,7 +4117,7 @@
           <a:p>
             <a:fld id="{5FB62F81-FD80-4AA8-93CA-E835B40BE667}" type="datetimeFigureOut">
               <a:rPr lang="en-US" smtClean="0"/>
-              <a:t>10/4/2017</a:t>
+              <a:t>10/9/2017</a:t>
             </a:fld>
             <a:endParaRPr lang="en-US"/>
           </a:p>
@@ -4428,7 +4428,7 @@
           <a:p>
             <a:fld id="{5FB62F81-FD80-4AA8-93CA-E835B40BE667}" type="datetimeFigureOut">
               <a:rPr lang="en-US" smtClean="0"/>
-              <a:t>10/4/2017</a:t>
+              <a:t>10/9/2017</a:t>
             </a:fld>
             <a:endParaRPr lang="en-US"/>
           </a:p>
@@ -4655,7 +4655,7 @@
           <a:p>
             <a:fld id="{FB7712AD-3B21-4FE9-B722-CF9B0200D9B9}" type="datetimeFigureOut">
               <a:rPr lang="en-US" smtClean="0"/>
-              <a:t>10/4/2017</a:t>
+              <a:t>10/9/2017</a:t>
             </a:fld>
             <a:endParaRPr lang="en-US"/>
           </a:p>
@@ -4939,7 +4939,7 @@
           <a:p>
             <a:fld id="{5FB62F81-FD80-4AA8-93CA-E835B40BE667}" type="datetimeFigureOut">
               <a:rPr lang="en-US" smtClean="0"/>
-              <a:t>10/4/2017</a:t>
+              <a:t>10/9/2017</a:t>
             </a:fld>
             <a:endParaRPr lang="en-US"/>
           </a:p>
@@ -5137,7 +5137,7 @@
           <a:p>
             <a:fld id="{5FB62F81-FD80-4AA8-93CA-E835B40BE667}" type="datetimeFigureOut">
               <a:rPr lang="en-US" smtClean="0"/>
-              <a:t>10/4/2017</a:t>
+              <a:t>10/9/2017</a:t>
             </a:fld>
             <a:endParaRPr lang="en-US"/>
           </a:p>
@@ -5345,7 +5345,7 @@
           <a:p>
             <a:fld id="{5FB62F81-FD80-4AA8-93CA-E835B40BE667}" type="datetimeFigureOut">
               <a:rPr lang="en-US" smtClean="0"/>
-              <a:t>10/4/2017</a:t>
+              <a:t>10/9/2017</a:t>
             </a:fld>
             <a:endParaRPr lang="en-US"/>
           </a:p>
@@ -5552,7 +5552,7 @@
           <a:p>
             <a:fld id="{FB7712AD-3B21-4FE9-B722-CF9B0200D9B9}" type="datetimeFigureOut">
               <a:rPr lang="en-US" smtClean="0"/>
-              <a:t>10/4/2017</a:t>
+              <a:t>10/9/2017</a:t>
             </a:fld>
             <a:endParaRPr lang="en-US"/>
           </a:p>
@@ -5849,7 +5849,7 @@
           <a:p>
             <a:fld id="{FB7712AD-3B21-4FE9-B722-CF9B0200D9B9}" type="datetimeFigureOut">
               <a:rPr lang="en-US" smtClean="0"/>
-              <a:t>10/4/2017</a:t>
+              <a:t>10/9/2017</a:t>
             </a:fld>
             <a:endParaRPr lang="en-US"/>
           </a:p>
@@ -6285,7 +6285,7 @@
           <a:p>
             <a:fld id="{FB7712AD-3B21-4FE9-B722-CF9B0200D9B9}" type="datetimeFigureOut">
               <a:rPr lang="en-US" smtClean="0"/>
-              <a:t>10/4/2017</a:t>
+              <a:t>10/9/2017</a:t>
             </a:fld>
             <a:endParaRPr lang="en-US"/>
           </a:p>
@@ -6414,7 +6414,7 @@
           <a:p>
             <a:fld id="{FB7712AD-3B21-4FE9-B722-CF9B0200D9B9}" type="datetimeFigureOut">
               <a:rPr lang="en-US" smtClean="0"/>
-              <a:t>10/4/2017</a:t>
+              <a:t>10/9/2017</a:t>
             </a:fld>
             <a:endParaRPr lang="en-US"/>
           </a:p>
@@ -6521,7 +6521,7 @@
           <a:p>
             <a:fld id="{FB7712AD-3B21-4FE9-B722-CF9B0200D9B9}" type="datetimeFigureOut">
               <a:rPr lang="en-US" smtClean="0"/>
-              <a:t>10/4/2017</a:t>
+              <a:t>10/9/2017</a:t>
             </a:fld>
             <a:endParaRPr lang="en-US"/>
           </a:p>
@@ -6808,7 +6808,7 @@
           <a:p>
             <a:fld id="{FB7712AD-3B21-4FE9-B722-CF9B0200D9B9}" type="datetimeFigureOut">
               <a:rPr lang="en-US" smtClean="0"/>
-              <a:t>10/4/2017</a:t>
+              <a:t>10/9/2017</a:t>
             </a:fld>
             <a:endParaRPr lang="en-US"/>
           </a:p>
@@ -7075,7 +7075,7 @@
           <a:p>
             <a:fld id="{FB7712AD-3B21-4FE9-B722-CF9B0200D9B9}" type="datetimeFigureOut">
               <a:rPr lang="en-US" smtClean="0"/>
-              <a:t>10/4/2017</a:t>
+              <a:t>10/9/2017</a:t>
             </a:fld>
             <a:endParaRPr lang="en-US"/>
           </a:p>
@@ -7401,7 +7401,7 @@
           <a:p>
             <a:fld id="{FB7712AD-3B21-4FE9-B722-CF9B0200D9B9}" type="datetimeFigureOut">
               <a:rPr lang="en-US" smtClean="0"/>
-              <a:t>10/4/2017</a:t>
+              <a:t>10/9/2017</a:t>
             </a:fld>
             <a:endParaRPr lang="en-US"/>
           </a:p>
@@ -8100,7 +8100,7 @@
           <a:p>
             <a:fld id="{5FB62F81-FD80-4AA8-93CA-E835B40BE667}" type="datetimeFigureOut">
               <a:rPr lang="en-US" smtClean="0"/>
-              <a:t>10/4/2017</a:t>
+              <a:t>10/9/2017</a:t>
             </a:fld>
             <a:endParaRPr lang="en-US"/>
           </a:p>
@@ -21365,11 +21365,20 @@
             <a:pPr algn="ctr"/>
             <a:r>
               <a:rPr lang="en-US" dirty="0">
-                <a:latin typeface="Consolas" panose="020B0609020204030204" pitchFamily="49" charset="0"/>
-                <a:cs typeface="Consolas" panose="020B0609020204030204" pitchFamily="49" charset="0"/>
-              </a:rPr>
-              <a:t>navigate.html</a:t>
-            </a:r>
+                <a:cs typeface="Calibri" panose="020F0502020204030204" pitchFamily="34" charset="0"/>
+              </a:rPr>
+              <a:t>navigate.html </a:t>
+            </a:r>
+            <a:r>
+              <a:rPr lang="en-US" dirty="0">
+                <a:cs typeface="Calibri" panose="020F0502020204030204" pitchFamily="34" charset="0"/>
+                <a:hlinkClick r:id="rId2"/>
+              </a:rPr>
+              <a:t>[link]</a:t>
+            </a:r>
+            <a:endParaRPr lang="en-US" dirty="0">
+              <a:cs typeface="Calibri" panose="020F0502020204030204" pitchFamily="34" charset="0"/>
+            </a:endParaRPr>
           </a:p>
         </p:txBody>
       </p:sp>
@@ -22147,31 +22156,67 @@
             <a:pPr algn="ctr"/>
             <a:r>
               <a:rPr lang="en-US" dirty="0">
-                <a:latin typeface="Consolas" panose="020B0609020204030204" pitchFamily="49" charset="0"/>
-                <a:cs typeface="Consolas" panose="020B0609020204030204" pitchFamily="49" charset="0"/>
-              </a:rPr>
-              <a:t>circles.html</a:t>
-            </a:r>
+                <a:latin typeface="Calibri Light" panose="020F0302020204030204" pitchFamily="34" charset="0"/>
+                <a:cs typeface="Calibri Light" panose="020F0302020204030204" pitchFamily="34" charset="0"/>
+              </a:rPr>
+              <a:t>circles.html </a:t>
+            </a:r>
+            <a:r>
+              <a:rPr lang="en-US" dirty="0">
+                <a:latin typeface="Calibri Light" panose="020F0302020204030204" pitchFamily="34" charset="0"/>
+                <a:cs typeface="Calibri Light" panose="020F0302020204030204" pitchFamily="34" charset="0"/>
+                <a:hlinkClick r:id="rId2"/>
+              </a:rPr>
+              <a:t>[link]</a:t>
+            </a:r>
+            <a:endParaRPr lang="en-US" dirty="0">
+              <a:latin typeface="Calibri Light" panose="020F0302020204030204" pitchFamily="34" charset="0"/>
+              <a:cs typeface="Calibri Light" panose="020F0302020204030204" pitchFamily="34" charset="0"/>
+            </a:endParaRPr>
           </a:p>
           <a:p>
             <a:pPr algn="ctr"/>
             <a:r>
               <a:rPr lang="en-US" dirty="0">
-                <a:latin typeface="Consolas" panose="020B0609020204030204" pitchFamily="49" charset="0"/>
-                <a:cs typeface="Consolas" panose="020B0609020204030204" pitchFamily="49" charset="0"/>
-              </a:rPr>
-              <a:t>parallel.html</a:t>
-            </a:r>
+                <a:latin typeface="Calibri Light" panose="020F0302020204030204" pitchFamily="34" charset="0"/>
+                <a:cs typeface="Calibri Light" panose="020F0302020204030204" pitchFamily="34" charset="0"/>
+              </a:rPr>
+              <a:t>parallel.html </a:t>
+            </a:r>
+            <a:r>
+              <a:rPr lang="en-US" dirty="0">
+                <a:latin typeface="Calibri Light" panose="020F0302020204030204" pitchFamily="34" charset="0"/>
+                <a:cs typeface="Calibri Light" panose="020F0302020204030204" pitchFamily="34" charset="0"/>
+                <a:hlinkClick r:id="rId3"/>
+              </a:rPr>
+              <a:t>[link]</a:t>
+            </a:r>
+            <a:endParaRPr lang="en-US" dirty="0">
+              <a:latin typeface="Calibri Light" panose="020F0302020204030204" pitchFamily="34" charset="0"/>
+              <a:cs typeface="Calibri Light" panose="020F0302020204030204" pitchFamily="34" charset="0"/>
+            </a:endParaRPr>
           </a:p>
           <a:p>
             <a:pPr algn="ctr"/>
             <a:r>
               <a:rPr lang="en-US" dirty="0">
-                <a:latin typeface="Consolas" panose="020B0609020204030204" pitchFamily="49" charset="0"/>
-                <a:cs typeface="Consolas" panose="020B0609020204030204" pitchFamily="49" charset="0"/>
-              </a:rPr>
-              <a:t>rects.html</a:t>
-            </a:r>
+                <a:latin typeface="Calibri Light" panose="020F0302020204030204" pitchFamily="34" charset="0"/>
+                <a:cs typeface="Calibri Light" panose="020F0302020204030204" pitchFamily="34" charset="0"/>
+              </a:rPr>
+              <a:t>rects.html </a:t>
+            </a:r>
+            <a:r>
+              <a:rPr lang="en-US" dirty="0">
+                <a:latin typeface="Calibri Light" panose="020F0302020204030204" pitchFamily="34" charset="0"/>
+                <a:cs typeface="Calibri Light" panose="020F0302020204030204" pitchFamily="34" charset="0"/>
+                <a:hlinkClick r:id="rId4"/>
+              </a:rPr>
+              <a:t>[link]</a:t>
+            </a:r>
+            <a:endParaRPr lang="en-US" dirty="0">
+              <a:latin typeface="Calibri Light" panose="020F0302020204030204" pitchFamily="34" charset="0"/>
+              <a:cs typeface="Calibri Light" panose="020F0302020204030204" pitchFamily="34" charset="0"/>
+            </a:endParaRPr>
           </a:p>
         </p:txBody>
       </p:sp>
@@ -26782,11 +26827,20 @@
             <a:pPr algn="ctr"/>
             <a:r>
               <a:rPr lang="en-US" dirty="0">
-                <a:latin typeface="Consolas" panose="020B0609020204030204" pitchFamily="49" charset="0"/>
-                <a:cs typeface="Consolas" panose="020B0609020204030204" pitchFamily="49" charset="0"/>
-              </a:rPr>
-              <a:t>validator2.html</a:t>
-            </a:r>
+                <a:cs typeface="Calibri" panose="020F0502020204030204" pitchFamily="34" charset="0"/>
+              </a:rPr>
+              <a:t>validator2.html </a:t>
+            </a:r>
+            <a:r>
+              <a:rPr lang="en-US" dirty="0">
+                <a:cs typeface="Calibri" panose="020F0502020204030204" pitchFamily="34" charset="0"/>
+                <a:hlinkClick r:id="rId2"/>
+              </a:rPr>
+              <a:t>[link]</a:t>
+            </a:r>
+            <a:endParaRPr lang="en-US" dirty="0">
+              <a:cs typeface="Calibri" panose="020F0502020204030204" pitchFamily="34" charset="0"/>
+            </a:endParaRPr>
           </a:p>
         </p:txBody>
       </p:sp>
@@ -26926,7 +26980,7 @@
             </a:pPr>
             <a:r>
               <a:rPr lang="en-US" dirty="0"/>
-              <a:t>In DOM2, events propagate through a three stage process of capturing, target node, and bubbling phases</a:t>
+              <a:t>The navigator object can be used to get information about user's browser</a:t>
             </a:r>
           </a:p>
           <a:p>
@@ -26936,7 +26990,7 @@
             </a:pPr>
             <a:r>
               <a:rPr lang="en-US" dirty="0"/>
-              <a:t>The navigator object can be used to get information about user's browser</a:t>
+              <a:t>The canvas element can be used to draw to the screen through JavaScript</a:t>
             </a:r>
           </a:p>
           <a:p>
@@ -26946,7 +27000,7 @@
             </a:pPr>
             <a:r>
               <a:rPr lang="en-US" dirty="0"/>
-              <a:t>The canvas element can be used to draw to the screen through JavaScript</a:t>
+              <a:t>In DOM2, events propagate through a three stage process of capturing, target node, and bubbling phases</a:t>
             </a:r>
           </a:p>
           <a:p>

</xml_diff>